<commit_message>
Poster, and network analysis in .ipynb
</commit_message>
<xml_diff>
--- a/SmallestConfigSpace/Poster_AMS-Turbulence2025.pptx
+++ b/SmallestConfigSpace/Poster_AMS-Turbulence2025.pptx
@@ -7,14 +7,14 @@
   <p:sldIdLst>
     <p:sldId id="256" r:id="rId2"/>
   </p:sldIdLst>
-  <p:sldSz cx="43891200" cy="32918400"/>
+  <p:sldSz cx="29260800" cy="21945600"/>
   <p:notesSz cx="6858000" cy="9144000"/>
   <p:defaultTextStyle>
     <a:defPPr>
       <a:defRPr lang="en-US"/>
     </a:defPPr>
-    <a:lvl1pPr marL="0" algn="l" defTabSz="2194560" rtl="0" eaLnBrk="1" latinLnBrk="0" hangingPunct="1">
-      <a:defRPr sz="8600" kern="1200">
+    <a:lvl1pPr marL="0" algn="l" defTabSz="1489005" rtl="0" eaLnBrk="1" latinLnBrk="0" hangingPunct="1">
+      <a:defRPr sz="5835" kern="1200">
         <a:solidFill>
           <a:schemeClr val="tx1"/>
         </a:solidFill>
@@ -23,8 +23,8 @@
         <a:cs typeface="+mn-cs"/>
       </a:defRPr>
     </a:lvl1pPr>
-    <a:lvl2pPr marL="2194560" algn="l" defTabSz="2194560" rtl="0" eaLnBrk="1" latinLnBrk="0" hangingPunct="1">
-      <a:defRPr sz="8600" kern="1200">
+    <a:lvl2pPr marL="1489005" algn="l" defTabSz="1489005" rtl="0" eaLnBrk="1" latinLnBrk="0" hangingPunct="1">
+      <a:defRPr sz="5835" kern="1200">
         <a:solidFill>
           <a:schemeClr val="tx1"/>
         </a:solidFill>
@@ -33,8 +33,8 @@
         <a:cs typeface="+mn-cs"/>
       </a:defRPr>
     </a:lvl2pPr>
-    <a:lvl3pPr marL="4389120" algn="l" defTabSz="2194560" rtl="0" eaLnBrk="1" latinLnBrk="0" hangingPunct="1">
-      <a:defRPr sz="8600" kern="1200">
+    <a:lvl3pPr marL="2978010" algn="l" defTabSz="1489005" rtl="0" eaLnBrk="1" latinLnBrk="0" hangingPunct="1">
+      <a:defRPr sz="5835" kern="1200">
         <a:solidFill>
           <a:schemeClr val="tx1"/>
         </a:solidFill>
@@ -43,8 +43,8 @@
         <a:cs typeface="+mn-cs"/>
       </a:defRPr>
     </a:lvl3pPr>
-    <a:lvl4pPr marL="6583680" algn="l" defTabSz="2194560" rtl="0" eaLnBrk="1" latinLnBrk="0" hangingPunct="1">
-      <a:defRPr sz="8600" kern="1200">
+    <a:lvl4pPr marL="4467014" algn="l" defTabSz="1489005" rtl="0" eaLnBrk="1" latinLnBrk="0" hangingPunct="1">
+      <a:defRPr sz="5835" kern="1200">
         <a:solidFill>
           <a:schemeClr val="tx1"/>
         </a:solidFill>
@@ -53,8 +53,8 @@
         <a:cs typeface="+mn-cs"/>
       </a:defRPr>
     </a:lvl4pPr>
-    <a:lvl5pPr marL="8778240" algn="l" defTabSz="2194560" rtl="0" eaLnBrk="1" latinLnBrk="0" hangingPunct="1">
-      <a:defRPr sz="8600" kern="1200">
+    <a:lvl5pPr marL="5956019" algn="l" defTabSz="1489005" rtl="0" eaLnBrk="1" latinLnBrk="0" hangingPunct="1">
+      <a:defRPr sz="5835" kern="1200">
         <a:solidFill>
           <a:schemeClr val="tx1"/>
         </a:solidFill>
@@ -63,8 +63,8 @@
         <a:cs typeface="+mn-cs"/>
       </a:defRPr>
     </a:lvl5pPr>
-    <a:lvl6pPr marL="10972800" algn="l" defTabSz="2194560" rtl="0" eaLnBrk="1" latinLnBrk="0" hangingPunct="1">
-      <a:defRPr sz="8600" kern="1200">
+    <a:lvl6pPr marL="7445024" algn="l" defTabSz="1489005" rtl="0" eaLnBrk="1" latinLnBrk="0" hangingPunct="1">
+      <a:defRPr sz="5835" kern="1200">
         <a:solidFill>
           <a:schemeClr val="tx1"/>
         </a:solidFill>
@@ -73,8 +73,8 @@
         <a:cs typeface="+mn-cs"/>
       </a:defRPr>
     </a:lvl6pPr>
-    <a:lvl7pPr marL="13167360" algn="l" defTabSz="2194560" rtl="0" eaLnBrk="1" latinLnBrk="0" hangingPunct="1">
-      <a:defRPr sz="8600" kern="1200">
+    <a:lvl7pPr marL="8934029" algn="l" defTabSz="1489005" rtl="0" eaLnBrk="1" latinLnBrk="0" hangingPunct="1">
+      <a:defRPr sz="5835" kern="1200">
         <a:solidFill>
           <a:schemeClr val="tx1"/>
         </a:solidFill>
@@ -83,8 +83,8 @@
         <a:cs typeface="+mn-cs"/>
       </a:defRPr>
     </a:lvl7pPr>
-    <a:lvl8pPr marL="15361920" algn="l" defTabSz="2194560" rtl="0" eaLnBrk="1" latinLnBrk="0" hangingPunct="1">
-      <a:defRPr sz="8600" kern="1200">
+    <a:lvl8pPr marL="10423034" algn="l" defTabSz="1489005" rtl="0" eaLnBrk="1" latinLnBrk="0" hangingPunct="1">
+      <a:defRPr sz="5835" kern="1200">
         <a:solidFill>
           <a:schemeClr val="tx1"/>
         </a:solidFill>
@@ -93,8 +93,8 @@
         <a:cs typeface="+mn-cs"/>
       </a:defRPr>
     </a:lvl8pPr>
-    <a:lvl9pPr marL="17556480" algn="l" defTabSz="2194560" rtl="0" eaLnBrk="1" latinLnBrk="0" hangingPunct="1">
-      <a:defRPr sz="8600" kern="1200">
+    <a:lvl9pPr marL="11912038" algn="l" defTabSz="1489005" rtl="0" eaLnBrk="1" latinLnBrk="0" hangingPunct="1">
+      <a:defRPr sz="5835" kern="1200">
         <a:solidFill>
           <a:schemeClr val="tx1"/>
         </a:solidFill>
@@ -107,12 +107,12 @@
   <p:extLst>
     <p:ext uri="{EFAFB233-063F-42B5-8137-9DF3F51BA10A}">
       <p15:sldGuideLst xmlns:p15="http://schemas.microsoft.com/office/powerpoint/2012/main">
-        <p15:guide id="1" orient="horz" pos="10368">
+        <p15:guide id="1" orient="horz" pos="6912" userDrawn="1">
           <p15:clr>
             <a:srgbClr val="A4A3A4"/>
           </p15:clr>
         </p15:guide>
-        <p15:guide id="2" pos="13824">
+        <p15:guide id="2" pos="9216" userDrawn="1">
           <p15:clr>
             <a:srgbClr val="A4A3A4"/>
           </p15:clr>
@@ -152,8 +152,8 @@
         </p:nvSpPr>
         <p:spPr>
           <a:xfrm>
-            <a:off x="3291840" y="10226042"/>
-            <a:ext cx="37307520" cy="7056120"/>
+            <a:off x="2194560" y="6817363"/>
+            <a:ext cx="24871680" cy="4704080"/>
           </a:xfrm>
         </p:spPr>
         <p:txBody>
@@ -179,8 +179,8 @@
         </p:nvSpPr>
         <p:spPr>
           <a:xfrm>
-            <a:off x="6583680" y="18653760"/>
-            <a:ext cx="30723840" cy="8412480"/>
+            <a:off x="4389120" y="12435840"/>
+            <a:ext cx="20482560" cy="5608320"/>
           </a:xfrm>
         </p:spPr>
         <p:txBody>
@@ -196,7 +196,7 @@
                 </a:solidFill>
               </a:defRPr>
             </a:lvl1pPr>
-            <a:lvl2pPr marL="2194560" indent="0" algn="ctr">
+            <a:lvl2pPr marL="1418692" indent="0" algn="ctr">
               <a:buNone/>
               <a:defRPr>
                 <a:solidFill>
@@ -206,7 +206,7 @@
                 </a:solidFill>
               </a:defRPr>
             </a:lvl2pPr>
-            <a:lvl3pPr marL="4389120" indent="0" algn="ctr">
+            <a:lvl3pPr marL="2837385" indent="0" algn="ctr">
               <a:buNone/>
               <a:defRPr>
                 <a:solidFill>
@@ -216,7 +216,7 @@
                 </a:solidFill>
               </a:defRPr>
             </a:lvl3pPr>
-            <a:lvl4pPr marL="6583680" indent="0" algn="ctr">
+            <a:lvl4pPr marL="4256076" indent="0" algn="ctr">
               <a:buNone/>
               <a:defRPr>
                 <a:solidFill>
@@ -226,7 +226,7 @@
                 </a:solidFill>
               </a:defRPr>
             </a:lvl4pPr>
-            <a:lvl5pPr marL="8778240" indent="0" algn="ctr">
+            <a:lvl5pPr marL="5674769" indent="0" algn="ctr">
               <a:buNone/>
               <a:defRPr>
                 <a:solidFill>
@@ -236,7 +236,7 @@
                 </a:solidFill>
               </a:defRPr>
             </a:lvl5pPr>
-            <a:lvl6pPr marL="10972800" indent="0" algn="ctr">
+            <a:lvl6pPr marL="7093461" indent="0" algn="ctr">
               <a:buNone/>
               <a:defRPr>
                 <a:solidFill>
@@ -246,7 +246,7 @@
                 </a:solidFill>
               </a:defRPr>
             </a:lvl6pPr>
-            <a:lvl7pPr marL="13167360" indent="0" algn="ctr">
+            <a:lvl7pPr marL="8512153" indent="0" algn="ctr">
               <a:buNone/>
               <a:defRPr>
                 <a:solidFill>
@@ -256,7 +256,7 @@
                 </a:solidFill>
               </a:defRPr>
             </a:lvl7pPr>
-            <a:lvl8pPr marL="15361920" indent="0" algn="ctr">
+            <a:lvl8pPr marL="9930845" indent="0" algn="ctr">
               <a:buNone/>
               <a:defRPr>
                 <a:solidFill>
@@ -266,7 +266,7 @@
                 </a:solidFill>
               </a:defRPr>
             </a:lvl8pPr>
-            <a:lvl9pPr marL="17556480" indent="0" algn="ctr">
+            <a:lvl9pPr marL="11349538" indent="0" algn="ctr">
               <a:buNone/>
               <a:defRPr>
                 <a:solidFill>
@@ -303,7 +303,7 @@
             <a:fld id="{E2252522-108F-2A4E-9BBA-FBA30AE411DB}" type="datetimeFigureOut">
               <a:rPr lang="en-US" smtClean="0"/>
               <a:pPr/>
-              <a:t>6/8/25</a:t>
+              <a:t>6/13/25</a:t>
             </a:fld>
             <a:endParaRPr lang="en-US"/>
           </a:p>
@@ -468,7 +468,7 @@
             <a:fld id="{E2252522-108F-2A4E-9BBA-FBA30AE411DB}" type="datetimeFigureOut">
               <a:rPr lang="en-US" smtClean="0"/>
               <a:pPr/>
-              <a:t>6/8/25</a:t>
+              <a:t>6/13/25</a:t>
             </a:fld>
             <a:endParaRPr lang="en-US"/>
           </a:p>
@@ -554,8 +554,8 @@
         </p:nvSpPr>
         <p:spPr>
           <a:xfrm>
-            <a:off x="152742905" y="6324600"/>
-            <a:ext cx="47404018" cy="134820662"/>
+            <a:off x="101828604" y="4216400"/>
+            <a:ext cx="31602679" cy="89880443"/>
           </a:xfrm>
         </p:spPr>
         <p:txBody>
@@ -581,8 +581,8 @@
         </p:nvSpPr>
         <p:spPr>
           <a:xfrm>
-            <a:off x="10530843" y="6324600"/>
-            <a:ext cx="141480542" cy="134820662"/>
+            <a:off x="7020566" y="4216400"/>
+            <a:ext cx="94320362" cy="89880443"/>
           </a:xfrm>
         </p:spPr>
         <p:txBody>
@@ -643,7 +643,7 @@
             <a:fld id="{E2252522-108F-2A4E-9BBA-FBA30AE411DB}" type="datetimeFigureOut">
               <a:rPr lang="en-US" smtClean="0"/>
               <a:pPr/>
-              <a:t>6/8/25</a:t>
+              <a:t>6/13/25</a:t>
             </a:fld>
             <a:endParaRPr lang="en-US"/>
           </a:p>
@@ -808,7 +808,7 @@
             <a:fld id="{E2252522-108F-2A4E-9BBA-FBA30AE411DB}" type="datetimeFigureOut">
               <a:rPr lang="en-US" smtClean="0"/>
               <a:pPr/>
-              <a:t>6/8/25</a:t>
+              <a:t>6/13/25</a:t>
             </a:fld>
             <a:endParaRPr lang="en-US"/>
           </a:p>
@@ -894,15 +894,15 @@
         </p:nvSpPr>
         <p:spPr>
           <a:xfrm>
-            <a:off x="3467102" y="21153122"/>
-            <a:ext cx="37307520" cy="6537960"/>
+            <a:off x="2311401" y="14102083"/>
+            <a:ext cx="24871680" cy="4358640"/>
           </a:xfrm>
         </p:spPr>
         <p:txBody>
           <a:bodyPr anchor="t"/>
           <a:lstStyle>
             <a:lvl1pPr algn="l">
-              <a:defRPr sz="19200" b="1" cap="all"/>
+              <a:defRPr sz="12412" b="1" cap="all"/>
             </a:lvl1pPr>
           </a:lstStyle>
           <a:p>
@@ -925,8 +925,8 @@
         </p:nvSpPr>
         <p:spPr>
           <a:xfrm>
-            <a:off x="3467102" y="13952225"/>
-            <a:ext cx="37307520" cy="7200898"/>
+            <a:off x="2311401" y="9301485"/>
+            <a:ext cx="24871680" cy="4800599"/>
           </a:xfrm>
         </p:spPr>
         <p:txBody>
@@ -934,7 +934,7 @@
           <a:lstStyle>
             <a:lvl1pPr marL="0" indent="0">
               <a:buNone/>
-              <a:defRPr sz="9600">
+              <a:defRPr sz="6206">
                 <a:solidFill>
                   <a:schemeClr val="tx1">
                     <a:tint val="75000"/>
@@ -942,9 +942,9 @@
                 </a:solidFill>
               </a:defRPr>
             </a:lvl1pPr>
-            <a:lvl2pPr marL="2194560" indent="0">
+            <a:lvl2pPr marL="1418692" indent="0">
               <a:buNone/>
-              <a:defRPr sz="8600">
+              <a:defRPr sz="5559">
                 <a:solidFill>
                   <a:schemeClr val="tx1">
                     <a:tint val="75000"/>
@@ -952,9 +952,9 @@
                 </a:solidFill>
               </a:defRPr>
             </a:lvl2pPr>
-            <a:lvl3pPr marL="4389120" indent="0">
+            <a:lvl3pPr marL="2837385" indent="0">
               <a:buNone/>
-              <a:defRPr sz="7700">
+              <a:defRPr sz="4977">
                 <a:solidFill>
                   <a:schemeClr val="tx1">
                     <a:tint val="75000"/>
@@ -962,9 +962,9 @@
                 </a:solidFill>
               </a:defRPr>
             </a:lvl3pPr>
-            <a:lvl4pPr marL="6583680" indent="0">
+            <a:lvl4pPr marL="4256076" indent="0">
               <a:buNone/>
-              <a:defRPr sz="6700">
+              <a:defRPr sz="4332">
                 <a:solidFill>
                   <a:schemeClr val="tx1">
                     <a:tint val="75000"/>
@@ -972,9 +972,9 @@
                 </a:solidFill>
               </a:defRPr>
             </a:lvl4pPr>
-            <a:lvl5pPr marL="8778240" indent="0">
+            <a:lvl5pPr marL="5674769" indent="0">
               <a:buNone/>
-              <a:defRPr sz="6700">
+              <a:defRPr sz="4332">
                 <a:solidFill>
                   <a:schemeClr val="tx1">
                     <a:tint val="75000"/>
@@ -982,9 +982,9 @@
                 </a:solidFill>
               </a:defRPr>
             </a:lvl5pPr>
-            <a:lvl6pPr marL="10972800" indent="0">
+            <a:lvl6pPr marL="7093461" indent="0">
               <a:buNone/>
-              <a:defRPr sz="6700">
+              <a:defRPr sz="4332">
                 <a:solidFill>
                   <a:schemeClr val="tx1">
                     <a:tint val="75000"/>
@@ -992,9 +992,9 @@
                 </a:solidFill>
               </a:defRPr>
             </a:lvl6pPr>
-            <a:lvl7pPr marL="13167360" indent="0">
+            <a:lvl7pPr marL="8512153" indent="0">
               <a:buNone/>
-              <a:defRPr sz="6700">
+              <a:defRPr sz="4332">
                 <a:solidFill>
                   <a:schemeClr val="tx1">
                     <a:tint val="75000"/>
@@ -1002,9 +1002,9 @@
                 </a:solidFill>
               </a:defRPr>
             </a:lvl7pPr>
-            <a:lvl8pPr marL="15361920" indent="0">
+            <a:lvl8pPr marL="9930845" indent="0">
               <a:buNone/>
-              <a:defRPr sz="6700">
+              <a:defRPr sz="4332">
                 <a:solidFill>
                   <a:schemeClr val="tx1">
                     <a:tint val="75000"/>
@@ -1012,9 +1012,9 @@
                 </a:solidFill>
               </a:defRPr>
             </a:lvl8pPr>
-            <a:lvl9pPr marL="17556480" indent="0">
+            <a:lvl9pPr marL="11349538" indent="0">
               <a:buNone/>
-              <a:defRPr sz="6700">
+              <a:defRPr sz="4332">
                 <a:solidFill>
                   <a:schemeClr val="tx1">
                     <a:tint val="75000"/>
@@ -1050,7 +1050,7 @@
             <a:fld id="{E2252522-108F-2A4E-9BBA-FBA30AE411DB}" type="datetimeFigureOut">
               <a:rPr lang="en-US" smtClean="0"/>
               <a:pPr/>
-              <a:t>6/8/25</a:t>
+              <a:t>6/13/25</a:t>
             </a:fld>
             <a:endParaRPr lang="en-US"/>
           </a:p>
@@ -1158,39 +1158,39 @@
         </p:nvSpPr>
         <p:spPr>
           <a:xfrm>
-            <a:off x="10530842" y="36865560"/>
-            <a:ext cx="94442280" cy="104279702"/>
+            <a:off x="7020562" y="24577040"/>
+            <a:ext cx="62961520" cy="69519803"/>
           </a:xfrm>
         </p:spPr>
         <p:txBody>
           <a:bodyPr/>
           <a:lstStyle>
             <a:lvl1pPr>
-              <a:defRPr sz="13400"/>
+              <a:defRPr sz="8662"/>
             </a:lvl1pPr>
             <a:lvl2pPr>
-              <a:defRPr sz="11500"/>
+              <a:defRPr sz="7435"/>
             </a:lvl2pPr>
             <a:lvl3pPr>
-              <a:defRPr sz="9600"/>
+              <a:defRPr sz="6206"/>
             </a:lvl3pPr>
             <a:lvl4pPr>
-              <a:defRPr sz="8600"/>
+              <a:defRPr sz="5559"/>
             </a:lvl4pPr>
             <a:lvl5pPr>
-              <a:defRPr sz="8600"/>
+              <a:defRPr sz="5559"/>
             </a:lvl5pPr>
             <a:lvl6pPr>
-              <a:defRPr sz="8600"/>
+              <a:defRPr sz="5559"/>
             </a:lvl6pPr>
             <a:lvl7pPr>
-              <a:defRPr sz="8600"/>
+              <a:defRPr sz="5559"/>
             </a:lvl7pPr>
             <a:lvl8pPr>
-              <a:defRPr sz="8600"/>
+              <a:defRPr sz="5559"/>
             </a:lvl8pPr>
             <a:lvl9pPr>
-              <a:defRPr sz="8600"/>
+              <a:defRPr sz="5559"/>
             </a:lvl9pPr>
           </a:lstStyle>
           <a:p>
@@ -1242,39 +1242,39 @@
         </p:nvSpPr>
         <p:spPr>
           <a:xfrm>
-            <a:off x="105704642" y="36865560"/>
-            <a:ext cx="94442280" cy="104279702"/>
+            <a:off x="70469762" y="24577040"/>
+            <a:ext cx="62961520" cy="69519803"/>
           </a:xfrm>
         </p:spPr>
         <p:txBody>
           <a:bodyPr/>
           <a:lstStyle>
             <a:lvl1pPr>
-              <a:defRPr sz="13400"/>
+              <a:defRPr sz="8662"/>
             </a:lvl1pPr>
             <a:lvl2pPr>
-              <a:defRPr sz="11500"/>
+              <a:defRPr sz="7435"/>
             </a:lvl2pPr>
             <a:lvl3pPr>
-              <a:defRPr sz="9600"/>
+              <a:defRPr sz="6206"/>
             </a:lvl3pPr>
             <a:lvl4pPr>
-              <a:defRPr sz="8600"/>
+              <a:defRPr sz="5559"/>
             </a:lvl4pPr>
             <a:lvl5pPr>
-              <a:defRPr sz="8600"/>
+              <a:defRPr sz="5559"/>
             </a:lvl5pPr>
             <a:lvl6pPr>
-              <a:defRPr sz="8600"/>
+              <a:defRPr sz="5559"/>
             </a:lvl6pPr>
             <a:lvl7pPr>
-              <a:defRPr sz="8600"/>
+              <a:defRPr sz="5559"/>
             </a:lvl7pPr>
             <a:lvl8pPr>
-              <a:defRPr sz="8600"/>
+              <a:defRPr sz="5559"/>
             </a:lvl8pPr>
             <a:lvl9pPr>
-              <a:defRPr sz="8600"/>
+              <a:defRPr sz="5559"/>
             </a:lvl9pPr>
           </a:lstStyle>
           <a:p>
@@ -1332,7 +1332,7 @@
             <a:fld id="{E2252522-108F-2A4E-9BBA-FBA30AE411DB}" type="datetimeFigureOut">
               <a:rPr lang="en-US" smtClean="0"/>
               <a:pPr/>
-              <a:t>6/8/25</a:t>
+              <a:t>6/13/25</a:t>
             </a:fld>
             <a:endParaRPr lang="en-US"/>
           </a:p>
@@ -1418,8 +1418,8 @@
         </p:nvSpPr>
         <p:spPr>
           <a:xfrm>
-            <a:off x="2194560" y="1318262"/>
-            <a:ext cx="39502080" cy="5486400"/>
+            <a:off x="1463040" y="878842"/>
+            <a:ext cx="26334720" cy="3657600"/>
           </a:xfrm>
         </p:spPr>
         <p:txBody>
@@ -1449,8 +1449,8 @@
         </p:nvSpPr>
         <p:spPr>
           <a:xfrm>
-            <a:off x="2194560" y="7368542"/>
-            <a:ext cx="19392902" cy="3070858"/>
+            <a:off x="1463043" y="4912362"/>
+            <a:ext cx="12928602" cy="2047239"/>
           </a:xfrm>
         </p:spPr>
         <p:txBody>
@@ -1458,39 +1458,39 @@
           <a:lstStyle>
             <a:lvl1pPr marL="0" indent="0">
               <a:buNone/>
-              <a:defRPr sz="11500" b="1"/>
+              <a:defRPr sz="7435" b="1"/>
             </a:lvl1pPr>
-            <a:lvl2pPr marL="2194560" indent="0">
+            <a:lvl2pPr marL="1418692" indent="0">
               <a:buNone/>
-              <a:defRPr sz="9600" b="1"/>
+              <a:defRPr sz="6206" b="1"/>
             </a:lvl2pPr>
-            <a:lvl3pPr marL="4389120" indent="0">
+            <a:lvl3pPr marL="2837385" indent="0">
               <a:buNone/>
-              <a:defRPr sz="8600" b="1"/>
+              <a:defRPr sz="5559" b="1"/>
             </a:lvl3pPr>
-            <a:lvl4pPr marL="6583680" indent="0">
+            <a:lvl4pPr marL="4256076" indent="0">
               <a:buNone/>
-              <a:defRPr sz="7700" b="1"/>
+              <a:defRPr sz="4977" b="1"/>
             </a:lvl4pPr>
-            <a:lvl5pPr marL="8778240" indent="0">
+            <a:lvl5pPr marL="5674769" indent="0">
               <a:buNone/>
-              <a:defRPr sz="7700" b="1"/>
+              <a:defRPr sz="4977" b="1"/>
             </a:lvl5pPr>
-            <a:lvl6pPr marL="10972800" indent="0">
+            <a:lvl6pPr marL="7093461" indent="0">
               <a:buNone/>
-              <a:defRPr sz="7700" b="1"/>
+              <a:defRPr sz="4977" b="1"/>
             </a:lvl6pPr>
-            <a:lvl7pPr marL="13167360" indent="0">
+            <a:lvl7pPr marL="8512153" indent="0">
               <a:buNone/>
-              <a:defRPr sz="7700" b="1"/>
+              <a:defRPr sz="4977" b="1"/>
             </a:lvl7pPr>
-            <a:lvl8pPr marL="15361920" indent="0">
+            <a:lvl8pPr marL="9930845" indent="0">
               <a:buNone/>
-              <a:defRPr sz="7700" b="1"/>
+              <a:defRPr sz="4977" b="1"/>
             </a:lvl8pPr>
-            <a:lvl9pPr marL="17556480" indent="0">
+            <a:lvl9pPr marL="11349538" indent="0">
               <a:buNone/>
-              <a:defRPr sz="7700" b="1"/>
+              <a:defRPr sz="4977" b="1"/>
             </a:lvl9pPr>
           </a:lstStyle>
           <a:p>
@@ -1514,39 +1514,39 @@
         </p:nvSpPr>
         <p:spPr>
           <a:xfrm>
-            <a:off x="2194560" y="10439400"/>
-            <a:ext cx="19392902" cy="18966182"/>
+            <a:off x="1463043" y="6959601"/>
+            <a:ext cx="12928602" cy="12644123"/>
           </a:xfrm>
         </p:spPr>
         <p:txBody>
           <a:bodyPr/>
           <a:lstStyle>
             <a:lvl1pPr>
-              <a:defRPr sz="11500"/>
+              <a:defRPr sz="7435"/>
             </a:lvl1pPr>
             <a:lvl2pPr>
-              <a:defRPr sz="9600"/>
+              <a:defRPr sz="6206"/>
             </a:lvl2pPr>
             <a:lvl3pPr>
-              <a:defRPr sz="8600"/>
+              <a:defRPr sz="5559"/>
             </a:lvl3pPr>
             <a:lvl4pPr>
-              <a:defRPr sz="7700"/>
+              <a:defRPr sz="4977"/>
             </a:lvl4pPr>
             <a:lvl5pPr>
-              <a:defRPr sz="7700"/>
+              <a:defRPr sz="4977"/>
             </a:lvl5pPr>
             <a:lvl6pPr>
-              <a:defRPr sz="7700"/>
+              <a:defRPr sz="4977"/>
             </a:lvl6pPr>
             <a:lvl7pPr>
-              <a:defRPr sz="7700"/>
+              <a:defRPr sz="4977"/>
             </a:lvl7pPr>
             <a:lvl8pPr>
-              <a:defRPr sz="7700"/>
+              <a:defRPr sz="4977"/>
             </a:lvl8pPr>
             <a:lvl9pPr>
-              <a:defRPr sz="7700"/>
+              <a:defRPr sz="4977"/>
             </a:lvl9pPr>
           </a:lstStyle>
           <a:p>
@@ -1598,8 +1598,8 @@
         </p:nvSpPr>
         <p:spPr>
           <a:xfrm>
-            <a:off x="22296122" y="7368542"/>
-            <a:ext cx="19400520" cy="3070858"/>
+            <a:off x="14864081" y="4912362"/>
+            <a:ext cx="12933680" cy="2047239"/>
           </a:xfrm>
         </p:spPr>
         <p:txBody>
@@ -1607,39 +1607,39 @@
           <a:lstStyle>
             <a:lvl1pPr marL="0" indent="0">
               <a:buNone/>
-              <a:defRPr sz="11500" b="1"/>
+              <a:defRPr sz="7435" b="1"/>
             </a:lvl1pPr>
-            <a:lvl2pPr marL="2194560" indent="0">
+            <a:lvl2pPr marL="1418692" indent="0">
               <a:buNone/>
-              <a:defRPr sz="9600" b="1"/>
+              <a:defRPr sz="6206" b="1"/>
             </a:lvl2pPr>
-            <a:lvl3pPr marL="4389120" indent="0">
+            <a:lvl3pPr marL="2837385" indent="0">
               <a:buNone/>
-              <a:defRPr sz="8600" b="1"/>
+              <a:defRPr sz="5559" b="1"/>
             </a:lvl3pPr>
-            <a:lvl4pPr marL="6583680" indent="0">
+            <a:lvl4pPr marL="4256076" indent="0">
               <a:buNone/>
-              <a:defRPr sz="7700" b="1"/>
+              <a:defRPr sz="4977" b="1"/>
             </a:lvl4pPr>
-            <a:lvl5pPr marL="8778240" indent="0">
+            <a:lvl5pPr marL="5674769" indent="0">
               <a:buNone/>
-              <a:defRPr sz="7700" b="1"/>
+              <a:defRPr sz="4977" b="1"/>
             </a:lvl5pPr>
-            <a:lvl6pPr marL="10972800" indent="0">
+            <a:lvl6pPr marL="7093461" indent="0">
               <a:buNone/>
-              <a:defRPr sz="7700" b="1"/>
+              <a:defRPr sz="4977" b="1"/>
             </a:lvl6pPr>
-            <a:lvl7pPr marL="13167360" indent="0">
+            <a:lvl7pPr marL="8512153" indent="0">
               <a:buNone/>
-              <a:defRPr sz="7700" b="1"/>
+              <a:defRPr sz="4977" b="1"/>
             </a:lvl7pPr>
-            <a:lvl8pPr marL="15361920" indent="0">
+            <a:lvl8pPr marL="9930845" indent="0">
               <a:buNone/>
-              <a:defRPr sz="7700" b="1"/>
+              <a:defRPr sz="4977" b="1"/>
             </a:lvl8pPr>
-            <a:lvl9pPr marL="17556480" indent="0">
+            <a:lvl9pPr marL="11349538" indent="0">
               <a:buNone/>
-              <a:defRPr sz="7700" b="1"/>
+              <a:defRPr sz="4977" b="1"/>
             </a:lvl9pPr>
           </a:lstStyle>
           <a:p>
@@ -1663,39 +1663,39 @@
         </p:nvSpPr>
         <p:spPr>
           <a:xfrm>
-            <a:off x="22296122" y="10439400"/>
-            <a:ext cx="19400520" cy="18966182"/>
+            <a:off x="14864081" y="6959601"/>
+            <a:ext cx="12933680" cy="12644123"/>
           </a:xfrm>
         </p:spPr>
         <p:txBody>
           <a:bodyPr/>
           <a:lstStyle>
             <a:lvl1pPr>
-              <a:defRPr sz="11500"/>
+              <a:defRPr sz="7435"/>
             </a:lvl1pPr>
             <a:lvl2pPr>
-              <a:defRPr sz="9600"/>
+              <a:defRPr sz="6206"/>
             </a:lvl2pPr>
             <a:lvl3pPr>
-              <a:defRPr sz="8600"/>
+              <a:defRPr sz="5559"/>
             </a:lvl3pPr>
             <a:lvl4pPr>
-              <a:defRPr sz="7700"/>
+              <a:defRPr sz="4977"/>
             </a:lvl4pPr>
             <a:lvl5pPr>
-              <a:defRPr sz="7700"/>
+              <a:defRPr sz="4977"/>
             </a:lvl5pPr>
             <a:lvl6pPr>
-              <a:defRPr sz="7700"/>
+              <a:defRPr sz="4977"/>
             </a:lvl6pPr>
             <a:lvl7pPr>
-              <a:defRPr sz="7700"/>
+              <a:defRPr sz="4977"/>
             </a:lvl7pPr>
             <a:lvl8pPr>
-              <a:defRPr sz="7700"/>
+              <a:defRPr sz="4977"/>
             </a:lvl8pPr>
             <a:lvl9pPr>
-              <a:defRPr sz="7700"/>
+              <a:defRPr sz="4977"/>
             </a:lvl9pPr>
           </a:lstStyle>
           <a:p>
@@ -1753,7 +1753,7 @@
             <a:fld id="{E2252522-108F-2A4E-9BBA-FBA30AE411DB}" type="datetimeFigureOut">
               <a:rPr lang="en-US" smtClean="0"/>
               <a:pPr/>
-              <a:t>6/8/25</a:t>
+              <a:t>6/13/25</a:t>
             </a:fld>
             <a:endParaRPr lang="en-US"/>
           </a:p>
@@ -1867,7 +1867,7 @@
             <a:fld id="{E2252522-108F-2A4E-9BBA-FBA30AE411DB}" type="datetimeFigureOut">
               <a:rPr lang="en-US" smtClean="0"/>
               <a:pPr/>
-              <a:t>6/8/25</a:t>
+              <a:t>6/13/25</a:t>
             </a:fld>
             <a:endParaRPr lang="en-US"/>
           </a:p>
@@ -1959,7 +1959,7 @@
             <a:fld id="{E2252522-108F-2A4E-9BBA-FBA30AE411DB}" type="datetimeFigureOut">
               <a:rPr lang="en-US" smtClean="0"/>
               <a:pPr/>
-              <a:t>6/8/25</a:t>
+              <a:t>6/13/25</a:t>
             </a:fld>
             <a:endParaRPr lang="en-US"/>
           </a:p>
@@ -2045,15 +2045,15 @@
         </p:nvSpPr>
         <p:spPr>
           <a:xfrm>
-            <a:off x="2194563" y="1310640"/>
-            <a:ext cx="14439902" cy="5577840"/>
+            <a:off x="1463043" y="873760"/>
+            <a:ext cx="9626602" cy="3718560"/>
           </a:xfrm>
         </p:spPr>
         <p:txBody>
           <a:bodyPr anchor="b"/>
           <a:lstStyle>
             <a:lvl1pPr algn="l">
-              <a:defRPr sz="9600" b="1"/>
+              <a:defRPr sz="6206" b="1"/>
             </a:lvl1pPr>
           </a:lstStyle>
           <a:p>
@@ -2076,39 +2076,39 @@
         </p:nvSpPr>
         <p:spPr>
           <a:xfrm>
-            <a:off x="17160240" y="1310643"/>
-            <a:ext cx="24536400" cy="28094942"/>
+            <a:off x="11440160" y="873762"/>
+            <a:ext cx="16357600" cy="18729963"/>
           </a:xfrm>
         </p:spPr>
         <p:txBody>
           <a:bodyPr/>
           <a:lstStyle>
             <a:lvl1pPr>
-              <a:defRPr sz="15400"/>
+              <a:defRPr sz="9956"/>
             </a:lvl1pPr>
             <a:lvl2pPr>
-              <a:defRPr sz="13400"/>
+              <a:defRPr sz="8662"/>
             </a:lvl2pPr>
             <a:lvl3pPr>
-              <a:defRPr sz="11500"/>
+              <a:defRPr sz="7435"/>
             </a:lvl3pPr>
             <a:lvl4pPr>
-              <a:defRPr sz="9600"/>
+              <a:defRPr sz="6206"/>
             </a:lvl4pPr>
             <a:lvl5pPr>
-              <a:defRPr sz="9600"/>
+              <a:defRPr sz="6206"/>
             </a:lvl5pPr>
             <a:lvl6pPr>
-              <a:defRPr sz="9600"/>
+              <a:defRPr sz="6206"/>
             </a:lvl6pPr>
             <a:lvl7pPr>
-              <a:defRPr sz="9600"/>
+              <a:defRPr sz="6206"/>
             </a:lvl7pPr>
             <a:lvl8pPr>
-              <a:defRPr sz="9600"/>
+              <a:defRPr sz="6206"/>
             </a:lvl8pPr>
             <a:lvl9pPr>
-              <a:defRPr sz="9600"/>
+              <a:defRPr sz="6206"/>
             </a:lvl9pPr>
           </a:lstStyle>
           <a:p>
@@ -2160,8 +2160,8 @@
         </p:nvSpPr>
         <p:spPr>
           <a:xfrm>
-            <a:off x="2194563" y="6888483"/>
-            <a:ext cx="14439902" cy="22517102"/>
+            <a:off x="1463043" y="4592323"/>
+            <a:ext cx="9626602" cy="15011403"/>
           </a:xfrm>
         </p:spPr>
         <p:txBody>
@@ -2169,39 +2169,39 @@
           <a:lstStyle>
             <a:lvl1pPr marL="0" indent="0">
               <a:buNone/>
-              <a:defRPr sz="6700"/>
+              <a:defRPr sz="4332"/>
             </a:lvl1pPr>
-            <a:lvl2pPr marL="2194560" indent="0">
+            <a:lvl2pPr marL="1418692" indent="0">
               <a:buNone/>
-              <a:defRPr sz="5800"/>
+              <a:defRPr sz="3750"/>
             </a:lvl2pPr>
-            <a:lvl3pPr marL="4389120" indent="0">
+            <a:lvl3pPr marL="2837385" indent="0">
               <a:buNone/>
-              <a:defRPr sz="4800"/>
+              <a:defRPr sz="3103"/>
             </a:lvl3pPr>
-            <a:lvl4pPr marL="6583680" indent="0">
+            <a:lvl4pPr marL="4256076" indent="0">
               <a:buNone/>
-              <a:defRPr sz="4300"/>
+              <a:defRPr sz="2780"/>
             </a:lvl4pPr>
-            <a:lvl5pPr marL="8778240" indent="0">
+            <a:lvl5pPr marL="5674769" indent="0">
               <a:buNone/>
-              <a:defRPr sz="4300"/>
+              <a:defRPr sz="2780"/>
             </a:lvl5pPr>
-            <a:lvl6pPr marL="10972800" indent="0">
+            <a:lvl6pPr marL="7093461" indent="0">
               <a:buNone/>
-              <a:defRPr sz="4300"/>
+              <a:defRPr sz="2780"/>
             </a:lvl6pPr>
-            <a:lvl7pPr marL="13167360" indent="0">
+            <a:lvl7pPr marL="8512153" indent="0">
               <a:buNone/>
-              <a:defRPr sz="4300"/>
+              <a:defRPr sz="2780"/>
             </a:lvl7pPr>
-            <a:lvl8pPr marL="15361920" indent="0">
+            <a:lvl8pPr marL="9930845" indent="0">
               <a:buNone/>
-              <a:defRPr sz="4300"/>
+              <a:defRPr sz="2780"/>
             </a:lvl8pPr>
-            <a:lvl9pPr marL="17556480" indent="0">
+            <a:lvl9pPr marL="11349538" indent="0">
               <a:buNone/>
-              <a:defRPr sz="4300"/>
+              <a:defRPr sz="2780"/>
             </a:lvl9pPr>
           </a:lstStyle>
           <a:p>
@@ -2231,7 +2231,7 @@
             <a:fld id="{E2252522-108F-2A4E-9BBA-FBA30AE411DB}" type="datetimeFigureOut">
               <a:rPr lang="en-US" smtClean="0"/>
               <a:pPr/>
-              <a:t>6/8/25</a:t>
+              <a:t>6/13/25</a:t>
             </a:fld>
             <a:endParaRPr lang="en-US"/>
           </a:p>
@@ -2317,15 +2317,15 @@
         </p:nvSpPr>
         <p:spPr>
           <a:xfrm>
-            <a:off x="8602982" y="23042880"/>
-            <a:ext cx="26334720" cy="2720342"/>
+            <a:off x="5735322" y="15361921"/>
+            <a:ext cx="17556480" cy="1813563"/>
           </a:xfrm>
         </p:spPr>
         <p:txBody>
           <a:bodyPr anchor="b"/>
           <a:lstStyle>
             <a:lvl1pPr algn="l">
-              <a:defRPr sz="9600" b="1"/>
+              <a:defRPr sz="6206" b="1"/>
             </a:lvl1pPr>
           </a:lstStyle>
           <a:p>
@@ -2348,8 +2348,8 @@
         </p:nvSpPr>
         <p:spPr>
           <a:xfrm>
-            <a:off x="8602982" y="2941320"/>
-            <a:ext cx="26334720" cy="19751040"/>
+            <a:off x="5735322" y="1960880"/>
+            <a:ext cx="17556480" cy="13167360"/>
           </a:xfrm>
         </p:spPr>
         <p:txBody>
@@ -2357,39 +2357,39 @@
           <a:lstStyle>
             <a:lvl1pPr marL="0" indent="0">
               <a:buNone/>
-              <a:defRPr sz="15400"/>
+              <a:defRPr sz="9956"/>
             </a:lvl1pPr>
-            <a:lvl2pPr marL="2194560" indent="0">
+            <a:lvl2pPr marL="1418692" indent="0">
               <a:buNone/>
-              <a:defRPr sz="13400"/>
+              <a:defRPr sz="8662"/>
             </a:lvl2pPr>
-            <a:lvl3pPr marL="4389120" indent="0">
+            <a:lvl3pPr marL="2837385" indent="0">
               <a:buNone/>
-              <a:defRPr sz="11500"/>
+              <a:defRPr sz="7435"/>
             </a:lvl3pPr>
-            <a:lvl4pPr marL="6583680" indent="0">
+            <a:lvl4pPr marL="4256076" indent="0">
               <a:buNone/>
-              <a:defRPr sz="9600"/>
+              <a:defRPr sz="6206"/>
             </a:lvl4pPr>
-            <a:lvl5pPr marL="8778240" indent="0">
+            <a:lvl5pPr marL="5674769" indent="0">
               <a:buNone/>
-              <a:defRPr sz="9600"/>
+              <a:defRPr sz="6206"/>
             </a:lvl5pPr>
-            <a:lvl6pPr marL="10972800" indent="0">
+            <a:lvl6pPr marL="7093461" indent="0">
               <a:buNone/>
-              <a:defRPr sz="9600"/>
+              <a:defRPr sz="6206"/>
             </a:lvl6pPr>
-            <a:lvl7pPr marL="13167360" indent="0">
+            <a:lvl7pPr marL="8512153" indent="0">
               <a:buNone/>
-              <a:defRPr sz="9600"/>
+              <a:defRPr sz="6206"/>
             </a:lvl7pPr>
-            <a:lvl8pPr marL="15361920" indent="0">
+            <a:lvl8pPr marL="9930845" indent="0">
               <a:buNone/>
-              <a:defRPr sz="9600"/>
+              <a:defRPr sz="6206"/>
             </a:lvl8pPr>
-            <a:lvl9pPr marL="17556480" indent="0">
+            <a:lvl9pPr marL="11349538" indent="0">
               <a:buNone/>
-              <a:defRPr sz="9600"/>
+              <a:defRPr sz="6206"/>
             </a:lvl9pPr>
           </a:lstStyle>
           <a:p>
@@ -2409,8 +2409,8 @@
         </p:nvSpPr>
         <p:spPr>
           <a:xfrm>
-            <a:off x="8602982" y="25763222"/>
-            <a:ext cx="26334720" cy="3863338"/>
+            <a:off x="5735322" y="17175482"/>
+            <a:ext cx="17556480" cy="2575559"/>
           </a:xfrm>
         </p:spPr>
         <p:txBody>
@@ -2418,39 +2418,39 @@
           <a:lstStyle>
             <a:lvl1pPr marL="0" indent="0">
               <a:buNone/>
-              <a:defRPr sz="6700"/>
+              <a:defRPr sz="4332"/>
             </a:lvl1pPr>
-            <a:lvl2pPr marL="2194560" indent="0">
+            <a:lvl2pPr marL="1418692" indent="0">
               <a:buNone/>
-              <a:defRPr sz="5800"/>
+              <a:defRPr sz="3750"/>
             </a:lvl2pPr>
-            <a:lvl3pPr marL="4389120" indent="0">
+            <a:lvl3pPr marL="2837385" indent="0">
               <a:buNone/>
-              <a:defRPr sz="4800"/>
+              <a:defRPr sz="3103"/>
             </a:lvl3pPr>
-            <a:lvl4pPr marL="6583680" indent="0">
+            <a:lvl4pPr marL="4256076" indent="0">
               <a:buNone/>
-              <a:defRPr sz="4300"/>
+              <a:defRPr sz="2780"/>
             </a:lvl4pPr>
-            <a:lvl5pPr marL="8778240" indent="0">
+            <a:lvl5pPr marL="5674769" indent="0">
               <a:buNone/>
-              <a:defRPr sz="4300"/>
+              <a:defRPr sz="2780"/>
             </a:lvl5pPr>
-            <a:lvl6pPr marL="10972800" indent="0">
+            <a:lvl6pPr marL="7093461" indent="0">
               <a:buNone/>
-              <a:defRPr sz="4300"/>
+              <a:defRPr sz="2780"/>
             </a:lvl6pPr>
-            <a:lvl7pPr marL="13167360" indent="0">
+            <a:lvl7pPr marL="8512153" indent="0">
               <a:buNone/>
-              <a:defRPr sz="4300"/>
+              <a:defRPr sz="2780"/>
             </a:lvl7pPr>
-            <a:lvl8pPr marL="15361920" indent="0">
+            <a:lvl8pPr marL="9930845" indent="0">
               <a:buNone/>
-              <a:defRPr sz="4300"/>
+              <a:defRPr sz="2780"/>
             </a:lvl8pPr>
-            <a:lvl9pPr marL="17556480" indent="0">
+            <a:lvl9pPr marL="11349538" indent="0">
               <a:buNone/>
-              <a:defRPr sz="4300"/>
+              <a:defRPr sz="2780"/>
             </a:lvl9pPr>
           </a:lstStyle>
           <a:p>
@@ -2480,7 +2480,7 @@
             <a:fld id="{E2252522-108F-2A4E-9BBA-FBA30AE411DB}" type="datetimeFigureOut">
               <a:rPr lang="en-US" smtClean="0"/>
               <a:pPr/>
-              <a:t>6/8/25</a:t>
+              <a:t>6/13/25</a:t>
             </a:fld>
             <a:endParaRPr lang="en-US"/>
           </a:p>
@@ -2571,8 +2571,8 @@
         </p:nvSpPr>
         <p:spPr>
           <a:xfrm>
-            <a:off x="2194560" y="1318262"/>
-            <a:ext cx="39502080" cy="5486400"/>
+            <a:off x="1463040" y="878842"/>
+            <a:ext cx="26334720" cy="3657600"/>
           </a:xfrm>
           <a:prstGeom prst="rect">
             <a:avLst/>
@@ -2603,8 +2603,8 @@
         </p:nvSpPr>
         <p:spPr>
           <a:xfrm>
-            <a:off x="2194560" y="7680963"/>
-            <a:ext cx="39502080" cy="21724622"/>
+            <a:off x="1463040" y="5120643"/>
+            <a:ext cx="26334720" cy="14483083"/>
           </a:xfrm>
           <a:prstGeom prst="rect">
             <a:avLst/>
@@ -2664,8 +2664,8 @@
         </p:nvSpPr>
         <p:spPr>
           <a:xfrm>
-            <a:off x="2194560" y="30510482"/>
-            <a:ext cx="10241280" cy="1752600"/>
+            <a:off x="1463040" y="20340323"/>
+            <a:ext cx="6827520" cy="1168400"/>
           </a:xfrm>
           <a:prstGeom prst="rect">
             <a:avLst/>
@@ -2675,7 +2675,7 @@
           <a:bodyPr vert="horz" lIns="438912" tIns="219456" rIns="438912" bIns="219456" rtlCol="0" anchor="ctr"/>
           <a:lstStyle>
             <a:lvl1pPr algn="l">
-              <a:defRPr sz="5800">
+              <a:defRPr sz="3750">
                 <a:solidFill>
                   <a:schemeClr val="tx1">
                     <a:tint val="75000"/>
@@ -2688,7 +2688,7 @@
             <a:fld id="{E2252522-108F-2A4E-9BBA-FBA30AE411DB}" type="datetimeFigureOut">
               <a:rPr lang="en-US" smtClean="0"/>
               <a:pPr/>
-              <a:t>6/8/25</a:t>
+              <a:t>6/13/25</a:t>
             </a:fld>
             <a:endParaRPr lang="en-US"/>
           </a:p>
@@ -2706,8 +2706,8 @@
         </p:nvSpPr>
         <p:spPr>
           <a:xfrm>
-            <a:off x="14996160" y="30510482"/>
-            <a:ext cx="13898880" cy="1752600"/>
+            <a:off x="9997440" y="20340323"/>
+            <a:ext cx="9265920" cy="1168400"/>
           </a:xfrm>
           <a:prstGeom prst="rect">
             <a:avLst/>
@@ -2717,7 +2717,7 @@
           <a:bodyPr vert="horz" lIns="438912" tIns="219456" rIns="438912" bIns="219456" rtlCol="0" anchor="ctr"/>
           <a:lstStyle>
             <a:lvl1pPr algn="ctr">
-              <a:defRPr sz="5800">
+              <a:defRPr sz="3750">
                 <a:solidFill>
                   <a:schemeClr val="tx1">
                     <a:tint val="75000"/>
@@ -2743,8 +2743,8 @@
         </p:nvSpPr>
         <p:spPr>
           <a:xfrm>
-            <a:off x="31455360" y="30510482"/>
-            <a:ext cx="10241280" cy="1752600"/>
+            <a:off x="20970240" y="20340323"/>
+            <a:ext cx="6827520" cy="1168400"/>
           </a:xfrm>
           <a:prstGeom prst="rect">
             <a:avLst/>
@@ -2754,7 +2754,7 @@
           <a:bodyPr vert="horz" lIns="438912" tIns="219456" rIns="438912" bIns="219456" rtlCol="0" anchor="ctr"/>
           <a:lstStyle>
             <a:lvl1pPr algn="r">
-              <a:defRPr sz="5800">
+              <a:defRPr sz="3750">
                 <a:solidFill>
                   <a:schemeClr val="tx1">
                     <a:tint val="75000"/>
@@ -2791,12 +2791,12 @@
   </p:sldLayoutIdLst>
   <p:txStyles>
     <p:titleStyle>
-      <a:lvl1pPr algn="ctr" defTabSz="2194560" rtl="0" eaLnBrk="1" latinLnBrk="0" hangingPunct="1">
+      <a:lvl1pPr algn="ctr" defTabSz="1418692" rtl="0" eaLnBrk="1" latinLnBrk="0" hangingPunct="1">
         <a:spcBef>
           <a:spcPct val="0"/>
         </a:spcBef>
         <a:buNone/>
-        <a:defRPr sz="21100" kern="1200">
+        <a:defRPr sz="13640" kern="1200">
           <a:solidFill>
             <a:schemeClr val="tx1"/>
           </a:solidFill>
@@ -2807,13 +2807,13 @@
       </a:lvl1pPr>
     </p:titleStyle>
     <p:bodyStyle>
-      <a:lvl1pPr marL="1645920" indent="-1645920" algn="l" defTabSz="2194560" rtl="0" eaLnBrk="1" latinLnBrk="0" hangingPunct="1">
+      <a:lvl1pPr marL="1064019" indent="-1064019" algn="l" defTabSz="1418692" rtl="0" eaLnBrk="1" latinLnBrk="0" hangingPunct="1">
         <a:spcBef>
           <a:spcPct val="20000"/>
         </a:spcBef>
         <a:buFont typeface="Arial"/>
         <a:buChar char="•"/>
-        <a:defRPr sz="15400" kern="1200">
+        <a:defRPr sz="9956" kern="1200">
           <a:solidFill>
             <a:schemeClr val="tx1"/>
           </a:solidFill>
@@ -2822,13 +2822,13 @@
           <a:cs typeface="+mn-cs"/>
         </a:defRPr>
       </a:lvl1pPr>
-      <a:lvl2pPr marL="3566160" indent="-1371600" algn="l" defTabSz="2194560" rtl="0" eaLnBrk="1" latinLnBrk="0" hangingPunct="1">
+      <a:lvl2pPr marL="2305374" indent="-886683" algn="l" defTabSz="1418692" rtl="0" eaLnBrk="1" latinLnBrk="0" hangingPunct="1">
         <a:spcBef>
           <a:spcPct val="20000"/>
         </a:spcBef>
         <a:buFont typeface="Arial"/>
         <a:buChar char="–"/>
-        <a:defRPr sz="13400" kern="1200">
+        <a:defRPr sz="8662" kern="1200">
           <a:solidFill>
             <a:schemeClr val="tx1"/>
           </a:solidFill>
@@ -2837,13 +2837,13 @@
           <a:cs typeface="+mn-cs"/>
         </a:defRPr>
       </a:lvl2pPr>
-      <a:lvl3pPr marL="5486400" indent="-1097280" algn="l" defTabSz="2194560" rtl="0" eaLnBrk="1" latinLnBrk="0" hangingPunct="1">
+      <a:lvl3pPr marL="3546730" indent="-709346" algn="l" defTabSz="1418692" rtl="0" eaLnBrk="1" latinLnBrk="0" hangingPunct="1">
         <a:spcBef>
           <a:spcPct val="20000"/>
         </a:spcBef>
         <a:buFont typeface="Arial"/>
         <a:buChar char="•"/>
-        <a:defRPr sz="11500" kern="1200">
+        <a:defRPr sz="7435" kern="1200">
           <a:solidFill>
             <a:schemeClr val="tx1"/>
           </a:solidFill>
@@ -2852,13 +2852,13 @@
           <a:cs typeface="+mn-cs"/>
         </a:defRPr>
       </a:lvl3pPr>
-      <a:lvl4pPr marL="7680960" indent="-1097280" algn="l" defTabSz="2194560" rtl="0" eaLnBrk="1" latinLnBrk="0" hangingPunct="1">
+      <a:lvl4pPr marL="4965423" indent="-709346" algn="l" defTabSz="1418692" rtl="0" eaLnBrk="1" latinLnBrk="0" hangingPunct="1">
         <a:spcBef>
           <a:spcPct val="20000"/>
         </a:spcBef>
         <a:buFont typeface="Arial"/>
         <a:buChar char="–"/>
-        <a:defRPr sz="9600" kern="1200">
+        <a:defRPr sz="6206" kern="1200">
           <a:solidFill>
             <a:schemeClr val="tx1"/>
           </a:solidFill>
@@ -2867,13 +2867,13 @@
           <a:cs typeface="+mn-cs"/>
         </a:defRPr>
       </a:lvl4pPr>
-      <a:lvl5pPr marL="9875520" indent="-1097280" algn="l" defTabSz="2194560" rtl="0" eaLnBrk="1" latinLnBrk="0" hangingPunct="1">
+      <a:lvl5pPr marL="6384115" indent="-709346" algn="l" defTabSz="1418692" rtl="0" eaLnBrk="1" latinLnBrk="0" hangingPunct="1">
         <a:spcBef>
           <a:spcPct val="20000"/>
         </a:spcBef>
         <a:buFont typeface="Arial"/>
         <a:buChar char="»"/>
-        <a:defRPr sz="9600" kern="1200">
+        <a:defRPr sz="6206" kern="1200">
           <a:solidFill>
             <a:schemeClr val="tx1"/>
           </a:solidFill>
@@ -2882,13 +2882,13 @@
           <a:cs typeface="+mn-cs"/>
         </a:defRPr>
       </a:lvl5pPr>
-      <a:lvl6pPr marL="12070080" indent="-1097280" algn="l" defTabSz="2194560" rtl="0" eaLnBrk="1" latinLnBrk="0" hangingPunct="1">
+      <a:lvl6pPr marL="7802807" indent="-709346" algn="l" defTabSz="1418692" rtl="0" eaLnBrk="1" latinLnBrk="0" hangingPunct="1">
         <a:spcBef>
           <a:spcPct val="20000"/>
         </a:spcBef>
         <a:buFont typeface="Arial"/>
         <a:buChar char="•"/>
-        <a:defRPr sz="9600" kern="1200">
+        <a:defRPr sz="6206" kern="1200">
           <a:solidFill>
             <a:schemeClr val="tx1"/>
           </a:solidFill>
@@ -2897,13 +2897,13 @@
           <a:cs typeface="+mn-cs"/>
         </a:defRPr>
       </a:lvl6pPr>
-      <a:lvl7pPr marL="14264640" indent="-1097280" algn="l" defTabSz="2194560" rtl="0" eaLnBrk="1" latinLnBrk="0" hangingPunct="1">
+      <a:lvl7pPr marL="9221499" indent="-709346" algn="l" defTabSz="1418692" rtl="0" eaLnBrk="1" latinLnBrk="0" hangingPunct="1">
         <a:spcBef>
           <a:spcPct val="20000"/>
         </a:spcBef>
         <a:buFont typeface="Arial"/>
         <a:buChar char="•"/>
-        <a:defRPr sz="9600" kern="1200">
+        <a:defRPr sz="6206" kern="1200">
           <a:solidFill>
             <a:schemeClr val="tx1"/>
           </a:solidFill>
@@ -2912,13 +2912,13 @@
           <a:cs typeface="+mn-cs"/>
         </a:defRPr>
       </a:lvl7pPr>
-      <a:lvl8pPr marL="16459200" indent="-1097280" algn="l" defTabSz="2194560" rtl="0" eaLnBrk="1" latinLnBrk="0" hangingPunct="1">
+      <a:lvl8pPr marL="10640191" indent="-709346" algn="l" defTabSz="1418692" rtl="0" eaLnBrk="1" latinLnBrk="0" hangingPunct="1">
         <a:spcBef>
           <a:spcPct val="20000"/>
         </a:spcBef>
         <a:buFont typeface="Arial"/>
         <a:buChar char="•"/>
-        <a:defRPr sz="9600" kern="1200">
+        <a:defRPr sz="6206" kern="1200">
           <a:solidFill>
             <a:schemeClr val="tx1"/>
           </a:solidFill>
@@ -2927,13 +2927,13 @@
           <a:cs typeface="+mn-cs"/>
         </a:defRPr>
       </a:lvl8pPr>
-      <a:lvl9pPr marL="18653760" indent="-1097280" algn="l" defTabSz="2194560" rtl="0" eaLnBrk="1" latinLnBrk="0" hangingPunct="1">
+      <a:lvl9pPr marL="12058884" indent="-709346" algn="l" defTabSz="1418692" rtl="0" eaLnBrk="1" latinLnBrk="0" hangingPunct="1">
         <a:spcBef>
           <a:spcPct val="20000"/>
         </a:spcBef>
         <a:buFont typeface="Arial"/>
         <a:buChar char="•"/>
-        <a:defRPr sz="9600" kern="1200">
+        <a:defRPr sz="6206" kern="1200">
           <a:solidFill>
             <a:schemeClr val="tx1"/>
           </a:solidFill>
@@ -2947,8 +2947,8 @@
       <a:defPPr>
         <a:defRPr lang="en-US"/>
       </a:defPPr>
-      <a:lvl1pPr marL="0" algn="l" defTabSz="2194560" rtl="0" eaLnBrk="1" latinLnBrk="0" hangingPunct="1">
-        <a:defRPr sz="8600" kern="1200">
+      <a:lvl1pPr marL="0" algn="l" defTabSz="1418692" rtl="0" eaLnBrk="1" latinLnBrk="0" hangingPunct="1">
+        <a:defRPr sz="5559" kern="1200">
           <a:solidFill>
             <a:schemeClr val="tx1"/>
           </a:solidFill>
@@ -2957,8 +2957,8 @@
           <a:cs typeface="+mn-cs"/>
         </a:defRPr>
       </a:lvl1pPr>
-      <a:lvl2pPr marL="2194560" algn="l" defTabSz="2194560" rtl="0" eaLnBrk="1" latinLnBrk="0" hangingPunct="1">
-        <a:defRPr sz="8600" kern="1200">
+      <a:lvl2pPr marL="1418692" algn="l" defTabSz="1418692" rtl="0" eaLnBrk="1" latinLnBrk="0" hangingPunct="1">
+        <a:defRPr sz="5559" kern="1200">
           <a:solidFill>
             <a:schemeClr val="tx1"/>
           </a:solidFill>
@@ -2967,8 +2967,8 @@
           <a:cs typeface="+mn-cs"/>
         </a:defRPr>
       </a:lvl2pPr>
-      <a:lvl3pPr marL="4389120" algn="l" defTabSz="2194560" rtl="0" eaLnBrk="1" latinLnBrk="0" hangingPunct="1">
-        <a:defRPr sz="8600" kern="1200">
+      <a:lvl3pPr marL="2837385" algn="l" defTabSz="1418692" rtl="0" eaLnBrk="1" latinLnBrk="0" hangingPunct="1">
+        <a:defRPr sz="5559" kern="1200">
           <a:solidFill>
             <a:schemeClr val="tx1"/>
           </a:solidFill>
@@ -2977,8 +2977,8 @@
           <a:cs typeface="+mn-cs"/>
         </a:defRPr>
       </a:lvl3pPr>
-      <a:lvl4pPr marL="6583680" algn="l" defTabSz="2194560" rtl="0" eaLnBrk="1" latinLnBrk="0" hangingPunct="1">
-        <a:defRPr sz="8600" kern="1200">
+      <a:lvl4pPr marL="4256076" algn="l" defTabSz="1418692" rtl="0" eaLnBrk="1" latinLnBrk="0" hangingPunct="1">
+        <a:defRPr sz="5559" kern="1200">
           <a:solidFill>
             <a:schemeClr val="tx1"/>
           </a:solidFill>
@@ -2987,8 +2987,8 @@
           <a:cs typeface="+mn-cs"/>
         </a:defRPr>
       </a:lvl4pPr>
-      <a:lvl5pPr marL="8778240" algn="l" defTabSz="2194560" rtl="0" eaLnBrk="1" latinLnBrk="0" hangingPunct="1">
-        <a:defRPr sz="8600" kern="1200">
+      <a:lvl5pPr marL="5674769" algn="l" defTabSz="1418692" rtl="0" eaLnBrk="1" latinLnBrk="0" hangingPunct="1">
+        <a:defRPr sz="5559" kern="1200">
           <a:solidFill>
             <a:schemeClr val="tx1"/>
           </a:solidFill>
@@ -2997,8 +2997,8 @@
           <a:cs typeface="+mn-cs"/>
         </a:defRPr>
       </a:lvl5pPr>
-      <a:lvl6pPr marL="10972800" algn="l" defTabSz="2194560" rtl="0" eaLnBrk="1" latinLnBrk="0" hangingPunct="1">
-        <a:defRPr sz="8600" kern="1200">
+      <a:lvl6pPr marL="7093461" algn="l" defTabSz="1418692" rtl="0" eaLnBrk="1" latinLnBrk="0" hangingPunct="1">
+        <a:defRPr sz="5559" kern="1200">
           <a:solidFill>
             <a:schemeClr val="tx1"/>
           </a:solidFill>
@@ -3007,8 +3007,8 @@
           <a:cs typeface="+mn-cs"/>
         </a:defRPr>
       </a:lvl6pPr>
-      <a:lvl7pPr marL="13167360" algn="l" defTabSz="2194560" rtl="0" eaLnBrk="1" latinLnBrk="0" hangingPunct="1">
-        <a:defRPr sz="8600" kern="1200">
+      <a:lvl7pPr marL="8512153" algn="l" defTabSz="1418692" rtl="0" eaLnBrk="1" latinLnBrk="0" hangingPunct="1">
+        <a:defRPr sz="5559" kern="1200">
           <a:solidFill>
             <a:schemeClr val="tx1"/>
           </a:solidFill>
@@ -3017,8 +3017,8 @@
           <a:cs typeface="+mn-cs"/>
         </a:defRPr>
       </a:lvl7pPr>
-      <a:lvl8pPr marL="15361920" algn="l" defTabSz="2194560" rtl="0" eaLnBrk="1" latinLnBrk="0" hangingPunct="1">
-        <a:defRPr sz="8600" kern="1200">
+      <a:lvl8pPr marL="9930845" algn="l" defTabSz="1418692" rtl="0" eaLnBrk="1" latinLnBrk="0" hangingPunct="1">
+        <a:defRPr sz="5559" kern="1200">
           <a:solidFill>
             <a:schemeClr val="tx1"/>
           </a:solidFill>
@@ -3027,8 +3027,8 @@
           <a:cs typeface="+mn-cs"/>
         </a:defRPr>
       </a:lvl8pPr>
-      <a:lvl9pPr marL="17556480" algn="l" defTabSz="2194560" rtl="0" eaLnBrk="1" latinLnBrk="0" hangingPunct="1">
-        <a:defRPr sz="8600" kern="1200">
+      <a:lvl9pPr marL="11349538" algn="l" defTabSz="1418692" rtl="0" eaLnBrk="1" latinLnBrk="0" hangingPunct="1">
+        <a:defRPr sz="5559" kern="1200">
           <a:solidFill>
             <a:schemeClr val="tx1"/>
           </a:solidFill>
@@ -3075,8 +3075,8 @@
         </p:nvSpPr>
         <p:spPr>
           <a:xfrm>
-            <a:off x="1022520" y="812800"/>
-            <a:ext cx="41964692" cy="31287592"/>
+            <a:off x="1104371" y="857957"/>
+            <a:ext cx="27128689" cy="20226322"/>
           </a:xfrm>
           <a:prstGeom prst="rect">
             <a:avLst/>
@@ -3107,7 +3107,7 @@
           <a:lstStyle/>
           <a:p>
             <a:pPr algn="ctr"/>
-            <a:endParaRPr lang="en-US" sz="1600" dirty="0">
+            <a:endParaRPr lang="en-US" sz="1035" dirty="0">
               <a:solidFill>
                 <a:schemeClr val="tx1"/>
               </a:solidFill>
@@ -3127,8 +3127,8 @@
         </p:nvSpPr>
         <p:spPr>
           <a:xfrm>
-            <a:off x="887054" y="-288586"/>
-            <a:ext cx="41964692" cy="6540816"/>
+            <a:off x="1016798" y="145951"/>
+            <a:ext cx="27128689" cy="4228407"/>
           </a:xfrm>
         </p:spPr>
         <p:txBody>
@@ -3138,60 +3138,60 @@
           <a:lstStyle/>
           <a:p>
             <a:r>
-              <a:rPr lang="en-US" sz="8200" b="1" dirty="0">
+              <a:rPr lang="en-US" sz="5301" b="1" dirty="0">
                 <a:latin typeface="Arial"/>
                 <a:cs typeface="Arial"/>
               </a:rPr>
               <a:t>Evolution of mesoscales in a countable configuration space</a:t>
             </a:r>
             <a:br>
-              <a:rPr lang="en-US" sz="8200" dirty="0">
+              <a:rPr lang="en-US" sz="5301" dirty="0">
                 <a:latin typeface="Arial"/>
                 <a:cs typeface="Arial"/>
               </a:rPr>
             </a:br>
             <a:r>
-              <a:rPr lang="en-US" sz="6700" dirty="0">
+              <a:rPr lang="en-US" sz="4332" dirty="0">
                 <a:latin typeface="Arial"/>
                 <a:cs typeface="Arial"/>
               </a:rPr>
               <a:t>Brian E. </a:t>
             </a:r>
             <a:r>
-              <a:rPr lang="en-US" sz="6700" dirty="0" err="1">
+              <a:rPr lang="en-US" sz="4332" dirty="0" err="1">
                 <a:latin typeface="Arial"/>
                 <a:cs typeface="Arial"/>
               </a:rPr>
               <a:t>Mapes</a:t>
             </a:r>
             <a:r>
-              <a:rPr lang="en-US" sz="6700" dirty="0">
+              <a:rPr lang="en-US" sz="4332" dirty="0">
                 <a:latin typeface="Arial"/>
                 <a:cs typeface="Arial"/>
               </a:rPr>
               <a:t>, University of Miami</a:t>
             </a:r>
             <a:br>
-              <a:rPr lang="en-US" sz="6700" dirty="0">
+              <a:rPr lang="en-US" sz="4332" dirty="0">
                 <a:latin typeface="Arial"/>
                 <a:cs typeface="Arial"/>
               </a:rPr>
             </a:br>
             <a:r>
-              <a:rPr lang="en-US" sz="6700" dirty="0">
+              <a:rPr lang="en-US" sz="4332" dirty="0">
                 <a:latin typeface="Arial"/>
                 <a:cs typeface="Arial"/>
               </a:rPr>
               <a:t>mapes or </a:t>
             </a:r>
             <a:r>
-              <a:rPr lang="en-US" sz="6700" dirty="0" err="1">
+              <a:rPr lang="en-US" sz="4332" dirty="0" err="1">
                 <a:latin typeface="Arial"/>
                 <a:cs typeface="Arial"/>
               </a:rPr>
               <a:t>bmapes @miami.edu</a:t>
             </a:r>
-            <a:endParaRPr lang="en-US" sz="6700" dirty="0">
+            <a:endParaRPr lang="en-US" sz="4332" dirty="0">
               <a:latin typeface="Arial"/>
               <a:cs typeface="Arial"/>
             </a:endParaRPr>
@@ -3208,8 +3208,8 @@
         </p:nvSpPr>
         <p:spPr bwMode="auto">
           <a:xfrm>
-            <a:off x="1889607" y="6540861"/>
-            <a:ext cx="20274339" cy="6186309"/>
+            <a:off x="1664911" y="4560947"/>
+            <a:ext cx="13106643" cy="4029635"/>
           </a:xfrm>
           <a:prstGeom prst="rect">
             <a:avLst/>
@@ -3232,15 +3232,15 @@
           <a:lstStyle/>
           <a:p>
             <a:r>
-              <a:rPr lang="en-US" sz="4000" b="1" u="sng" dirty="0"/>
+              <a:rPr lang="en-US" sz="2586" b="1" u="sng" dirty="0"/>
               <a:t>QUESTION:</a:t>
             </a:r>
             <a:r>
-              <a:rPr lang="en-US" sz="4000" b="1" dirty="0"/>
+              <a:rPr lang="en-US" sz="2586" b="1" dirty="0"/>
               <a:t> How do </a:t>
             </a:r>
             <a:r>
-              <a:rPr lang="en-US" sz="4000" b="1" i="1" dirty="0">
+              <a:rPr lang="en-US" sz="2586" b="1" i="1" dirty="0">
                 <a:solidFill>
                   <a:srgbClr val="7030A0"/>
                 </a:solidFill>
@@ -3248,7 +3248,7 @@
               <a:t>unlikely but efficient</a:t>
             </a:r>
             <a:r>
-              <a:rPr lang="en-US" sz="4000" b="1" dirty="0">
+              <a:rPr lang="en-US" sz="2586" b="1" dirty="0">
                 <a:solidFill>
                   <a:srgbClr val="7030A0"/>
                 </a:solidFill>
@@ -3256,11 +3256,11 @@
               <a:t> </a:t>
             </a:r>
             <a:r>
-              <a:rPr lang="en-US" sz="4000" b="1" dirty="0"/>
+              <a:rPr lang="en-US" sz="2586" b="1" dirty="0"/>
               <a:t>mesoscale organizations of convection evolve from more </a:t>
             </a:r>
             <a:r>
-              <a:rPr lang="en-US" sz="4000" b="1" i="1" dirty="0">
+              <a:rPr lang="en-US" sz="2586" b="1" i="1" dirty="0">
                 <a:solidFill>
                   <a:srgbClr val="00B050"/>
                 </a:solidFill>
@@ -3268,26 +3268,26 @@
               <a:t>likely but random </a:t>
             </a:r>
             <a:r>
-              <a:rPr lang="en-US" sz="4000" b="1" dirty="0"/>
+              <a:rPr lang="en-US" sz="2586" b="1" dirty="0"/>
               <a:t>configurations</a:t>
             </a:r>
             <a:r>
-              <a:rPr lang="en-US" sz="4000" b="1" i="1" dirty="0"/>
+              <a:rPr lang="en-US" sz="2586" b="1" i="1" dirty="0"/>
               <a:t> </a:t>
             </a:r>
             <a:r>
-              <a:rPr lang="en-US" sz="4000" b="1" dirty="0"/>
+              <a:rPr lang="en-US" sz="2586" b="1" dirty="0"/>
               <a:t>of</a:t>
             </a:r>
             <a:r>
-              <a:rPr lang="en-US" sz="4000" b="1" i="1" dirty="0"/>
+              <a:rPr lang="en-US" sz="2586" b="1" i="1" dirty="0"/>
               <a:t> c</a:t>
             </a:r>
             <a:r>
-              <a:rPr lang="en-US" sz="4000" b="1" dirty="0"/>
+              <a:rPr lang="en-US" sz="2586" b="1" dirty="0"/>
               <a:t>onvective updrafts, in a newly convecting fluid?</a:t>
             </a:r>
-            <a:endParaRPr lang="en-US" sz="4000" b="1" dirty="0">
+            <a:endParaRPr lang="en-US" sz="2586" b="1" dirty="0">
               <a:ea typeface="Arial" pitchFamily="-84" charset="0"/>
               <a:cs typeface="Arial" pitchFamily="-84" charset="0"/>
             </a:endParaRPr>
@@ -3297,14 +3297,14 @@
               <a:buFont typeface="Arial"/>
               <a:buChar char="•"/>
             </a:pPr>
-            <a:endParaRPr lang="en-US" sz="4000" b="1" dirty="0">
+            <a:endParaRPr lang="en-US" sz="2586" b="1" dirty="0">
               <a:ea typeface="Arial" pitchFamily="-84" charset="0"/>
               <a:cs typeface="Arial" pitchFamily="-84" charset="0"/>
             </a:endParaRPr>
           </a:p>
           <a:p>
             <a:r>
-              <a:rPr lang="en-US" sz="4000" b="1" dirty="0">
+              <a:rPr lang="en-US" sz="2586" b="1" dirty="0">
                 <a:latin typeface="Times New Roman" panose="02020603050405020304" pitchFamily="18" charset="0"/>
                 <a:ea typeface="Arial" pitchFamily="-84" charset="0"/>
                 <a:cs typeface="Times New Roman" panose="02020603050405020304" pitchFamily="18" charset="0"/>
@@ -3318,7 +3318,7 @@
               <a:buChar char="•"/>
             </a:pPr>
             <a:r>
-              <a:rPr lang="en-US" sz="4000" dirty="0">
+              <a:rPr lang="en-US" sz="2586" dirty="0">
                 <a:latin typeface="Times New Roman" panose="02020603050405020304" pitchFamily="18" charset="0"/>
                 <a:ea typeface="Arial" pitchFamily="-84" charset="0"/>
                 <a:cs typeface="Times New Roman" panose="02020603050405020304" pitchFamily="18" charset="0"/>
@@ -3326,7 +3326,7 @@
               <a:t> Consider an abstract space of possible configurations of convective cells (here, </a:t>
             </a:r>
             <a:r>
-              <a:rPr lang="en-US" sz="4000" dirty="0">
+              <a:rPr lang="en-US" sz="2586" dirty="0">
                 <a:solidFill>
                   <a:srgbClr val="FF0000"/>
                 </a:solidFill>
@@ -3337,7 +3337,7 @@
               <a:t>w=1 </a:t>
             </a:r>
             <a:r>
-              <a:rPr lang="en-US" sz="4000" dirty="0">
+              <a:rPr lang="en-US" sz="2586" dirty="0">
                 <a:latin typeface="Times New Roman" panose="02020603050405020304" pitchFamily="18" charset="0"/>
                 <a:ea typeface="Arial" pitchFamily="-84" charset="0"/>
                 <a:cs typeface="Times New Roman" panose="02020603050405020304" pitchFamily="18" charset="0"/>
@@ -3351,13 +3351,13 @@
               <a:buChar char="•"/>
             </a:pPr>
             <a:r>
-              <a:rPr lang="en-US" sz="4000" dirty="0">
+              <a:rPr lang="en-US" sz="2586" dirty="0">
                 <a:latin typeface="Times New Roman" panose="02020603050405020304" pitchFamily="18" charset="0"/>
                 <a:cs typeface="Times New Roman" panose="02020603050405020304" pitchFamily="18" charset="0"/>
               </a:rPr>
               <a:t> Vast majority of these are un-special; nearly redundant functionally</a:t>
             </a:r>
-            <a:endParaRPr lang="en-US" sz="4000" i="1" dirty="0">
+            <a:endParaRPr lang="en-US" sz="2586" i="1" dirty="0">
               <a:latin typeface="Times New Roman" panose="02020603050405020304" pitchFamily="18" charset="0"/>
               <a:cs typeface="Times New Roman" panose="02020603050405020304" pitchFamily="18" charset="0"/>
             </a:endParaRPr>
@@ -3368,7 +3368,7 @@
               <a:buChar char="•"/>
             </a:pPr>
             <a:r>
-              <a:rPr lang="en-US" sz="4000" dirty="0">
+              <a:rPr lang="en-US" sz="2586" dirty="0">
                 <a:latin typeface="Times New Roman" panose="02020603050405020304" pitchFamily="18" charset="0"/>
                 <a:cs typeface="Times New Roman" panose="02020603050405020304" pitchFamily="18" charset="0"/>
               </a:rPr>
@@ -3381,49 +3381,49 @@
               <a:buChar char="•"/>
             </a:pPr>
             <a:r>
-              <a:rPr lang="en-US" sz="4000" dirty="0">
+              <a:rPr lang="en-US" sz="2586" dirty="0">
                 <a:latin typeface="Times New Roman" panose="02020603050405020304" pitchFamily="18" charset="0"/>
                 <a:cs typeface="Times New Roman" panose="02020603050405020304" pitchFamily="18" charset="0"/>
               </a:rPr>
               <a:t> </a:t>
             </a:r>
             <a:r>
-              <a:rPr lang="en-US" sz="4000" u="sng" dirty="0">
+              <a:rPr lang="en-US" sz="2586" u="sng" dirty="0">
                 <a:latin typeface="Times New Roman" panose="02020603050405020304" pitchFamily="18" charset="0"/>
                 <a:cs typeface="Times New Roman" panose="02020603050405020304" pitchFamily="18" charset="0"/>
               </a:rPr>
               <a:t>Hypothesis</a:t>
             </a:r>
             <a:r>
-              <a:rPr lang="en-US" sz="4000" dirty="0">
+              <a:rPr lang="en-US" sz="2586" dirty="0">
                 <a:latin typeface="Times New Roman" panose="02020603050405020304" pitchFamily="18" charset="0"/>
                 <a:cs typeface="Times New Roman" panose="02020603050405020304" pitchFamily="18" charset="0"/>
               </a:rPr>
               <a:t>: Some config. </a:t>
             </a:r>
             <a:r>
-              <a:rPr lang="en-US" sz="4000" b="1" i="1" dirty="0">
+              <a:rPr lang="en-US" sz="2586" b="1" i="1" dirty="0">
                 <a:latin typeface="Times New Roman" panose="02020603050405020304" pitchFamily="18" charset="0"/>
                 <a:cs typeface="Times New Roman" panose="02020603050405020304" pitchFamily="18" charset="0"/>
               </a:rPr>
               <a:t>adjacency</a:t>
             </a:r>
             <a:r>
-              <a:rPr lang="en-US" sz="4000" dirty="0">
+              <a:rPr lang="en-US" sz="2586" dirty="0">
                 <a:latin typeface="Times New Roman" panose="02020603050405020304" pitchFamily="18" charset="0"/>
                 <a:cs typeface="Times New Roman" panose="02020603050405020304" pitchFamily="18" charset="0"/>
               </a:rPr>
               <a:t> defines a </a:t>
             </a:r>
             <a:r>
-              <a:rPr lang="en-US" sz="4000" b="1" i="1" dirty="0">
+              <a:rPr lang="en-US" sz="2586" b="1" i="1" dirty="0">
                 <a:latin typeface="Times New Roman" panose="02020603050405020304" pitchFamily="18" charset="0"/>
                 <a:cs typeface="Times New Roman" panose="02020603050405020304" pitchFamily="18" charset="0"/>
               </a:rPr>
               <a:t>gradient</a:t>
             </a:r>
             <a:r>
-              <a:rPr lang="en-US" sz="4000" dirty="0">
+              <a:rPr lang="en-US" sz="2586" dirty="0">
                 <a:latin typeface="Times New Roman" panose="02020603050405020304" pitchFamily="18" charset="0"/>
                 <a:cs typeface="Times New Roman" panose="02020603050405020304" pitchFamily="18" charset="0"/>
               </a:rPr>
@@ -3431,7 +3431,7 @@
             </a:r>
           </a:p>
           <a:p>
-            <a:endParaRPr lang="en-US" sz="3600" dirty="0">
+            <a:endParaRPr lang="en-US" sz="2327" dirty="0">
               <a:latin typeface="Times New Roman" panose="02020603050405020304" pitchFamily="18" charset="0"/>
               <a:cs typeface="Times New Roman" panose="02020603050405020304" pitchFamily="18" charset="0"/>
             </a:endParaRPr>
@@ -3442,7 +3442,7 @@
               <a:buChar char="•"/>
             </a:pPr>
             <a:r>
-              <a:rPr lang="en-US" sz="4000" dirty="0">
+              <a:rPr lang="en-US" sz="2586" dirty="0">
                 <a:latin typeface="Times New Roman" panose="02020603050405020304" pitchFamily="18" charset="0"/>
                 <a:ea typeface="Arial" pitchFamily="-84" charset="0"/>
                 <a:cs typeface="Times New Roman" panose="02020603050405020304" pitchFamily="18" charset="0"/>
@@ -3450,7 +3450,7 @@
               <a:t> </a:t>
             </a:r>
             <a:r>
-              <a:rPr lang="en-US" sz="4000" dirty="0">
+              <a:rPr lang="en-US" sz="2586" dirty="0">
                 <a:ea typeface="Arial" pitchFamily="-84" charset="0"/>
                 <a:cs typeface="Times New Roman" panose="02020603050405020304" pitchFamily="18" charset="0"/>
               </a:rPr>
@@ -3469,8 +3469,8 @@
         </p:nvSpPr>
         <p:spPr bwMode="auto">
           <a:xfrm>
-            <a:off x="9543907" y="5796185"/>
-            <a:ext cx="4637088" cy="862013"/>
+            <a:off x="6613147" y="4079538"/>
+            <a:ext cx="2736538" cy="586890"/>
           </a:xfrm>
           <a:prstGeom prst="rect">
             <a:avLst/>
@@ -3493,7 +3493,7 @@
           <a:lstStyle/>
           <a:p>
             <a:r>
-              <a:rPr lang="en-US" sz="5000" b="1" dirty="0">
+              <a:rPr lang="en-US" sz="3232" b="1" dirty="0">
                 <a:ea typeface="Arial" pitchFamily="-84" charset="0"/>
                 <a:cs typeface="Arial" pitchFamily="-84" charset="0"/>
               </a:rPr>
@@ -3510,8 +3510,8 @@
         </p:nvSpPr>
         <p:spPr>
           <a:xfrm>
-            <a:off x="1562514" y="5778106"/>
-            <a:ext cx="20601432" cy="7294199"/>
+            <a:off x="1453457" y="4067854"/>
+            <a:ext cx="13318097" cy="4715441"/>
           </a:xfrm>
           <a:prstGeom prst="rect">
             <a:avLst/>
@@ -3542,7 +3542,7 @@
           <a:lstStyle/>
           <a:p>
             <a:pPr algn="ctr"/>
-            <a:endParaRPr lang="en-US"/>
+            <a:endParaRPr lang="en-US" sz="4368"/>
           </a:p>
         </p:txBody>
       </p:sp>
@@ -3556,8 +3556,8 @@
         </p:nvSpPr>
         <p:spPr bwMode="auto">
           <a:xfrm>
-            <a:off x="23145751" y="5791495"/>
-            <a:ext cx="18855842" cy="7786747"/>
+            <a:off x="15406256" y="4076508"/>
+            <a:ext cx="12189637" cy="5063080"/>
           </a:xfrm>
           <a:prstGeom prst="rect">
             <a:avLst/>
@@ -3581,7 +3581,7 @@
           <a:p>
             <a:pPr algn="ctr"/>
             <a:r>
-              <a:rPr lang="en-US" sz="5000" b="1" dirty="0">
+              <a:rPr lang="en-US" sz="3232" b="1" dirty="0">
                 <a:ea typeface="Arial" pitchFamily="-84" charset="0"/>
                 <a:cs typeface="Arial" pitchFamily="-84" charset="0"/>
               </a:rPr>
@@ -3591,7 +3591,7 @@
           <a:p>
             <a:pPr algn="ctr"/>
             <a:r>
-              <a:rPr lang="en-US" sz="5000" dirty="0">
+              <a:rPr lang="en-US" sz="3232" dirty="0">
                 <a:ea typeface="Arial" pitchFamily="-84" charset="0"/>
                 <a:cs typeface="Arial" pitchFamily="-84" charset="0"/>
                 <a:sym typeface="Wingdings" pitchFamily="2" charset="2"/>
@@ -3599,14 +3599,14 @@
               <a:t>1-timestep jumps  31x31 </a:t>
             </a:r>
             <a:r>
-              <a:rPr lang="en-US" sz="5000" i="1" dirty="0">
+              <a:rPr lang="en-US" sz="3232" i="1" dirty="0">
                 <a:ea typeface="Arial" pitchFamily="-84" charset="0"/>
                 <a:cs typeface="Arial" pitchFamily="-84" charset="0"/>
                 <a:sym typeface="Wingdings" pitchFamily="2" charset="2"/>
               </a:rPr>
               <a:t>transition probability matrix TPM</a:t>
             </a:r>
-            <a:endParaRPr lang="en-US" sz="5000" b="1" i="1" dirty="0">
+            <a:endParaRPr lang="en-US" sz="3232" b="1" i="1" dirty="0">
               <a:ea typeface="Arial" pitchFamily="-84" charset="0"/>
               <a:cs typeface="Arial" pitchFamily="-84" charset="0"/>
               <a:sym typeface="Wingdings" pitchFamily="2" charset="2"/>
@@ -3614,7 +3614,7 @@
           </a:p>
           <a:p>
             <a:r>
-              <a:rPr lang="en-US" sz="5000" b="1" i="1" dirty="0">
+              <a:rPr lang="en-US" sz="3232" b="1" i="1" dirty="0">
                 <a:latin typeface="Times New Roman" panose="02020603050405020304" pitchFamily="18" charset="0"/>
                 <a:ea typeface="Arial" pitchFamily="-84" charset="0"/>
                 <a:cs typeface="Times New Roman" panose="02020603050405020304" pitchFamily="18" charset="0"/>
@@ -3622,7 +3622,7 @@
               <a:t> </a:t>
             </a:r>
             <a:r>
-              <a:rPr lang="en-US" sz="5000" dirty="0">
+              <a:rPr lang="en-US" sz="3232" dirty="0">
                 <a:latin typeface="Times New Roman" panose="02020603050405020304" pitchFamily="18" charset="0"/>
                 <a:ea typeface="Arial" pitchFamily="-84" charset="0"/>
                 <a:cs typeface="Times New Roman" panose="02020603050405020304" pitchFamily="18" charset="0"/>
@@ -3632,7 +3632,7 @@
           </a:p>
           <a:p>
             <a:r>
-              <a:rPr lang="en-US" sz="5000" dirty="0">
+              <a:rPr lang="en-US" sz="3232" dirty="0">
                 <a:latin typeface="Times New Roman" panose="02020603050405020304" pitchFamily="18" charset="0"/>
                 <a:ea typeface="Arial" pitchFamily="-84" charset="0"/>
                 <a:cs typeface="Times New Roman" panose="02020603050405020304" pitchFamily="18" charset="0"/>
@@ -3640,7 +3640,7 @@
               <a:t>    P</a:t>
             </a:r>
             <a:r>
-              <a:rPr lang="en-US" sz="5000" baseline="-25000" dirty="0">
+              <a:rPr lang="en-US" sz="3232" baseline="-25000" dirty="0">
                 <a:latin typeface="Times New Roman" panose="02020603050405020304" pitchFamily="18" charset="0"/>
                 <a:ea typeface="Arial" pitchFamily="-84" charset="0"/>
                 <a:cs typeface="Times New Roman" panose="02020603050405020304" pitchFamily="18" charset="0"/>
@@ -3648,7 +3648,7 @@
               <a:t>w</a:t>
             </a:r>
             <a:r>
-              <a:rPr lang="en-US" sz="5000" dirty="0">
+              <a:rPr lang="en-US" sz="3232" dirty="0">
                 <a:latin typeface="Times New Roman" panose="02020603050405020304" pitchFamily="18" charset="0"/>
                 <a:ea typeface="Arial" pitchFamily="-84" charset="0"/>
                 <a:cs typeface="Times New Roman" panose="02020603050405020304" pitchFamily="18" charset="0"/>
@@ -3656,7 +3656,7 @@
               <a:t>(x,y, t+1) = </a:t>
             </a:r>
             <a:r>
-              <a:rPr lang="en-US" sz="5000" dirty="0">
+              <a:rPr lang="en-US" sz="3232" dirty="0">
                 <a:solidFill>
                   <a:srgbClr val="FF0000"/>
                 </a:solidFill>
@@ -3667,7 +3667,7 @@
               <a:t>W</a:t>
             </a:r>
             <a:r>
-              <a:rPr lang="en-US" sz="5000" dirty="0">
+              <a:rPr lang="en-US" sz="3232" dirty="0">
                 <a:latin typeface="Times New Roman" panose="02020603050405020304" pitchFamily="18" charset="0"/>
                 <a:ea typeface="Arial" pitchFamily="-84" charset="0"/>
                 <a:cs typeface="Times New Roman" panose="02020603050405020304" pitchFamily="18" charset="0"/>
@@ -3675,7 +3675,7 @@
               <a:t> w(x,y, t) + </a:t>
             </a:r>
             <a:r>
-              <a:rPr lang="en-US" sz="5000" dirty="0">
+              <a:rPr lang="en-US" sz="3232" dirty="0">
                 <a:solidFill>
                   <a:srgbClr val="FF0000"/>
                 </a:solidFill>
@@ -3686,7 +3686,7 @@
               <a:t>R</a:t>
             </a:r>
             <a:r>
-              <a:rPr lang="en-US" sz="5000" dirty="0">
+              <a:rPr lang="en-US" sz="3232" dirty="0">
                 <a:latin typeface="Times New Roman" panose="02020603050405020304" pitchFamily="18" charset="0"/>
                 <a:ea typeface="Arial" pitchFamily="-84" charset="0"/>
                 <a:cs typeface="Times New Roman" panose="02020603050405020304" pitchFamily="18" charset="0"/>
@@ -3694,7 +3694,7 @@
               <a:t> Noise + </a:t>
             </a:r>
             <a:r>
-              <a:rPr lang="en-US" sz="5000" dirty="0">
+              <a:rPr lang="en-US" sz="3232" dirty="0">
                 <a:solidFill>
                   <a:srgbClr val="FF0000"/>
                 </a:solidFill>
@@ -3705,7 +3705,7 @@
               <a:t>E</a:t>
             </a:r>
             <a:r>
-              <a:rPr lang="en-US" sz="5000" dirty="0">
+              <a:rPr lang="en-US" sz="3232" dirty="0">
                 <a:latin typeface="Times New Roman" panose="02020603050405020304" pitchFamily="18" charset="0"/>
                 <a:ea typeface="Arial" pitchFamily="-84" charset="0"/>
                 <a:cs typeface="Times New Roman" panose="02020603050405020304" pitchFamily="18" charset="0"/>
@@ -3713,7 +3713,7 @@
               <a:t> N</a:t>
             </a:r>
             <a:r>
-              <a:rPr lang="en-US" sz="5000" baseline="-25000" dirty="0">
+              <a:rPr lang="en-US" sz="3232" baseline="-25000" dirty="0">
                 <a:latin typeface="Times New Roman" panose="02020603050405020304" pitchFamily="18" charset="0"/>
                 <a:ea typeface="Arial" pitchFamily="-84" charset="0"/>
                 <a:cs typeface="Times New Roman" panose="02020603050405020304" pitchFamily="18" charset="0"/>
@@ -3721,7 +3721,7 @@
               <a:t>4neigh</a:t>
             </a:r>
             <a:r>
-              <a:rPr lang="en-US" sz="5000" dirty="0">
+              <a:rPr lang="en-US" sz="3232" dirty="0">
                 <a:latin typeface="Times New Roman" panose="02020603050405020304" pitchFamily="18" charset="0"/>
                 <a:ea typeface="Arial" pitchFamily="-84" charset="0"/>
                 <a:cs typeface="Times New Roman" panose="02020603050405020304" pitchFamily="18" charset="0"/>
@@ -3729,7 +3729,7 @@
               <a:t>(x,y, t) +</a:t>
             </a:r>
             <a:r>
-              <a:rPr lang="en-US" sz="5000" dirty="0">
+              <a:rPr lang="en-US" sz="3232" dirty="0">
                 <a:solidFill>
                   <a:srgbClr val="FF0000"/>
                 </a:solidFill>
@@ -3740,7 +3740,7 @@
               <a:t> F</a:t>
             </a:r>
             <a:r>
-              <a:rPr lang="en-US" sz="5000" dirty="0">
+              <a:rPr lang="en-US" sz="3232" dirty="0">
                 <a:latin typeface="Times New Roman" panose="02020603050405020304" pitchFamily="18" charset="0"/>
                 <a:ea typeface="Arial" pitchFamily="-84" charset="0"/>
                 <a:cs typeface="Times New Roman" panose="02020603050405020304" pitchFamily="18" charset="0"/>
@@ -3748,7 +3748,7 @@
               <a:t> |</a:t>
             </a:r>
             <a:r>
-              <a:rPr lang="en-US" sz="5000" b="1" dirty="0">
+              <a:rPr lang="en-US" sz="3232" b="1" dirty="0">
                 <a:latin typeface="Times New Roman" panose="02020603050405020304" pitchFamily="18" charset="0"/>
                 <a:ea typeface="Arial" pitchFamily="-84" charset="0"/>
                 <a:cs typeface="Times New Roman" panose="02020603050405020304" pitchFamily="18" charset="0"/>
@@ -3756,7 +3756,7 @@
               <a:t>V</a:t>
             </a:r>
             <a:r>
-              <a:rPr lang="en-US" sz="5000" dirty="0">
+              <a:rPr lang="en-US" sz="3232" dirty="0">
                 <a:latin typeface="Times New Roman" panose="02020603050405020304" pitchFamily="18" charset="0"/>
                 <a:ea typeface="Arial" pitchFamily="-84" charset="0"/>
                 <a:cs typeface="Times New Roman" panose="02020603050405020304" pitchFamily="18" charset="0"/>
@@ -3765,7 +3765,7 @@
             </a:r>
           </a:p>
           <a:p>
-            <a:endParaRPr lang="en-US" sz="5000" dirty="0">
+            <a:endParaRPr lang="en-US" sz="3232" dirty="0">
               <a:latin typeface="Times New Roman" panose="02020603050405020304" pitchFamily="18" charset="0"/>
               <a:ea typeface="Arial" pitchFamily="-84" charset="0"/>
               <a:cs typeface="Times New Roman" panose="02020603050405020304" pitchFamily="18" charset="0"/>
@@ -3773,7 +3773,7 @@
           </a:p>
           <a:p>
             <a:r>
-              <a:rPr lang="en-US" sz="5000" dirty="0">
+              <a:rPr lang="en-US" sz="3232" dirty="0">
                 <a:latin typeface="Times New Roman" panose="02020603050405020304" pitchFamily="18" charset="0"/>
                 <a:ea typeface="Arial" pitchFamily="-84" charset="0"/>
                 <a:cs typeface="Times New Roman" panose="02020603050405020304" pitchFamily="18" charset="0"/>
@@ -3781,7 +3781,7 @@
               <a:t>Parameter space: </a:t>
             </a:r>
             <a:r>
-              <a:rPr lang="en-US" sz="5000" dirty="0">
+              <a:rPr lang="en-US" sz="3232" dirty="0">
                 <a:solidFill>
                   <a:srgbClr val="FF0000"/>
                 </a:solidFill>
@@ -3794,7 +3794,7 @@
           </a:p>
           <a:p>
             <a:r>
-              <a:rPr lang="en-US" sz="5000" dirty="0">
+              <a:rPr lang="en-US" sz="3232" dirty="0">
                 <a:solidFill>
                   <a:srgbClr val="FF0000"/>
                 </a:solidFill>
@@ -3805,7 +3805,7 @@
               <a:t>	W </a:t>
             </a:r>
             <a:r>
-              <a:rPr lang="en-US" sz="5000" dirty="0">
+              <a:rPr lang="en-US" sz="3232" dirty="0">
                 <a:latin typeface="Times New Roman" panose="02020603050405020304" pitchFamily="18" charset="0"/>
                 <a:ea typeface="Arial" pitchFamily="-84" charset="0"/>
                 <a:cs typeface="Times New Roman" panose="02020603050405020304" pitchFamily="18" charset="0"/>
@@ -3815,7 +3815,7 @@
           </a:p>
           <a:p>
             <a:r>
-              <a:rPr lang="en-US" sz="5000" dirty="0">
+              <a:rPr lang="en-US" sz="3232" dirty="0">
                 <a:latin typeface="Times New Roman" panose="02020603050405020304" pitchFamily="18" charset="0"/>
                 <a:ea typeface="Arial" pitchFamily="-84" charset="0"/>
                 <a:cs typeface="Times New Roman" panose="02020603050405020304" pitchFamily="18" charset="0"/>
@@ -3823,7 +3823,7 @@
               <a:t>	</a:t>
             </a:r>
             <a:r>
-              <a:rPr lang="en-US" sz="5000" dirty="0">
+              <a:rPr lang="en-US" sz="3232" dirty="0">
                 <a:solidFill>
                   <a:srgbClr val="FF0000"/>
                 </a:solidFill>
@@ -3834,7 +3834,7 @@
               <a:t>R</a:t>
             </a:r>
             <a:r>
-              <a:rPr lang="en-US" sz="5000" dirty="0">
+              <a:rPr lang="en-US" sz="3232" dirty="0">
                 <a:latin typeface="Times New Roman" panose="02020603050405020304" pitchFamily="18" charset="0"/>
                 <a:ea typeface="Arial" pitchFamily="-84" charset="0"/>
                 <a:cs typeface="Times New Roman" panose="02020603050405020304" pitchFamily="18" charset="0"/>
@@ -3844,7 +3844,7 @@
           </a:p>
           <a:p>
             <a:r>
-              <a:rPr lang="en-US" sz="5000" dirty="0">
+              <a:rPr lang="en-US" sz="3232" dirty="0">
                 <a:latin typeface="Times New Roman" panose="02020603050405020304" pitchFamily="18" charset="0"/>
                 <a:ea typeface="Arial" pitchFamily="-84" charset="0"/>
                 <a:cs typeface="Times New Roman" panose="02020603050405020304" pitchFamily="18" charset="0"/>
@@ -3852,7 +3852,7 @@
               <a:t>	</a:t>
             </a:r>
             <a:r>
-              <a:rPr lang="en-US" sz="5000" dirty="0">
+              <a:rPr lang="en-US" sz="3232" dirty="0">
                 <a:solidFill>
                   <a:srgbClr val="FF0000"/>
                 </a:solidFill>
@@ -3863,7 +3863,7 @@
               <a:t>E</a:t>
             </a:r>
             <a:r>
-              <a:rPr lang="en-US" sz="5000" dirty="0">
+              <a:rPr lang="en-US" sz="3232" dirty="0">
                 <a:latin typeface="Times New Roman" panose="02020603050405020304" pitchFamily="18" charset="0"/>
                 <a:ea typeface="Arial" pitchFamily="-84" charset="0"/>
                 <a:cs typeface="Times New Roman" panose="02020603050405020304" pitchFamily="18" charset="0"/>
@@ -3871,7 +3871,7 @@
               <a:t> governs </a:t>
             </a:r>
             <a:r>
-              <a:rPr lang="en-US" sz="5000" i="1" dirty="0">
+              <a:rPr lang="en-US" sz="3232" i="1" dirty="0">
                 <a:latin typeface="Times New Roman" panose="02020603050405020304" pitchFamily="18" charset="0"/>
                 <a:ea typeface="Arial" pitchFamily="-84" charset="0"/>
                 <a:cs typeface="Times New Roman" panose="02020603050405020304" pitchFamily="18" charset="0"/>
@@ -3881,7 +3881,7 @@
           </a:p>
           <a:p>
             <a:r>
-              <a:rPr lang="en-US" sz="5000" dirty="0">
+              <a:rPr lang="en-US" sz="3232" dirty="0">
                 <a:latin typeface="Times New Roman" panose="02020603050405020304" pitchFamily="18" charset="0"/>
                 <a:ea typeface="Arial" pitchFamily="-84" charset="0"/>
                 <a:cs typeface="Times New Roman" panose="02020603050405020304" pitchFamily="18" charset="0"/>
@@ -3889,7 +3889,7 @@
               <a:t>	</a:t>
             </a:r>
             <a:r>
-              <a:rPr lang="en-US" sz="5000" dirty="0">
+              <a:rPr lang="en-US" sz="3232" dirty="0">
                 <a:solidFill>
                   <a:srgbClr val="FF0000"/>
                 </a:solidFill>
@@ -3900,7 +3900,7 @@
               <a:t>F</a:t>
             </a:r>
             <a:r>
-              <a:rPr lang="en-US" sz="5000" dirty="0">
+              <a:rPr lang="en-US" sz="3232" dirty="0">
                 <a:latin typeface="Times New Roman" panose="02020603050405020304" pitchFamily="18" charset="0"/>
                 <a:ea typeface="Arial" pitchFamily="-84" charset="0"/>
                 <a:cs typeface="Times New Roman" panose="02020603050405020304" pitchFamily="18" charset="0"/>
@@ -3908,7 +3908,7 @@
               <a:t> governs </a:t>
             </a:r>
             <a:r>
-              <a:rPr lang="en-US" sz="5000" i="1" dirty="0">
+              <a:rPr lang="en-US" sz="3232" i="1" dirty="0">
                 <a:latin typeface="Times New Roman" panose="02020603050405020304" pitchFamily="18" charset="0"/>
                 <a:ea typeface="Arial" pitchFamily="-84" charset="0"/>
                 <a:cs typeface="Times New Roman" panose="02020603050405020304" pitchFamily="18" charset="0"/>
@@ -3916,7 +3916,7 @@
               <a:t>|</a:t>
             </a:r>
             <a:r>
-              <a:rPr lang="en-US" sz="5000" b="1" i="1" dirty="0">
+              <a:rPr lang="en-US" sz="3232" b="1" i="1" dirty="0">
                 <a:latin typeface="Times New Roman" panose="02020603050405020304" pitchFamily="18" charset="0"/>
                 <a:ea typeface="Arial" pitchFamily="-84" charset="0"/>
                 <a:cs typeface="Times New Roman" panose="02020603050405020304" pitchFamily="18" charset="0"/>
@@ -3924,14 +3924,14 @@
               <a:t>V</a:t>
             </a:r>
             <a:r>
-              <a:rPr lang="en-US" sz="5000" i="1" dirty="0">
+              <a:rPr lang="en-US" sz="3232" i="1" dirty="0">
                 <a:latin typeface="Times New Roman" panose="02020603050405020304" pitchFamily="18" charset="0"/>
                 <a:ea typeface="Arial" pitchFamily="-84" charset="0"/>
                 <a:cs typeface="Times New Roman" panose="02020603050405020304" pitchFamily="18" charset="0"/>
               </a:rPr>
               <a:t>|-dependent surface flux </a:t>
             </a:r>
-            <a:endParaRPr lang="en-US" sz="5000" i="1" dirty="0">
+            <a:endParaRPr lang="en-US" sz="3232" i="1" dirty="0">
               <a:latin typeface="Times New Roman" panose="02020603050405020304" pitchFamily="18" charset="0"/>
               <a:ea typeface="Arial" pitchFamily="-84" charset="0"/>
               <a:cs typeface="Arial" pitchFamily="-84" charset="0"/>
@@ -3947,8 +3947,8 @@
         </p:nvSpPr>
         <p:spPr>
           <a:xfrm>
-            <a:off x="22946360" y="5796183"/>
-            <a:ext cx="19229832" cy="8911695"/>
+            <a:off x="15277356" y="4079540"/>
+            <a:ext cx="12431407" cy="5761096"/>
           </a:xfrm>
           <a:prstGeom prst="rect">
             <a:avLst/>
@@ -3979,7 +3979,7 @@
           <a:lstStyle/>
           <a:p>
             <a:pPr algn="ctr"/>
-            <a:endParaRPr lang="en-US"/>
+            <a:endParaRPr lang="en-US" sz="4368"/>
           </a:p>
         </p:txBody>
       </p:sp>
@@ -3991,8 +3991,8 @@
         </p:nvSpPr>
         <p:spPr>
           <a:xfrm>
-            <a:off x="1562514" y="13512799"/>
-            <a:ext cx="20613435" cy="17928771"/>
+            <a:off x="1453457" y="9068057"/>
+            <a:ext cx="13325857" cy="11590317"/>
           </a:xfrm>
           <a:prstGeom prst="rect">
             <a:avLst/>
@@ -4023,7 +4023,7 @@
           <a:lstStyle/>
           <a:p>
             <a:pPr algn="ctr"/>
-            <a:endParaRPr lang="en-US"/>
+            <a:endParaRPr lang="en-US" sz="4368"/>
           </a:p>
         </p:txBody>
       </p:sp>
@@ -4037,8 +4037,8 @@
         </p:nvSpPr>
         <p:spPr bwMode="auto">
           <a:xfrm>
-            <a:off x="12863544" y="21054854"/>
-            <a:ext cx="9105209" cy="9325630"/>
+            <a:off x="8759173" y="13943729"/>
+            <a:ext cx="5886196" cy="6057789"/>
           </a:xfrm>
           <a:prstGeom prst="rect">
             <a:avLst/>
@@ -4062,7 +4062,7 @@
           <a:p>
             <a:pPr algn="ctr"/>
             <a:r>
-              <a:rPr lang="en-US" sz="5000" b="1" dirty="0">
+              <a:rPr lang="en-US" sz="3232" b="1" dirty="0">
                 <a:ea typeface="Arial" pitchFamily="-84" charset="0"/>
                 <a:cs typeface="Arial" pitchFamily="-84" charset="0"/>
               </a:rPr>
@@ -4071,7 +4071,7 @@
           </a:p>
           <a:p>
             <a:pPr algn="ctr"/>
-            <a:endParaRPr lang="en-US" sz="5000" b="1" dirty="0">
+            <a:endParaRPr lang="en-US" sz="3232" b="1" dirty="0">
               <a:ea typeface="Arial" pitchFamily="-84" charset="0"/>
               <a:cs typeface="Arial" pitchFamily="-84" charset="0"/>
             </a:endParaRPr>
@@ -4079,7 +4079,7 @@
           <a:p>
             <a:pPr algn="ctr"/>
             <a:r>
-              <a:rPr lang="en-US" sz="5000" b="1" dirty="0">
+              <a:rPr lang="en-US" sz="3232" b="1" dirty="0">
                 <a:ea typeface="Arial" pitchFamily="-84" charset="0"/>
                 <a:cs typeface="Arial" pitchFamily="-84" charset="0"/>
               </a:rPr>
@@ -4088,7 +4088,7 @@
           </a:p>
           <a:p>
             <a:pPr algn="ctr"/>
-            <a:endParaRPr lang="en-US" sz="5000" b="1" dirty="0">
+            <a:endParaRPr lang="en-US" sz="3232" b="1" dirty="0">
               <a:ea typeface="Arial" pitchFamily="-84" charset="0"/>
               <a:cs typeface="Arial" pitchFamily="-84" charset="0"/>
             </a:endParaRPr>
@@ -4096,21 +4096,21 @@
           <a:p>
             <a:pPr algn="ctr"/>
             <a:r>
-              <a:rPr lang="en-US" sz="5000" b="1" dirty="0">
+              <a:rPr lang="en-US" sz="3232" b="1" dirty="0">
                 <a:ea typeface="Arial" pitchFamily="-84" charset="0"/>
                 <a:cs typeface="Arial" pitchFamily="-84" charset="0"/>
               </a:rPr>
               <a:t>Define probability P</a:t>
             </a:r>
             <a:r>
-              <a:rPr lang="en-US" sz="5000" b="1" baseline="-25000" dirty="0">
+              <a:rPr lang="en-US" sz="3232" b="1" baseline="-25000" dirty="0">
                 <a:ea typeface="Arial" pitchFamily="-84" charset="0"/>
                 <a:cs typeface="Arial" pitchFamily="-84" charset="0"/>
               </a:rPr>
               <a:t>w</a:t>
             </a:r>
             <a:r>
-              <a:rPr lang="en-US" sz="5000" b="1" dirty="0">
+              <a:rPr lang="en-US" sz="3232" b="1" dirty="0">
                 <a:ea typeface="Arial" pitchFamily="-84" charset="0"/>
                 <a:cs typeface="Arial" pitchFamily="-84" charset="0"/>
               </a:rPr>
@@ -4120,21 +4120,21 @@
           <a:p>
             <a:pPr algn="ctr"/>
             <a:r>
-              <a:rPr lang="en-US" sz="5000" b="1" dirty="0">
+              <a:rPr lang="en-US" sz="3232" b="1" dirty="0">
                 <a:ea typeface="Arial" pitchFamily="-84" charset="0"/>
                 <a:cs typeface="Arial" pitchFamily="-84" charset="0"/>
               </a:rPr>
               <a:t>Top 4 P</a:t>
             </a:r>
             <a:r>
-              <a:rPr lang="en-US" sz="5000" b="1" baseline="-25000" dirty="0">
+              <a:rPr lang="en-US" sz="3232" b="1" baseline="-25000" dirty="0">
                 <a:ea typeface="Arial" pitchFamily="-84" charset="0"/>
                 <a:cs typeface="Arial" pitchFamily="-84" charset="0"/>
               </a:rPr>
               <a:t>w  </a:t>
             </a:r>
             <a:r>
-              <a:rPr lang="en-US" sz="5000" b="1" dirty="0">
+              <a:rPr lang="en-US" sz="3232" b="1" dirty="0">
                 <a:ea typeface="Arial" pitchFamily="-84" charset="0"/>
                 <a:cs typeface="Arial" pitchFamily="-84" charset="0"/>
               </a:rPr>
@@ -4143,7 +4143,7 @@
           </a:p>
           <a:p>
             <a:pPr algn="ctr"/>
-            <a:endParaRPr lang="en-US" sz="5000" b="1" dirty="0">
+            <a:endParaRPr lang="en-US" sz="3232" b="1" dirty="0">
               <a:ea typeface="Arial" pitchFamily="-84" charset="0"/>
               <a:cs typeface="Arial" pitchFamily="-84" charset="0"/>
             </a:endParaRPr>
@@ -4151,7 +4151,7 @@
           <a:p>
             <a:pPr algn="ctr"/>
             <a:r>
-              <a:rPr lang="en-US" sz="5000" b="1" dirty="0">
+              <a:rPr lang="en-US" sz="3232" b="1" dirty="0">
                 <a:solidFill>
                   <a:schemeClr val="accent6">
                     <a:lumMod val="75000"/>
@@ -4165,7 +4165,7 @@
           </a:p>
           <a:p>
             <a:pPr algn="ctr"/>
-            <a:endParaRPr lang="en-US" sz="5000" b="1" dirty="0">
+            <a:endParaRPr lang="en-US" sz="3232" b="1" dirty="0">
               <a:ea typeface="Arial" pitchFamily="-84" charset="0"/>
               <a:cs typeface="Arial" pitchFamily="-84" charset="0"/>
             </a:endParaRPr>
@@ -4173,7 +4173,7 @@
           <a:p>
             <a:pPr algn="ctr"/>
             <a:r>
-              <a:rPr lang="en-US" sz="5000" b="1" dirty="0">
+              <a:rPr lang="en-US" sz="3232" b="1" dirty="0">
                 <a:ea typeface="Arial" pitchFamily="-84" charset="0"/>
                 <a:cs typeface="Arial" pitchFamily="-84" charset="0"/>
               </a:rPr>
@@ -4183,7 +4183,7 @@
           <a:p>
             <a:pPr algn="ctr"/>
             <a:r>
-              <a:rPr lang="en-US" sz="5000" b="1" dirty="0">
+              <a:rPr lang="en-US" sz="3232" b="1" dirty="0">
                 <a:ea typeface="Arial" pitchFamily="-84" charset="0"/>
                 <a:cs typeface="Arial" pitchFamily="-84" charset="0"/>
               </a:rPr>
@@ -4200,8 +4200,8 @@
         </p:nvSpPr>
         <p:spPr>
           <a:xfrm>
-            <a:off x="22959060" y="15257990"/>
-            <a:ext cx="19213068" cy="9570502"/>
+            <a:off x="15285568" y="10196260"/>
+            <a:ext cx="12420569" cy="6186992"/>
           </a:xfrm>
           <a:prstGeom prst="rect">
             <a:avLst/>
@@ -4232,7 +4232,7 @@
           <a:lstStyle/>
           <a:p>
             <a:pPr algn="ctr"/>
-            <a:endParaRPr lang="en-US"/>
+            <a:endParaRPr lang="en-US" sz="4368"/>
           </a:p>
         </p:txBody>
       </p:sp>
@@ -4246,8 +4246,8 @@
         </p:nvSpPr>
         <p:spPr bwMode="auto">
           <a:xfrm>
-            <a:off x="27538978" y="25186568"/>
-            <a:ext cx="10599825" cy="861774"/>
+            <a:off x="18246322" y="16614734"/>
+            <a:ext cx="6893822" cy="586890"/>
           </a:xfrm>
           <a:prstGeom prst="rect">
             <a:avLst/>
@@ -4270,7 +4270,7 @@
           <a:lstStyle/>
           <a:p>
             <a:r>
-              <a:rPr lang="en-US" sz="5000" b="1" dirty="0">
+              <a:rPr lang="en-US" sz="3232" b="1" dirty="0">
                 <a:ea typeface="Arial" pitchFamily="-84" charset="0"/>
                 <a:cs typeface="Arial" pitchFamily="-84" charset="0"/>
               </a:rPr>
@@ -4289,8 +4289,8 @@
         </p:nvSpPr>
         <p:spPr bwMode="auto">
           <a:xfrm>
-            <a:off x="22958428" y="30223227"/>
-            <a:ext cx="19115746" cy="1200329"/>
+            <a:off x="15285158" y="19870757"/>
+            <a:ext cx="12423417" cy="805815"/>
           </a:xfrm>
           <a:prstGeom prst="rect">
             <a:avLst/>
@@ -4313,7 +4313,7 @@
           <a:lstStyle/>
           <a:p>
             <a:r>
-              <a:rPr lang="en-US" sz="3600" b="1" dirty="0">
+              <a:rPr lang="en-US" sz="2327" b="1" dirty="0">
                 <a:ea typeface="Arial" pitchFamily="-84" charset="0"/>
                 <a:cs typeface="Arial" pitchFamily="-84" charset="0"/>
               </a:rPr>
@@ -4322,20 +4322,20 @@
           </a:p>
           <a:p>
             <a:r>
-              <a:rPr lang="en-US" sz="3600" dirty="0">
+              <a:rPr lang="en-US" sz="2327" dirty="0">
                 <a:ea typeface="Arial" pitchFamily="-84" charset="0"/>
                 <a:cs typeface="Arial" pitchFamily="-84" charset="0"/>
               </a:rPr>
               <a:t>Mapes (2025, ArXiv &amp; JAS in press): Evolutionary theory of convective organization </a:t>
             </a:r>
             <a:r>
-              <a:rPr lang="en-US" sz="2400" dirty="0">
+              <a:rPr lang="en-US" sz="1552" dirty="0">
                 <a:ea typeface="Arial" pitchFamily="-84" charset="0"/>
                 <a:cs typeface="Arial" pitchFamily="-84" charset="0"/>
               </a:rPr>
               <a:t>(but this work is not there!)</a:t>
             </a:r>
-            <a:endParaRPr lang="en-US" sz="5000" dirty="0">
+            <a:endParaRPr lang="en-US" sz="3232" dirty="0">
               <a:ea typeface="Arial" pitchFamily="-84" charset="0"/>
               <a:cs typeface="Arial" pitchFamily="-84" charset="0"/>
             </a:endParaRPr>
@@ -4350,8 +4350,8 @@
         </p:nvSpPr>
         <p:spPr>
           <a:xfrm>
-            <a:off x="22997160" y="25188686"/>
-            <a:ext cx="19174968" cy="4861631"/>
+            <a:off x="15310197" y="16616107"/>
+            <a:ext cx="12395939" cy="3142872"/>
           </a:xfrm>
           <a:prstGeom prst="rect">
             <a:avLst/>
@@ -4382,7 +4382,7 @@
           <a:lstStyle/>
           <a:p>
             <a:pPr algn="ctr"/>
-            <a:endParaRPr lang="en-US"/>
+            <a:endParaRPr lang="en-US" sz="4368"/>
           </a:p>
         </p:txBody>
       </p:sp>
@@ -4396,8 +4396,8 @@
         </p:nvSpPr>
         <p:spPr bwMode="auto">
           <a:xfrm>
-            <a:off x="2084469" y="14247390"/>
-            <a:ext cx="19794015" cy="5386090"/>
+            <a:off x="1790883" y="9542947"/>
+            <a:ext cx="12796131" cy="3514295"/>
           </a:xfrm>
           <a:prstGeom prst="rect">
             <a:avLst/>
@@ -4420,31 +4420,31 @@
           <a:lstStyle/>
           <a:p>
             <a:r>
-              <a:rPr lang="en-US" sz="4800">
+              <a:rPr lang="en-US" sz="3103">
                 <a:latin typeface="Times New Roman" panose="02020603050405020304" pitchFamily="18" charset="0"/>
                 <a:cs typeface="Times New Roman" panose="02020603050405020304" pitchFamily="18" charset="0"/>
               </a:rPr>
               <a:t>* </a:t>
             </a:r>
             <a:r>
-              <a:rPr lang="en-US" sz="4800">
+              <a:rPr lang="en-US" sz="3103">
                 <a:solidFill>
                   <a:srgbClr val="00B050"/>
                 </a:solidFill>
                 <a:latin typeface="Times New Roman" panose="02020603050405020304" pitchFamily="18" charset="0"/>
                 <a:cs typeface="Times New Roman" panose="02020603050405020304" pitchFamily="18" charset="0"/>
               </a:rPr>
-              <a:t>4x4 lattice</a:t>
-            </a:r>
-            <a:r>
-              <a:rPr lang="en-US" sz="4800">
-                <a:latin typeface="Times New Roman" panose="02020603050405020304" pitchFamily="18" charset="0"/>
-                <a:cs typeface="Times New Roman" panose="02020603050405020304" pitchFamily="18" charset="0"/>
-              </a:rPr>
-              <a:t>, with </a:t>
-            </a:r>
-            <a:r>
-              <a:rPr lang="en-US" sz="4800">
+              <a:t>4x4 periodic lattice</a:t>
+            </a:r>
+            <a:r>
+              <a:rPr lang="en-US" sz="3103">
+                <a:latin typeface="Times New Roman" panose="02020603050405020304" pitchFamily="18" charset="0"/>
+                <a:cs typeface="Times New Roman" panose="02020603050405020304" pitchFamily="18" charset="0"/>
+              </a:rPr>
+              <a:t>, w/ </a:t>
+            </a:r>
+            <a:r>
+              <a:rPr lang="en-US" sz="3103">
                 <a:solidFill>
                   <a:srgbClr val="00B050"/>
                 </a:solidFill>
@@ -4454,14 +4454,14 @@
               <a:t>4</a:t>
             </a:r>
             <a:r>
-              <a:rPr lang="en-US" sz="4800">
+              <a:rPr lang="en-US" sz="3103">
                 <a:latin typeface="Times New Roman" panose="02020603050405020304" pitchFamily="18" charset="0"/>
                 <a:cs typeface="Times New Roman" panose="02020603050405020304" pitchFamily="18" charset="0"/>
               </a:rPr>
               <a:t> </a:t>
             </a:r>
             <a:r>
-              <a:rPr lang="en-US" sz="4800">
+              <a:rPr lang="en-US" sz="3103">
                 <a:solidFill>
                   <a:srgbClr val="FF0000"/>
                 </a:solidFill>
@@ -4471,7 +4471,7 @@
               <a:t>w=1</a:t>
             </a:r>
             <a:r>
-              <a:rPr lang="en-US" sz="4800">
+              <a:rPr lang="en-US" sz="3103">
                 <a:latin typeface="Times New Roman" panose="02020603050405020304" pitchFamily="18" charset="0"/>
                 <a:cs typeface="Times New Roman" panose="02020603050405020304" pitchFamily="18" charset="0"/>
               </a:rPr>
@@ -4480,14 +4480,14 @@
           </a:p>
           <a:p>
             <a:r>
-              <a:rPr lang="en-US" sz="4800">
+              <a:rPr lang="en-US" sz="3103">
                 <a:latin typeface="Times New Roman" panose="02020603050405020304" pitchFamily="18" charset="0"/>
                 <a:cs typeface="Times New Roman" panose="02020603050405020304" pitchFamily="18" charset="0"/>
               </a:rPr>
               <a:t>* Velocity potential </a:t>
             </a:r>
             <a:r>
-              <a:rPr lang="en-US" sz="4800">
+              <a:rPr lang="en-US" sz="3103">
                 <a:solidFill>
                   <a:srgbClr val="FF0000"/>
                 </a:solidFill>
@@ -4496,34 +4496,34 @@
               <a:t>c</a:t>
             </a:r>
             <a:r>
-              <a:rPr lang="en-US" sz="4800">
+              <a:rPr lang="en-US" sz="3103">
                 <a:latin typeface="Symbol" pitchFamily="2" charset="2"/>
               </a:rPr>
               <a:t> </a:t>
             </a:r>
             <a:r>
-              <a:rPr lang="en-US" sz="4800">
+              <a:rPr lang="en-US" sz="3103">
                 <a:latin typeface="Times New Roman" panose="02020603050405020304" pitchFamily="18" charset="0"/>
                 <a:cs typeface="Times New Roman" panose="02020603050405020304" pitchFamily="18" charset="0"/>
               </a:rPr>
               <a:t>= ifft( fft(w)/k</a:t>
             </a:r>
             <a:r>
-              <a:rPr lang="en-US" sz="4800" baseline="30000">
+              <a:rPr lang="en-US" sz="3103" baseline="30000">
                 <a:latin typeface="Times New Roman" panose="02020603050405020304" pitchFamily="18" charset="0"/>
                 <a:cs typeface="Times New Roman" panose="02020603050405020304" pitchFamily="18" charset="0"/>
               </a:rPr>
               <a:t>2</a:t>
             </a:r>
             <a:r>
-              <a:rPr lang="en-US" sz="4800">
+              <a:rPr lang="en-US" sz="3103">
                 <a:latin typeface="Times New Roman" panose="02020603050405020304" pitchFamily="18" charset="0"/>
                 <a:cs typeface="Times New Roman" panose="02020603050405020304" pitchFamily="18" charset="0"/>
               </a:rPr>
               <a:t> ) for total wavenumber k. </a:t>
             </a:r>
             <a:r>
-              <a:rPr lang="en-US" sz="4800" b="1">
+              <a:rPr lang="en-US" sz="3103" b="1">
                 <a:solidFill>
                   <a:srgbClr val="0070C0"/>
                 </a:solidFill>
@@ -4533,14 +4533,14 @@
               <a:t>V</a:t>
             </a:r>
             <a:r>
-              <a:rPr lang="en-US" sz="4800">
+              <a:rPr lang="en-US" sz="3103">
                 <a:latin typeface="Times New Roman" panose="02020603050405020304" pitchFamily="18" charset="0"/>
                 <a:cs typeface="Times New Roman" panose="02020603050405020304" pitchFamily="18" charset="0"/>
               </a:rPr>
               <a:t> = grad(</a:t>
             </a:r>
             <a:r>
-              <a:rPr lang="en-US" sz="4800">
+              <a:rPr lang="en-US" sz="3103">
                 <a:solidFill>
                   <a:srgbClr val="FF0000"/>
                 </a:solidFill>
@@ -4549,7 +4549,7 @@
               <a:t>c</a:t>
             </a:r>
             <a:r>
-              <a:rPr lang="en-US" sz="4800">
+              <a:rPr lang="en-US" sz="3103">
                 <a:latin typeface="Times New Roman" panose="02020603050405020304" pitchFamily="18" charset="0"/>
                 <a:cs typeface="Times New Roman" panose="02020603050405020304" pitchFamily="18" charset="0"/>
               </a:rPr>
@@ -4557,100 +4557,58 @@
             </a:r>
           </a:p>
           <a:p>
-            <a:pPr marL="2194560" marR="0" lvl="1" indent="0" algn="l" defTabSz="2194560" rtl="0" eaLnBrk="1" fontAlgn="auto" latinLnBrk="0" hangingPunct="1">
-              <a:lnSpc>
-                <a:spcPct val="100000"/>
-              </a:lnSpc>
-              <a:spcBef>
-                <a:spcPts val="0"/>
-              </a:spcBef>
-              <a:spcAft>
-                <a:spcPts val="0"/>
-              </a:spcAft>
-              <a:buClrTx/>
-              <a:buSzTx/>
-              <a:buFontTx/>
-              <a:buNone/>
-              <a:tabLst/>
+            <a:pPr marL="1418692" lvl="1" defTabSz="1418692">
               <a:defRPr/>
             </a:pPr>
             <a:r>
-              <a:rPr kumimoji="0" lang="en-US" sz="3200" b="0" i="1" u="none" strike="noStrike" kern="1200" cap="none" spc="0" normalizeH="0" baseline="0" noProof="0">
-                <a:ln>
-                  <a:noFill/>
-                </a:ln>
+              <a:rPr lang="en-US" sz="2068" i="1">
                 <a:solidFill>
                   <a:prstClr val="black"/>
                 </a:solidFill>
-                <a:effectLst/>
-                <a:uLnTx/>
-                <a:uFillTx/>
-                <a:latin typeface="Times New Roman" panose="02020603050405020304" pitchFamily="18" charset="0"/>
-                <a:ea typeface="+mn-ea"/>
+                <a:latin typeface="Times New Roman" panose="02020603050405020304" pitchFamily="18" charset="0"/>
                 <a:cs typeface="Times New Roman" panose="02020603050405020304" pitchFamily="18" charset="0"/>
               </a:rPr>
               <a:t>simple numpy on unstaggered grid; V=0 for checkerboard w !</a:t>
             </a:r>
-            <a:endParaRPr kumimoji="0" lang="en-US" sz="4400" b="0" i="1" u="none" strike="noStrike" kern="1200" cap="none" spc="0" normalizeH="0" baseline="0" noProof="0">
-              <a:ln>
-                <a:noFill/>
-              </a:ln>
+            <a:endParaRPr lang="en-US" sz="2844" i="1">
               <a:solidFill>
                 <a:prstClr val="black"/>
               </a:solidFill>
-              <a:effectLst/>
-              <a:uLnTx/>
-              <a:uFillTx/>
               <a:latin typeface="Times New Roman" panose="02020603050405020304" pitchFamily="18" charset="0"/>
-              <a:ea typeface="+mn-ea"/>
               <a:cs typeface="Times New Roman" panose="02020603050405020304" pitchFamily="18" charset="0"/>
             </a:endParaRPr>
           </a:p>
           <a:p>
-            <a:pPr marL="2194560" marR="0" lvl="1" indent="0" algn="l" defTabSz="2194560" rtl="0" eaLnBrk="1" fontAlgn="auto" latinLnBrk="0" hangingPunct="1">
-              <a:lnSpc>
-                <a:spcPct val="100000"/>
-              </a:lnSpc>
-              <a:spcBef>
-                <a:spcPts val="0"/>
-              </a:spcBef>
-              <a:spcAft>
-                <a:spcPts val="0"/>
-              </a:spcAft>
-              <a:buClrTx/>
-              <a:buSzTx/>
-              <a:buFontTx/>
-              <a:buNone/>
-              <a:tabLst/>
+            <a:pPr marL="1418692" lvl="1" defTabSz="1418692">
               <a:defRPr/>
             </a:pPr>
-            <a:endParaRPr lang="en-US" sz="4800"/>
-          </a:p>
-          <a:p>
-            <a:pPr marL="685800" indent="-685800">
+            <a:endParaRPr lang="en-US" sz="3103"/>
+          </a:p>
+          <a:p>
+            <a:pPr marL="443341" indent="-443341">
               <a:buFont typeface="Arial" panose="020B0604020202020204" pitchFamily="34" charset="0"/>
               <a:buChar char="•"/>
             </a:pPr>
             <a:r>
-              <a:rPr lang="en-US" sz="4800" b="1">
+              <a:rPr lang="en-US" sz="3103" b="1">
                 <a:latin typeface="Times New Roman" panose="02020603050405020304" pitchFamily="18" charset="0"/>
                 <a:cs typeface="Times New Roman" panose="02020603050405020304" pitchFamily="18" charset="0"/>
               </a:rPr>
               <a:t>Randomly generate</a:t>
             </a:r>
             <a:r>
-              <a:rPr lang="en-US" sz="4800">
+              <a:rPr lang="en-US" sz="3103">
                 <a:latin typeface="Times New Roman" panose="02020603050405020304" pitchFamily="18" charset="0"/>
                 <a:cs typeface="Times New Roman" panose="02020603050405020304" pitchFamily="18" charset="0"/>
               </a:rPr>
               <a:t> configurations: thousands 16*15*14*13 = </a:t>
             </a:r>
             <a:r>
-              <a:rPr lang="en-US" sz="4800"/>
+              <a:rPr lang="en-US" sz="3103"/>
               <a:t>43680</a:t>
             </a:r>
             <a:r>
-              <a:rPr lang="en-US" sz="4800">
+              <a:rPr lang="en-US" sz="3103">
                 <a:latin typeface="Times New Roman" panose="02020603050405020304" pitchFamily="18" charset="0"/>
                 <a:cs typeface="Times New Roman" panose="02020603050405020304" pitchFamily="18" charset="0"/>
               </a:rPr>
@@ -4658,19 +4616,19 @@
             </a:r>
           </a:p>
           <a:p>
-            <a:pPr marL="685800" indent="-685800">
+            <a:pPr marL="443341" indent="-443341">
               <a:buFont typeface="Arial" panose="020B0604020202020204" pitchFamily="34" charset="0"/>
               <a:buChar char="•"/>
             </a:pPr>
             <a:r>
-              <a:rPr lang="en-US" sz="4800">
+              <a:rPr lang="en-US" sz="3103">
                 <a:latin typeface="Times New Roman" panose="02020603050405020304" pitchFamily="18" charset="0"/>
                 <a:cs typeface="Times New Roman" panose="02020603050405020304" pitchFamily="18" charset="0"/>
               </a:rPr>
               <a:t>Distinguish </a:t>
             </a:r>
             <a:r>
-              <a:rPr lang="en-US" sz="4800">
+              <a:rPr lang="en-US" sz="3103">
                 <a:solidFill>
                   <a:srgbClr val="0070C0"/>
                 </a:solidFill>
@@ -4680,14 +4638,14 @@
               <a:t>equivalencies</a:t>
             </a:r>
             <a:r>
-              <a:rPr lang="en-US" sz="4800">
+              <a:rPr lang="en-US" sz="3103">
                 <a:latin typeface="Times New Roman" panose="02020603050405020304" pitchFamily="18" charset="0"/>
                 <a:cs typeface="Times New Roman" panose="02020603050405020304" pitchFamily="18" charset="0"/>
               </a:rPr>
               <a:t> by domain-mean </a:t>
             </a:r>
             <a:r>
-              <a:rPr lang="en-US" sz="4800">
+              <a:rPr lang="en-US" sz="3103">
                 <a:solidFill>
                   <a:srgbClr val="0070C0"/>
                 </a:solidFill>
@@ -4697,7 +4655,7 @@
               <a:t>[ |</a:t>
             </a:r>
             <a:r>
-              <a:rPr lang="en-US" sz="4800" b="1">
+              <a:rPr lang="en-US" sz="3103" b="1">
                 <a:solidFill>
                   <a:srgbClr val="0070C0"/>
                 </a:solidFill>
@@ -4707,7 +4665,7 @@
               <a:t>V</a:t>
             </a:r>
             <a:r>
-              <a:rPr lang="en-US" sz="4800">
+              <a:rPr lang="en-US" sz="3103">
                 <a:solidFill>
                   <a:srgbClr val="0070C0"/>
                 </a:solidFill>
@@ -4717,14 +4675,14 @@
               <a:t>| ], </a:t>
             </a:r>
             <a:r>
-              <a:rPr lang="en-US" sz="4800">
+              <a:rPr lang="en-US" sz="3103">
                 <a:latin typeface="Times New Roman" panose="02020603050405020304" pitchFamily="18" charset="0"/>
                 <a:cs typeface="Times New Roman" panose="02020603050405020304" pitchFamily="18" charset="0"/>
               </a:rPr>
               <a:t>and</a:t>
             </a:r>
             <a:r>
-              <a:rPr lang="en-US" sz="4800">
+              <a:rPr lang="en-US" sz="3103">
                 <a:solidFill>
                   <a:srgbClr val="0070C0"/>
                 </a:solidFill>
@@ -4734,7 +4692,7 @@
               <a:t> [ N</a:t>
             </a:r>
             <a:r>
-              <a:rPr lang="en-US" sz="4800" baseline="-25000">
+              <a:rPr lang="en-US" sz="3103" baseline="-25000">
                 <a:solidFill>
                   <a:srgbClr val="0070C0"/>
                 </a:solidFill>
@@ -4744,7 +4702,7 @@
               <a:t>4</a:t>
             </a:r>
             <a:r>
-              <a:rPr lang="en-US" sz="4800">
+              <a:rPr lang="en-US" sz="3103">
                 <a:solidFill>
                   <a:srgbClr val="0070C0"/>
                 </a:solidFill>
@@ -4754,7 +4712,7 @@
               <a:t>_neighbors</a:t>
             </a:r>
             <a:r>
-              <a:rPr lang="en-US" sz="4800" baseline="30000">
+              <a:rPr lang="en-US" sz="3103" baseline="30000">
                 <a:solidFill>
                   <a:srgbClr val="0070C0"/>
                 </a:solidFill>
@@ -4764,7 +4722,7 @@
               <a:t>2</a:t>
             </a:r>
             <a:r>
-              <a:rPr lang="en-US" sz="4800">
+              <a:rPr lang="en-US" sz="3103">
                 <a:solidFill>
                   <a:srgbClr val="0070C0"/>
                 </a:solidFill>
@@ -4777,77 +4735,77 @@
           <a:p>
             <a:pPr lvl="1"/>
             <a:r>
-              <a:rPr lang="en-US" sz="3600">
+              <a:rPr lang="en-US" sz="2327">
                 <a:latin typeface="Times New Roman" panose="02020603050405020304" pitchFamily="18" charset="0"/>
                 <a:cs typeface="Times New Roman" panose="02020603050405020304" pitchFamily="18" charset="0"/>
               </a:rPr>
               <a:t>2 things that shape Prob(w @t+1) pattern:             F</a:t>
             </a:r>
             <a:r>
-              <a:rPr lang="en-US" sz="3600" baseline="-25000">
+              <a:rPr lang="en-US" sz="2327" baseline="-25000">
                 <a:latin typeface="Times New Roman" panose="02020603050405020304" pitchFamily="18" charset="0"/>
                 <a:cs typeface="Times New Roman" panose="02020603050405020304" pitchFamily="18" charset="0"/>
               </a:rPr>
               <a:t>sfc</a:t>
             </a:r>
             <a:r>
-              <a:rPr lang="en-US" sz="3600">
+              <a:rPr lang="en-US" sz="2327">
                 <a:latin typeface="Times New Roman" panose="02020603050405020304" pitchFamily="18" charset="0"/>
                 <a:cs typeface="Times New Roman" panose="02020603050405020304" pitchFamily="18" charset="0"/>
               </a:rPr>
               <a:t> </a:t>
             </a:r>
             <a:r>
-              <a:rPr lang="en-US" sz="3600">
+              <a:rPr lang="en-US" sz="2327">
                 <a:latin typeface="Symbol" pitchFamily="2" charset="2"/>
                 <a:cs typeface="Times New Roman" panose="02020603050405020304" pitchFamily="18" charset="0"/>
               </a:rPr>
               <a:t>a </a:t>
             </a:r>
             <a:r>
-              <a:rPr lang="en-US" sz="3600">
+              <a:rPr lang="en-US" sz="2327">
                 <a:latin typeface="Times New Roman" panose="02020603050405020304" pitchFamily="18" charset="0"/>
                 <a:cs typeface="Times New Roman" panose="02020603050405020304" pitchFamily="18" charset="0"/>
               </a:rPr>
               <a:t>|</a:t>
             </a:r>
             <a:r>
-              <a:rPr lang="en-US" sz="3600" b="1">
+              <a:rPr lang="en-US" sz="2327" b="1">
                 <a:latin typeface="Times New Roman" panose="02020603050405020304" pitchFamily="18" charset="0"/>
                 <a:cs typeface="Times New Roman" panose="02020603050405020304" pitchFamily="18" charset="0"/>
               </a:rPr>
               <a:t>V</a:t>
             </a:r>
             <a:r>
-              <a:rPr lang="en-US" sz="3600">
+              <a:rPr lang="en-US" sz="2327">
                 <a:latin typeface="Times New Roman" panose="02020603050405020304" pitchFamily="18" charset="0"/>
                 <a:cs typeface="Times New Roman" panose="02020603050405020304" pitchFamily="18" charset="0"/>
               </a:rPr>
               <a:t>|;          Entrainment </a:t>
             </a:r>
             <a:r>
-              <a:rPr lang="en-US" sz="3600">
+              <a:rPr lang="en-US" sz="2327">
                 <a:latin typeface="Symbol" pitchFamily="2" charset="2"/>
                 <a:cs typeface="Times New Roman" panose="02020603050405020304" pitchFamily="18" charset="0"/>
               </a:rPr>
               <a:t>a (</a:t>
             </a:r>
             <a:r>
-              <a:rPr lang="en-US" sz="3600">
+              <a:rPr lang="en-US" sz="2327">
                 <a:latin typeface="Times New Roman" panose="02020603050405020304" pitchFamily="18" charset="0"/>
                 <a:cs typeface="Times New Roman" panose="02020603050405020304" pitchFamily="18" charset="0"/>
               </a:rPr>
               <a:t>4-N</a:t>
             </a:r>
             <a:r>
-              <a:rPr lang="en-US" sz="3600" baseline="-25000">
+              <a:rPr lang="en-US" sz="2327" baseline="-25000">
                 <a:latin typeface="Times New Roman" panose="02020603050405020304" pitchFamily="18" charset="0"/>
                 <a:cs typeface="Times New Roman" panose="02020603050405020304" pitchFamily="18" charset="0"/>
               </a:rPr>
               <a:t>4</a:t>
             </a:r>
             <a:r>
-              <a:rPr lang="en-US" sz="3600">
+              <a:rPr lang="en-US" sz="2327">
                 <a:latin typeface="Times New Roman" panose="02020603050405020304" pitchFamily="18" charset="0"/>
                 <a:cs typeface="Times New Roman" panose="02020603050405020304" pitchFamily="18" charset="0"/>
               </a:rPr>
@@ -4856,7 +4814,7 @@
           </a:p>
           <a:p>
             <a:pPr lvl="1"/>
-            <a:endParaRPr lang="en-US" sz="3600" dirty="0"/>
+            <a:endParaRPr lang="en-US" sz="2327" dirty="0"/>
           </a:p>
         </p:txBody>
       </p:sp>
@@ -4870,8 +4828,8 @@
         </p:nvSpPr>
         <p:spPr bwMode="auto">
           <a:xfrm>
-            <a:off x="23325894" y="26032790"/>
-            <a:ext cx="18594932" cy="3539430"/>
+            <a:off x="15522715" y="17161789"/>
+            <a:ext cx="12020966" cy="2319930"/>
           </a:xfrm>
           <a:prstGeom prst="rect">
             <a:avLst/>
@@ -4893,12 +4851,12 @@
           </a:bodyPr>
           <a:lstStyle/>
           <a:p>
-            <a:pPr marL="457200" indent="-457200">
+            <a:pPr marL="295562" indent="-295562">
               <a:buFont typeface="Arial" panose="020B0604020202020204" pitchFamily="34" charset="0"/>
               <a:buChar char="•"/>
             </a:pPr>
             <a:r>
-              <a:rPr lang="en-US" sz="3200" dirty="0">
+              <a:rPr lang="en-US" sz="2068" dirty="0">
                 <a:ea typeface="Arial" pitchFamily="-84" charset="0"/>
                 <a:cs typeface="Arial" pitchFamily="-84" charset="0"/>
               </a:rPr>
@@ -4906,64 +4864,64 @@
             </a:r>
           </a:p>
           <a:p>
-            <a:pPr marL="457200" indent="-457200">
+            <a:pPr marL="295562" indent="-295562">
               <a:buFont typeface="Arial" panose="020B0604020202020204" pitchFamily="34" charset="0"/>
               <a:buChar char="•"/>
             </a:pPr>
             <a:r>
-              <a:rPr lang="en-US" sz="3200" dirty="0">
+              <a:rPr lang="en-US" sz="2068" dirty="0">
                 <a:ea typeface="Arial" pitchFamily="-84" charset="0"/>
                 <a:cs typeface="Arial" pitchFamily="-84" charset="0"/>
               </a:rPr>
               <a:t> Welcome to combinatorics, and life!    </a:t>
             </a:r>
             <a:r>
-              <a:rPr lang="en-US" sz="3200" b="1" i="1" dirty="0">
+              <a:rPr lang="en-US" sz="2068" b="1" i="1" dirty="0">
                 <a:ea typeface="Arial" pitchFamily="-84" charset="0"/>
                 <a:cs typeface="Arial" pitchFamily="-84" charset="0"/>
               </a:rPr>
               <a:t>Pleiotropy.    </a:t>
             </a:r>
             <a:r>
-              <a:rPr lang="en-US" sz="3200" b="1" dirty="0">
+              <a:rPr lang="en-US" sz="2068" b="1" dirty="0">
                 <a:ea typeface="Arial" pitchFamily="-84" charset="0"/>
                 <a:cs typeface="Arial" pitchFamily="-84" charset="0"/>
               </a:rPr>
               <a:t>How can back-propagation of evo. selection work?? </a:t>
             </a:r>
-            <a:endParaRPr lang="en-US" sz="3200" b="1" i="1" dirty="0">
+            <a:endParaRPr lang="en-US" sz="2068" b="1" i="1" dirty="0">
               <a:ea typeface="Arial" pitchFamily="-84" charset="0"/>
               <a:cs typeface="Arial" pitchFamily="-84" charset="0"/>
             </a:endParaRPr>
           </a:p>
           <a:p>
-            <a:pPr marL="457200" indent="-457200">
+            <a:pPr marL="295562" indent="-295562">
               <a:buFont typeface="Arial" panose="020B0604020202020204" pitchFamily="34" charset="0"/>
               <a:buChar char="•"/>
             </a:pPr>
             <a:r>
-              <a:rPr lang="en-US" sz="3200" dirty="0">
+              <a:rPr lang="en-US" sz="2068" dirty="0">
                 <a:ea typeface="Arial" pitchFamily="-84" charset="0"/>
                 <a:cs typeface="Arial" pitchFamily="-84" charset="0"/>
               </a:rPr>
               <a:t>Absurdly many </a:t>
             </a:r>
             <a:r>
-              <a:rPr lang="en-US" sz="3200" i="1" dirty="0">
+              <a:rPr lang="en-US" sz="2068" i="1" dirty="0">
                 <a:ea typeface="Arial" pitchFamily="-84" charset="0"/>
                 <a:cs typeface="Arial" pitchFamily="-84" charset="0"/>
               </a:rPr>
               <a:t>configurations</a:t>
             </a:r>
             <a:r>
-              <a:rPr lang="en-US" sz="3200" dirty="0">
+              <a:rPr lang="en-US" sz="2068" dirty="0">
                 <a:ea typeface="Arial" pitchFamily="-84" charset="0"/>
                 <a:cs typeface="Arial" pitchFamily="-84" charset="0"/>
               </a:rPr>
               <a:t> (e.g., DNA) </a:t>
             </a:r>
             <a:r>
-              <a:rPr lang="en-US" sz="3200" dirty="0">
+              <a:rPr lang="en-US" sz="2068" dirty="0">
                 <a:ea typeface="Arial" pitchFamily="-84" charset="0"/>
                 <a:cs typeface="Arial" pitchFamily="-84" charset="0"/>
                 <a:sym typeface="Wingdings" pitchFamily="2" charset="2"/>
@@ -4971,7 +4929,7 @@
               <a:t> several </a:t>
             </a:r>
             <a:r>
-              <a:rPr lang="en-US" sz="3200" i="1" dirty="0">
+              <a:rPr lang="en-US" sz="2068" i="1" dirty="0">
                 <a:ea typeface="Arial" pitchFamily="-84" charset="0"/>
                 <a:cs typeface="Arial" pitchFamily="-84" charset="0"/>
                 <a:sym typeface="Wingdings" pitchFamily="2" charset="2"/>
@@ -4979,7 +4937,7 @@
               <a:t>traits</a:t>
             </a:r>
             <a:r>
-              <a:rPr lang="en-US" sz="3200" dirty="0">
+              <a:rPr lang="en-US" sz="2068" dirty="0">
                 <a:ea typeface="Arial" pitchFamily="-84" charset="0"/>
                 <a:cs typeface="Arial" pitchFamily="-84" charset="0"/>
                 <a:sym typeface="Wingdings" pitchFamily="2" charset="2"/>
@@ -4987,21 +4945,21 @@
               <a:t>  binary </a:t>
             </a:r>
             <a:r>
-              <a:rPr lang="en-US" sz="3200" dirty="0">
+              <a:rPr lang="en-US" sz="2068" dirty="0">
                 <a:ea typeface="Arial" pitchFamily="-84" charset="0"/>
                 <a:cs typeface="Arial" pitchFamily="-84" charset="0"/>
               </a:rPr>
               <a:t>fitness </a:t>
             </a:r>
             <a:r>
-              <a:rPr lang="en-US" sz="3200" i="1" dirty="0">
+              <a:rPr lang="en-US" sz="2068" i="1" dirty="0">
                 <a:ea typeface="Arial" pitchFamily="-84" charset="0"/>
                 <a:cs typeface="Arial" pitchFamily="-84" charset="0"/>
               </a:rPr>
               <a:t>selection </a:t>
             </a:r>
             <a:r>
-              <a:rPr lang="en-US" sz="3200" dirty="0">
+              <a:rPr lang="en-US" sz="2068" dirty="0">
                 <a:ea typeface="Arial" pitchFamily="-84" charset="0"/>
                 <a:cs typeface="Arial" pitchFamily="-84" charset="0"/>
               </a:rPr>
@@ -5009,50 +4967,50 @@
             </a:r>
           </a:p>
           <a:p>
-            <a:pPr marL="457200" indent="-457200">
+            <a:pPr marL="295562" indent="-295562">
               <a:buFont typeface="Arial" panose="020B0604020202020204" pitchFamily="34" charset="0"/>
               <a:buChar char="•"/>
             </a:pPr>
-            <a:endParaRPr lang="en-US" sz="3200" dirty="0">
+            <a:endParaRPr lang="en-US" sz="2068" dirty="0">
               <a:ea typeface="Arial" pitchFamily="-84" charset="0"/>
               <a:cs typeface="Arial" pitchFamily="-84" charset="0"/>
             </a:endParaRPr>
           </a:p>
           <a:p>
-            <a:pPr marL="457200" indent="-457200">
+            <a:pPr marL="295562" indent="-295562">
               <a:buFont typeface="Arial" panose="020B0604020202020204" pitchFamily="34" charset="0"/>
               <a:buChar char="•"/>
             </a:pPr>
             <a:r>
-              <a:rPr lang="en-US" sz="3200" dirty="0">
+              <a:rPr lang="en-US" sz="2068" dirty="0">
                 <a:ea typeface="Arial" pitchFamily="-84" charset="0"/>
                 <a:cs typeface="Arial" pitchFamily="-84" charset="0"/>
               </a:rPr>
               <a:t>Unlikely but efficient configs can only discover themselves by </a:t>
             </a:r>
             <a:r>
-              <a:rPr lang="en-US" sz="3200" i="1" dirty="0">
+              <a:rPr lang="en-US" sz="2068" i="1" dirty="0">
                 <a:ea typeface="Arial" pitchFamily="-84" charset="0"/>
                 <a:cs typeface="Arial" pitchFamily="-84" charset="0"/>
               </a:rPr>
               <a:t>pathways</a:t>
             </a:r>
             <a:r>
-              <a:rPr lang="en-US" sz="3200" dirty="0">
+              <a:rPr lang="en-US" sz="2068" dirty="0">
                 <a:ea typeface="Arial" pitchFamily="-84" charset="0"/>
                 <a:cs typeface="Arial" pitchFamily="-84" charset="0"/>
               </a:rPr>
               <a:t> in vast config space</a:t>
             </a:r>
             <a:r>
-              <a:rPr lang="en-US" sz="3200" i="1" dirty="0">
+              <a:rPr lang="en-US" sz="2068" i="1" dirty="0">
                 <a:ea typeface="Arial" pitchFamily="-84" charset="0"/>
                 <a:cs typeface="Arial" pitchFamily="-84" charset="0"/>
               </a:rPr>
               <a:t>.  </a:t>
             </a:r>
             <a:r>
-              <a:rPr lang="en-US" sz="3200" i="1" u="sng" dirty="0">
+              <a:rPr lang="en-US" sz="2068" i="1" u="sng" dirty="0">
                 <a:ea typeface="Arial" pitchFamily="-84" charset="0"/>
                 <a:cs typeface="Arial" pitchFamily="-84" charset="0"/>
               </a:rPr>
@@ -5060,12 +5018,12 @@
             </a:r>
           </a:p>
           <a:p>
-            <a:pPr marL="2651760" lvl="1" indent="-457200">
+            <a:pPr marL="1714254" lvl="1" indent="-295562">
               <a:buFont typeface="Arial" panose="020B0604020202020204" pitchFamily="34" charset="0"/>
               <a:buChar char="•"/>
             </a:pPr>
             <a:r>
-              <a:rPr lang="en-US" sz="3200" dirty="0">
+              <a:rPr lang="en-US" sz="2068" dirty="0">
                 <a:ea typeface="Arial" pitchFamily="-84" charset="0"/>
                 <a:cs typeface="Arial" pitchFamily="-84" charset="0"/>
               </a:rPr>
@@ -5073,19 +5031,19 @@
             </a:r>
           </a:p>
           <a:p>
-            <a:pPr marL="2651760" lvl="1" indent="-457200">
+            <a:pPr marL="1714254" lvl="1" indent="-295562">
               <a:buFont typeface="Arial" panose="020B0604020202020204" pitchFamily="34" charset="0"/>
               <a:buChar char="•"/>
             </a:pPr>
             <a:r>
-              <a:rPr lang="en-US" sz="3200" dirty="0">
+              <a:rPr lang="en-US" sz="2068" dirty="0">
                 <a:ea typeface="Arial" pitchFamily="-84" charset="0"/>
                 <a:cs typeface="Arial" pitchFamily="-84" charset="0"/>
               </a:rPr>
               <a:t>In convection, </a:t>
             </a:r>
             <a:r>
-              <a:rPr lang="en-US" sz="3200" u="sng" dirty="0">
+              <a:rPr lang="en-US" sz="2068" u="sng" dirty="0">
                 <a:ea typeface="Arial" pitchFamily="-84" charset="0"/>
                 <a:cs typeface="Arial" pitchFamily="-84" charset="0"/>
               </a:rPr>
@@ -5104,8 +5062,8 @@
         </p:nvSpPr>
         <p:spPr bwMode="auto">
           <a:xfrm>
-            <a:off x="4531349" y="13538364"/>
-            <a:ext cx="16297410" cy="861774"/>
+            <a:off x="3372703" y="9084584"/>
+            <a:ext cx="10590747" cy="586890"/>
           </a:xfrm>
           <a:prstGeom prst="rect">
             <a:avLst/>
@@ -5128,21 +5086,21 @@
           <a:lstStyle/>
           <a:p>
             <a:r>
-              <a:rPr lang="en-US" sz="5000" b="1" dirty="0">
+              <a:rPr lang="en-US" sz="3232" b="1" dirty="0">
                 <a:ea typeface="Arial" pitchFamily="-84" charset="0"/>
                 <a:cs typeface="Arial" pitchFamily="-84" charset="0"/>
               </a:rPr>
               <a:t>2. Simplest, </a:t>
             </a:r>
             <a:r>
-              <a:rPr lang="en-US" sz="5000" b="1" i="1" dirty="0">
+              <a:rPr lang="en-US" sz="3232" b="1" i="1" dirty="0">
                 <a:ea typeface="Arial" pitchFamily="-84" charset="0"/>
                 <a:cs typeface="Arial" pitchFamily="-84" charset="0"/>
               </a:rPr>
               <a:t>enumerable</a:t>
             </a:r>
             <a:r>
-              <a:rPr lang="en-US" sz="5000" b="1" dirty="0">
+              <a:rPr lang="en-US" sz="3232" b="1" dirty="0">
                 <a:ea typeface="Arial" pitchFamily="-84" charset="0"/>
                 <a:cs typeface="Arial" pitchFamily="-84" charset="0"/>
               </a:rPr>
@@ -5165,8 +5123,8 @@
         </p:nvCxnSpPr>
         <p:spPr>
           <a:xfrm>
-            <a:off x="1562514" y="19190089"/>
-            <a:ext cx="20601432" cy="0"/>
+            <a:off x="1453457" y="12738224"/>
+            <a:ext cx="13318097" cy="0"/>
           </a:xfrm>
           <a:prstGeom prst="line">
             <a:avLst/>
@@ -5209,8 +5167,8 @@
         </p:blipFill>
         <p:spPr>
           <a:xfrm>
-            <a:off x="35148115" y="9022027"/>
-            <a:ext cx="3119029" cy="2840092"/>
+            <a:off x="23165361" y="6164934"/>
+            <a:ext cx="2016343" cy="1836019"/>
           </a:xfrm>
           <a:prstGeom prst="rect">
             <a:avLst/>
@@ -5233,8 +5191,8 @@
         </p:nvCxnSpPr>
         <p:spPr>
           <a:xfrm flipV="1">
-            <a:off x="31301235" y="9477261"/>
-            <a:ext cx="3998927" cy="1436331"/>
+            <a:off x="20678490" y="6459223"/>
+            <a:ext cx="2585165" cy="928537"/>
           </a:xfrm>
           <a:prstGeom prst="curvedConnector3">
             <a:avLst>
@@ -5280,8 +5238,8 @@
         </p:nvSpPr>
         <p:spPr bwMode="auto">
           <a:xfrm>
-            <a:off x="35428496" y="9120366"/>
-            <a:ext cx="2162772" cy="1200329"/>
+            <a:off x="23346617" y="6228504"/>
+            <a:ext cx="1435047" cy="805815"/>
           </a:xfrm>
           <a:prstGeom prst="rect">
             <a:avLst/>
@@ -5304,7 +5262,7 @@
           <a:lstStyle/>
           <a:p>
             <a:r>
-              <a:rPr lang="en-US" sz="3600" dirty="0">
+              <a:rPr lang="en-US" sz="2327" dirty="0">
                 <a:ea typeface="Arial" pitchFamily="-84" charset="0"/>
                 <a:cs typeface="Arial" pitchFamily="-84" charset="0"/>
               </a:rPr>
@@ -5313,13 +5271,13 @@
           </a:p>
           <a:p>
             <a:r>
-              <a:rPr lang="en-US" sz="3600" dirty="0">
+              <a:rPr lang="en-US" sz="2327" dirty="0">
                 <a:ea typeface="Arial" pitchFamily="-84" charset="0"/>
                 <a:cs typeface="Arial" pitchFamily="-84" charset="0"/>
               </a:rPr>
               <a:t>diag.</a:t>
             </a:r>
-            <a:endParaRPr lang="en-US" sz="5000" dirty="0">
+            <a:endParaRPr lang="en-US" sz="3232" dirty="0">
               <a:ea typeface="Arial" pitchFamily="-84" charset="0"/>
               <a:cs typeface="Arial" pitchFamily="-84" charset="0"/>
             </a:endParaRPr>
@@ -5342,8 +5300,8 @@
         </p:nvSpPr>
         <p:spPr bwMode="auto">
           <a:xfrm rot="19012541">
-            <a:off x="31703869" y="9808708"/>
-            <a:ext cx="2743199" cy="523220"/>
+            <a:off x="20938779" y="6658540"/>
+            <a:ext cx="1773381" cy="368151"/>
           </a:xfrm>
           <a:prstGeom prst="rect">
             <a:avLst/>
@@ -5367,13 +5325,13 @@
           <a:p>
             <a:pPr algn="ctr"/>
             <a:r>
-              <a:rPr lang="en-US" sz="2800" dirty="0">
+              <a:rPr lang="en-US" sz="1810" dirty="0">
                 <a:ea typeface="Arial" pitchFamily="-84" charset="0"/>
                 <a:cs typeface="Arial" pitchFamily="-84" charset="0"/>
               </a:rPr>
               <a:t>pure, sole</a:t>
             </a:r>
-            <a:endParaRPr lang="en-US" sz="4400" dirty="0">
+            <a:endParaRPr lang="en-US" sz="2844" dirty="0">
               <a:ea typeface="Arial" pitchFamily="-84" charset="0"/>
               <a:cs typeface="Arial" pitchFamily="-84" charset="0"/>
             </a:endParaRPr>
@@ -5396,8 +5354,8 @@
         </p:nvSpPr>
         <p:spPr bwMode="auto">
           <a:xfrm>
-            <a:off x="23145751" y="15408007"/>
-            <a:ext cx="18855842" cy="8556188"/>
+            <a:off x="15406256" y="10293242"/>
+            <a:ext cx="12189637" cy="5560434"/>
           </a:xfrm>
           <a:prstGeom prst="rect">
             <a:avLst/>
@@ -5421,7 +5379,7 @@
           <a:p>
             <a:pPr algn="ctr"/>
             <a:r>
-              <a:rPr lang="en-US" sz="5000" b="1" dirty="0">
+              <a:rPr lang="en-US" sz="3232" b="1" dirty="0">
                 <a:solidFill>
                   <a:srgbClr val="FF0000"/>
                 </a:solidFill>
@@ -5432,7 +5390,7 @@
               <a:t> E,F</a:t>
             </a:r>
             <a:r>
-              <a:rPr lang="en-US" sz="5000" b="1" dirty="0">
+              <a:rPr lang="en-US" sz="3232" b="1" dirty="0">
                 <a:latin typeface="Times New Roman" panose="02020603050405020304" pitchFamily="18" charset="0"/>
                 <a:ea typeface="Arial" pitchFamily="-84" charset="0"/>
                 <a:cs typeface="Times New Roman" panose="02020603050405020304" pitchFamily="18" charset="0"/>
@@ -5440,7 +5398,7 @@
               <a:t> (nonlocal) most interesting for </a:t>
             </a:r>
             <a:r>
-              <a:rPr lang="en-US" sz="5000" b="1" i="1" dirty="0">
+              <a:rPr lang="en-US" sz="3232" b="1" i="1" dirty="0">
                 <a:latin typeface="Times New Roman" panose="02020603050405020304" pitchFamily="18" charset="0"/>
                 <a:ea typeface="Arial" pitchFamily="-84" charset="0"/>
                 <a:cs typeface="Times New Roman" panose="02020603050405020304" pitchFamily="18" charset="0"/>
@@ -5448,14 +5406,14 @@
               <a:t>contingent</a:t>
             </a:r>
             <a:r>
-              <a:rPr lang="en-US" sz="5000" b="1" dirty="0">
+              <a:rPr lang="en-US" sz="3232" b="1" dirty="0">
                 <a:latin typeface="Times New Roman" panose="02020603050405020304" pitchFamily="18" charset="0"/>
                 <a:ea typeface="Arial" pitchFamily="-84" charset="0"/>
                 <a:cs typeface="Times New Roman" panose="02020603050405020304" pitchFamily="18" charset="0"/>
               </a:rPr>
               <a:t> evolution...</a:t>
             </a:r>
-            <a:endParaRPr lang="en-US" sz="5000" b="1" i="1" dirty="0">
+            <a:endParaRPr lang="en-US" sz="3232" b="1" i="1" dirty="0">
               <a:latin typeface="Times New Roman" panose="02020603050405020304" pitchFamily="18" charset="0"/>
               <a:ea typeface="Arial" pitchFamily="-84" charset="0"/>
               <a:cs typeface="Times New Roman" panose="02020603050405020304" pitchFamily="18" charset="0"/>
@@ -5463,12 +5421,12 @@
             </a:endParaRPr>
           </a:p>
           <a:p>
-            <a:pPr marL="914400" indent="-914400">
+            <a:pPr marL="591122" indent="-591122">
               <a:buFont typeface="+mj-lt"/>
               <a:buAutoNum type="arabicPeriod"/>
             </a:pPr>
             <a:r>
-              <a:rPr lang="en-US" sz="5000" dirty="0">
+              <a:rPr lang="en-US" sz="3232" dirty="0">
                 <a:latin typeface="Times New Roman" panose="02020603050405020304" pitchFamily="18" charset="0"/>
                 <a:ea typeface="Arial" pitchFamily="-84" charset="0"/>
                 <a:cs typeface="Times New Roman" panose="02020603050405020304" pitchFamily="18" charset="0"/>
@@ -5476,7 +5434,7 @@
               <a:t>Construct P</a:t>
             </a:r>
             <a:r>
-              <a:rPr lang="en-US" sz="5000" baseline="-25000" dirty="0">
+              <a:rPr lang="en-US" sz="3232" baseline="-25000" dirty="0">
                 <a:latin typeface="Times New Roman" panose="02020603050405020304" pitchFamily="18" charset="0"/>
                 <a:ea typeface="Arial" pitchFamily="-84" charset="0"/>
                 <a:cs typeface="Times New Roman" panose="02020603050405020304" pitchFamily="18" charset="0"/>
@@ -5484,7 +5442,7 @@
               <a:t>w</a:t>
             </a:r>
             <a:r>
-              <a:rPr lang="en-US" sz="5000" dirty="0">
+              <a:rPr lang="en-US" sz="3232" dirty="0">
                 <a:latin typeface="Times New Roman" panose="02020603050405020304" pitchFamily="18" charset="0"/>
                 <a:ea typeface="Arial" pitchFamily="-84" charset="0"/>
                 <a:cs typeface="Times New Roman" panose="02020603050405020304" pitchFamily="18" charset="0"/>
@@ -5492,7 +5450,7 @@
               <a:t>(x,y, t+1; </a:t>
             </a:r>
             <a:r>
-              <a:rPr lang="en-US" sz="5000" dirty="0">
+              <a:rPr lang="en-US" sz="3232" dirty="0">
                 <a:solidFill>
                   <a:srgbClr val="FF0000"/>
                 </a:solidFill>
@@ -5503,7 +5461,7 @@
               <a:t>W,R,E,F</a:t>
             </a:r>
             <a:r>
-              <a:rPr lang="en-US" sz="5000" dirty="0">
+              <a:rPr lang="en-US" sz="3232" dirty="0">
                 <a:latin typeface="Times New Roman" panose="02020603050405020304" pitchFamily="18" charset="0"/>
                 <a:ea typeface="Arial" pitchFamily="-84" charset="0"/>
                 <a:cs typeface="Times New Roman" panose="02020603050405020304" pitchFamily="18" charset="0"/>
@@ -5512,12 +5470,12 @@
             </a:r>
           </a:p>
           <a:p>
-            <a:pPr marL="914400" indent="-914400">
+            <a:pPr marL="591122" indent="-591122">
               <a:buFont typeface="+mj-lt"/>
               <a:buAutoNum type="arabicPeriod"/>
             </a:pPr>
             <a:r>
-              <a:rPr lang="en-US" sz="5000" dirty="0">
+              <a:rPr lang="en-US" sz="3232" dirty="0">
                 <a:latin typeface="Times New Roman" panose="02020603050405020304" pitchFamily="18" charset="0"/>
                 <a:ea typeface="Arial" pitchFamily="-84" charset="0"/>
                 <a:cs typeface="Times New Roman" panose="02020603050405020304" pitchFamily="18" charset="0"/>
@@ -5526,12 +5484,12 @@
             </a:r>
           </a:p>
           <a:p>
-            <a:pPr marL="914400" indent="-914400">
+            <a:pPr marL="591122" indent="-591122">
               <a:buFont typeface="+mj-lt"/>
               <a:buAutoNum type="arabicPeriod"/>
             </a:pPr>
             <a:r>
-              <a:rPr lang="en-US" sz="5000" dirty="0">
+              <a:rPr lang="en-US" sz="3232" dirty="0">
                 <a:latin typeface="Times New Roman" panose="02020603050405020304" pitchFamily="18" charset="0"/>
                 <a:ea typeface="Arial" pitchFamily="-84" charset="0"/>
                 <a:cs typeface="Times New Roman" panose="02020603050405020304" pitchFamily="18" charset="0"/>
@@ -5541,18 +5499,18 @@
             </a:r>
           </a:p>
           <a:p>
-            <a:pPr marL="914400" indent="-914400">
+            <a:pPr marL="591122" indent="-591122">
               <a:buFont typeface="+mj-lt"/>
               <a:buAutoNum type="arabicPeriod"/>
             </a:pPr>
-            <a:endParaRPr lang="en-US" sz="5000" dirty="0">
+            <a:endParaRPr lang="en-US" sz="3232" dirty="0">
               <a:ea typeface="Arial" pitchFamily="-84" charset="0"/>
               <a:cs typeface="Arial" pitchFamily="-84" charset="0"/>
               <a:sym typeface="Wingdings" pitchFamily="2" charset="2"/>
             </a:endParaRPr>
           </a:p>
           <a:p>
-            <a:endParaRPr lang="en-US" sz="5000" dirty="0">
+            <a:endParaRPr lang="en-US" sz="3232" dirty="0">
               <a:ea typeface="Arial" pitchFamily="-84" charset="0"/>
               <a:cs typeface="Arial" pitchFamily="-84" charset="0"/>
               <a:sym typeface="Wingdings" pitchFamily="2" charset="2"/>
@@ -5560,7 +5518,7 @@
           </a:p>
           <a:p>
             <a:r>
-              <a:rPr lang="en-US" sz="5000" b="1" i="1" dirty="0">
+              <a:rPr lang="en-US" sz="3232" b="1" i="1" dirty="0">
                 <a:latin typeface="Times New Roman" panose="02020603050405020304" pitchFamily="18" charset="0"/>
                 <a:ea typeface="Arial" pitchFamily="-84" charset="0"/>
                 <a:cs typeface="Times New Roman" panose="02020603050405020304" pitchFamily="18" charset="0"/>
@@ -5569,28 +5527,28 @@
             </a:r>
           </a:p>
           <a:p>
-            <a:endParaRPr lang="en-US" sz="5000" dirty="0">
+            <a:endParaRPr lang="en-US" sz="3232" dirty="0">
               <a:latin typeface="Times New Roman" panose="02020603050405020304" pitchFamily="18" charset="0"/>
               <a:ea typeface="Arial" pitchFamily="-84" charset="0"/>
               <a:cs typeface="Times New Roman" panose="02020603050405020304" pitchFamily="18" charset="0"/>
             </a:endParaRPr>
           </a:p>
           <a:p>
-            <a:endParaRPr lang="en-US" sz="5000" dirty="0">
+            <a:endParaRPr lang="en-US" sz="3232" dirty="0">
               <a:latin typeface="Times New Roman" panose="02020603050405020304" pitchFamily="18" charset="0"/>
               <a:ea typeface="Arial" pitchFamily="-84" charset="0"/>
               <a:cs typeface="Times New Roman" panose="02020603050405020304" pitchFamily="18" charset="0"/>
             </a:endParaRPr>
           </a:p>
           <a:p>
-            <a:endParaRPr lang="en-US" sz="5000" dirty="0">
+            <a:endParaRPr lang="en-US" sz="3232" dirty="0">
               <a:latin typeface="Times New Roman" panose="02020603050405020304" pitchFamily="18" charset="0"/>
               <a:ea typeface="Arial" pitchFamily="-84" charset="0"/>
               <a:cs typeface="Times New Roman" panose="02020603050405020304" pitchFamily="18" charset="0"/>
             </a:endParaRPr>
           </a:p>
           <a:p>
-            <a:endParaRPr lang="en-US" sz="5000" dirty="0">
+            <a:endParaRPr lang="en-US" sz="3232" dirty="0">
               <a:latin typeface="Times New Roman" panose="02020603050405020304" pitchFamily="18" charset="0"/>
               <a:ea typeface="Arial" pitchFamily="-84" charset="0"/>
               <a:cs typeface="Times New Roman" panose="02020603050405020304" pitchFamily="18" charset="0"/>
@@ -5614,8 +5572,8 @@
         </p:nvSpPr>
         <p:spPr bwMode="auto">
           <a:xfrm>
-            <a:off x="38411678" y="13896443"/>
-            <a:ext cx="3589915" cy="461665"/>
+            <a:off x="25275140" y="9316068"/>
+            <a:ext cx="2320752" cy="328295"/>
           </a:xfrm>
           <a:prstGeom prst="rect">
             <a:avLst/>
@@ -5639,7 +5597,7 @@
           <a:p>
             <a:pPr algn="ctr"/>
             <a:r>
-              <a:rPr lang="en-US" sz="2400" dirty="0">
+              <a:rPr lang="en-US" sz="1552" dirty="0">
                 <a:solidFill>
                   <a:schemeClr val="accent6">
                     <a:lumMod val="75000"/>
@@ -5651,7 +5609,7 @@
               </a:rPr>
               <a:t>unconditional on t=t</a:t>
             </a:r>
-            <a:endParaRPr lang="en-US" sz="2400" dirty="0">
+            <a:endParaRPr lang="en-US" sz="1552" dirty="0">
               <a:solidFill>
                 <a:schemeClr val="accent6">
                   <a:lumMod val="75000"/>
@@ -5685,8 +5643,8 @@
         </p:blipFill>
         <p:spPr>
           <a:xfrm>
-            <a:off x="38676391" y="11551004"/>
-            <a:ext cx="3447588" cy="3020453"/>
+            <a:off x="25446268" y="7799824"/>
+            <a:ext cx="2228744" cy="1952617"/>
           </a:xfrm>
           <a:prstGeom prst="rect">
             <a:avLst/>
@@ -5709,8 +5667,8 @@
         </p:nvCxnSpPr>
         <p:spPr>
           <a:xfrm>
-            <a:off x="33997392" y="11592784"/>
-            <a:ext cx="5074158" cy="1141693"/>
+            <a:off x="22421460" y="7826835"/>
+            <a:ext cx="3280264" cy="738064"/>
           </a:xfrm>
           <a:prstGeom prst="curvedConnector3">
             <a:avLst>
@@ -5756,8 +5714,8 @@
         </p:nvSpPr>
         <p:spPr bwMode="auto">
           <a:xfrm rot="18722293">
-            <a:off x="38698485" y="10439533"/>
-            <a:ext cx="3589915" cy="830997"/>
+            <a:off x="25460550" y="7066381"/>
+            <a:ext cx="2320752" cy="567055"/>
           </a:xfrm>
           <a:prstGeom prst="rect">
             <a:avLst/>
@@ -5781,7 +5739,7 @@
           <a:p>
             <a:pPr algn="ctr"/>
             <a:r>
-              <a:rPr lang="en-US" sz="2400" b="1" dirty="0">
+              <a:rPr lang="en-US" sz="1552" b="1" dirty="0">
                 <a:solidFill>
                   <a:schemeClr val="accent6">
                     <a:lumMod val="75000"/>
@@ -5794,7 +5752,7 @@
               <a:t>       9</a:t>
             </a:r>
             <a:r>
-              <a:rPr lang="en-US" sz="2400" b="1" dirty="0">
+              <a:rPr lang="en-US" sz="1552" b="1" dirty="0">
                 <a:solidFill>
                   <a:schemeClr val="accent6">
                     <a:lumMod val="75000"/>
@@ -5809,7 +5767,7 @@
           <a:p>
             <a:pPr algn="ctr"/>
             <a:r>
-              <a:rPr lang="en-US" sz="2400" b="1" dirty="0">
+              <a:rPr lang="en-US" sz="1552" b="1" dirty="0">
                 <a:solidFill>
                   <a:schemeClr val="accent6">
                     <a:lumMod val="75000"/>
@@ -5839,8 +5797,8 @@
         </p:nvSpPr>
         <p:spPr bwMode="auto">
           <a:xfrm>
-            <a:off x="39185536" y="12019467"/>
-            <a:ext cx="2271666" cy="1815882"/>
+            <a:off x="25775410" y="8102672"/>
+            <a:ext cx="1468552" cy="1203997"/>
           </a:xfrm>
           <a:prstGeom prst="rect">
             <a:avLst/>
@@ -5864,7 +5822,7 @@
           <a:p>
             <a:pPr algn="ctr"/>
             <a:r>
-              <a:rPr lang="en-US" sz="2800" dirty="0">
+              <a:rPr lang="en-US" sz="1810" dirty="0">
                 <a:solidFill>
                   <a:srgbClr val="FFC000"/>
                 </a:solidFill>
@@ -5899,8 +5857,8 @@
         </p:blipFill>
         <p:spPr>
           <a:xfrm>
-            <a:off x="2084469" y="20964702"/>
-            <a:ext cx="10133715" cy="10424012"/>
+            <a:off x="1790881" y="13885451"/>
+            <a:ext cx="6551088" cy="6738755"/>
           </a:xfrm>
           <a:prstGeom prst="rect">
             <a:avLst/>
@@ -5923,8 +5881,8 @@
         </p:nvSpPr>
         <p:spPr bwMode="auto">
           <a:xfrm>
-            <a:off x="3309891" y="30125775"/>
-            <a:ext cx="10871104" cy="1323439"/>
+            <a:off x="2583074" y="19807761"/>
+            <a:ext cx="7027785" cy="885526"/>
           </a:xfrm>
           <a:prstGeom prst="rect">
             <a:avLst/>
@@ -5947,7 +5905,7 @@
           <a:lstStyle/>
           <a:p>
             <a:r>
-              <a:rPr lang="en-US" sz="4000" b="1" dirty="0">
+              <a:rPr lang="en-US" sz="2586" b="1" dirty="0">
                 <a:solidFill>
                   <a:schemeClr val="accent6">
                     <a:lumMod val="75000"/>
@@ -5960,7 +5918,7 @@
               <a:t></a:t>
             </a:r>
             <a:r>
-              <a:rPr lang="en-US" sz="4000" b="1" dirty="0">
+              <a:rPr lang="en-US" sz="2586" b="1" dirty="0">
                 <a:solidFill>
                   <a:schemeClr val="accent6">
                     <a:lumMod val="75000"/>
@@ -5974,7 +5932,7 @@
           </a:p>
           <a:p>
             <a:r>
-              <a:rPr lang="en-US" sz="4000" b="1" dirty="0">
+              <a:rPr lang="en-US" sz="2586" b="1" dirty="0">
                 <a:solidFill>
                   <a:schemeClr val="accent6">
                     <a:lumMod val="75000"/>
@@ -6010,8 +5968,8 @@
         </p:blipFill>
         <p:spPr>
           <a:xfrm>
-            <a:off x="37351885" y="20388382"/>
-            <a:ext cx="4140200" cy="4267200"/>
+            <a:off x="24590019" y="13512879"/>
+            <a:ext cx="2676493" cy="2758594"/>
           </a:xfrm>
           <a:prstGeom prst="rect">
             <a:avLst/>
@@ -6040,8 +5998,8 @@
         </p:blipFill>
         <p:spPr>
           <a:xfrm>
-            <a:off x="33003185" y="20370793"/>
-            <a:ext cx="4127500" cy="4267200"/>
+            <a:off x="21778740" y="13501507"/>
+            <a:ext cx="2668283" cy="2758594"/>
           </a:xfrm>
           <a:prstGeom prst="rect">
             <a:avLst/>
@@ -6070,8 +6028,8 @@
         </p:blipFill>
         <p:spPr>
           <a:xfrm>
-            <a:off x="27217487" y="20370793"/>
-            <a:ext cx="4140200" cy="4267200"/>
+            <a:off x="18038489" y="13501507"/>
+            <a:ext cx="2676493" cy="2758594"/>
           </a:xfrm>
           <a:prstGeom prst="rect">
             <a:avLst/>
@@ -6100,8 +6058,8 @@
         </p:blipFill>
         <p:spPr>
           <a:xfrm>
-            <a:off x="23089987" y="20388382"/>
-            <a:ext cx="4127500" cy="4267200"/>
+            <a:off x="15370207" y="13512879"/>
+            <a:ext cx="2668283" cy="2758594"/>
           </a:xfrm>
           <a:prstGeom prst="rect">
             <a:avLst/>
@@ -6124,8 +6082,8 @@
         </p:nvSpPr>
         <p:spPr bwMode="auto">
           <a:xfrm>
-            <a:off x="32815617" y="19200130"/>
-            <a:ext cx="9105209" cy="861774"/>
+            <a:off x="21657484" y="12744714"/>
+            <a:ext cx="5886196" cy="586890"/>
           </a:xfrm>
           <a:prstGeom prst="rect">
             <a:avLst/>
@@ -6149,7 +6107,7 @@
           <a:p>
             <a:pPr algn="ctr"/>
             <a:r>
-              <a:rPr lang="en-US" sz="5000" b="1" dirty="0">
+              <a:rPr lang="en-US" sz="3232" b="1" dirty="0">
                 <a:solidFill>
                   <a:srgbClr val="FF0000"/>
                 </a:solidFill>
@@ -6160,7 +6118,7 @@
               <a:t>F </a:t>
             </a:r>
             <a:r>
-              <a:rPr lang="en-US" sz="5000" dirty="0">
+              <a:rPr lang="en-US" sz="3232" dirty="0">
                 <a:latin typeface="Times New Roman" panose="02020603050405020304" pitchFamily="18" charset="0"/>
                 <a:ea typeface="Arial" pitchFamily="-84" charset="0"/>
                 <a:cs typeface="Times New Roman" panose="02020603050405020304" pitchFamily="18" charset="0"/>
@@ -6168,7 +6126,7 @@
               <a:t>effect: P</a:t>
             </a:r>
             <a:r>
-              <a:rPr lang="en-US" sz="5000" baseline="-25000" dirty="0">
+              <a:rPr lang="en-US" sz="3232" baseline="-25000" dirty="0">
                 <a:latin typeface="Times New Roman" panose="02020603050405020304" pitchFamily="18" charset="0"/>
                 <a:ea typeface="Arial" pitchFamily="-84" charset="0"/>
                 <a:cs typeface="Times New Roman" panose="02020603050405020304" pitchFamily="18" charset="0"/>
@@ -6176,7 +6134,7 @@
               <a:t>w</a:t>
             </a:r>
             <a:r>
-              <a:rPr lang="en-US" sz="5000" dirty="0">
+              <a:rPr lang="en-US" sz="3232" dirty="0">
                 <a:latin typeface="Symbol" pitchFamily="2" charset="2"/>
                 <a:ea typeface="Arial" pitchFamily="-84" charset="0"/>
                 <a:cs typeface="Times New Roman" panose="02020603050405020304" pitchFamily="18" charset="0"/>
@@ -6184,7 +6142,7 @@
               <a:t> a </a:t>
             </a:r>
             <a:r>
-              <a:rPr lang="en-US" sz="5000" dirty="0">
+              <a:rPr lang="en-US" sz="3232" dirty="0">
                 <a:latin typeface="Times New Roman" panose="02020603050405020304" pitchFamily="18" charset="0"/>
                 <a:ea typeface="Arial" pitchFamily="-84" charset="0"/>
                 <a:cs typeface="Times New Roman" panose="02020603050405020304" pitchFamily="18" charset="0"/>
@@ -6216,8 +6174,8 @@
         </p:blipFill>
         <p:spPr>
           <a:xfrm>
-            <a:off x="28922318" y="22928946"/>
-            <a:ext cx="1199600" cy="1159613"/>
+            <a:off x="19140603" y="15155263"/>
+            <a:ext cx="775499" cy="749649"/>
           </a:xfrm>
           <a:prstGeom prst="rect">
             <a:avLst/>
@@ -6246,8 +6204,8 @@
         </p:blipFill>
         <p:spPr>
           <a:xfrm>
-            <a:off x="30343485" y="22941041"/>
-            <a:ext cx="1199600" cy="1170833"/>
+            <a:off x="20059336" y="15163083"/>
+            <a:ext cx="775499" cy="756903"/>
           </a:xfrm>
           <a:prstGeom prst="rect">
             <a:avLst/>
@@ -6270,8 +6228,8 @@
         </p:nvSpPr>
         <p:spPr bwMode="auto">
           <a:xfrm>
-            <a:off x="29131333" y="22446059"/>
-            <a:ext cx="4193061" cy="584775"/>
+            <a:off x="19275724" y="14843095"/>
+            <a:ext cx="2710666" cy="407820"/>
           </a:xfrm>
           <a:prstGeom prst="rect">
             <a:avLst/>
@@ -6294,7 +6252,7 @@
           <a:lstStyle/>
           <a:p>
             <a:r>
-              <a:rPr lang="en-US" sz="3200" dirty="0">
+              <a:rPr lang="en-US" sz="2068" dirty="0">
                 <a:latin typeface="Times New Roman" panose="02020603050405020304" pitchFamily="18" charset="0"/>
                 <a:ea typeface="Arial" pitchFamily="-84" charset="0"/>
                 <a:cs typeface="Times New Roman" panose="02020603050405020304" pitchFamily="18" charset="0"/>
@@ -6303,7 +6261,7 @@
               <a:t></a:t>
             </a:r>
             <a:r>
-              <a:rPr lang="en-US" sz="3200" dirty="0">
+              <a:rPr lang="en-US" sz="2068" dirty="0">
                 <a:latin typeface="Times New Roman" panose="02020603050405020304" pitchFamily="18" charset="0"/>
                 <a:ea typeface="Arial" pitchFamily="-84" charset="0"/>
                 <a:cs typeface="Times New Roman" panose="02020603050405020304" pitchFamily="18" charset="0"/>
@@ -6329,8 +6287,8 @@
         </p:nvSpPr>
         <p:spPr bwMode="auto">
           <a:xfrm>
-            <a:off x="22831684" y="19200130"/>
-            <a:ext cx="9105209" cy="861774"/>
+            <a:off x="15203223" y="12744714"/>
+            <a:ext cx="5886196" cy="586890"/>
           </a:xfrm>
           <a:prstGeom prst="rect">
             <a:avLst/>
@@ -6354,7 +6312,7 @@
           <a:p>
             <a:pPr algn="ctr"/>
             <a:r>
-              <a:rPr lang="en-US" sz="5000" b="1" dirty="0">
+              <a:rPr lang="en-US" sz="3232" b="1" dirty="0">
                 <a:solidFill>
                   <a:srgbClr val="FF0000"/>
                 </a:solidFill>
@@ -6365,7 +6323,7 @@
               <a:t>E </a:t>
             </a:r>
             <a:r>
-              <a:rPr lang="en-US" sz="5000" dirty="0">
+              <a:rPr lang="en-US" sz="3232" dirty="0">
                 <a:latin typeface="Times New Roman" panose="02020603050405020304" pitchFamily="18" charset="0"/>
                 <a:ea typeface="Arial" pitchFamily="-84" charset="0"/>
                 <a:cs typeface="Times New Roman" panose="02020603050405020304" pitchFamily="18" charset="0"/>
@@ -6373,7 +6331,7 @@
               <a:t>effect: P</a:t>
             </a:r>
             <a:r>
-              <a:rPr lang="en-US" sz="5000" baseline="-25000" dirty="0">
+              <a:rPr lang="en-US" sz="3232" baseline="-25000" dirty="0">
                 <a:latin typeface="Times New Roman" panose="02020603050405020304" pitchFamily="18" charset="0"/>
                 <a:ea typeface="Arial" pitchFamily="-84" charset="0"/>
                 <a:cs typeface="Times New Roman" panose="02020603050405020304" pitchFamily="18" charset="0"/>
@@ -6381,7 +6339,7 @@
               <a:t>w</a:t>
             </a:r>
             <a:r>
-              <a:rPr lang="en-US" sz="5000" dirty="0">
+              <a:rPr lang="en-US" sz="3232" dirty="0">
                 <a:latin typeface="Symbol" pitchFamily="2" charset="2"/>
                 <a:ea typeface="Arial" pitchFamily="-84" charset="0"/>
                 <a:cs typeface="Times New Roman" panose="02020603050405020304" pitchFamily="18" charset="0"/>
@@ -6389,7 +6347,7 @@
               <a:t> a </a:t>
             </a:r>
             <a:r>
-              <a:rPr lang="en-US" sz="5000" dirty="0">
+              <a:rPr lang="en-US" sz="3232" dirty="0">
                 <a:latin typeface="Times New Roman" panose="02020603050405020304" pitchFamily="18" charset="0"/>
                 <a:ea typeface="Arial" pitchFamily="-84" charset="0"/>
                 <a:cs typeface="Times New Roman" panose="02020603050405020304" pitchFamily="18" charset="0"/>
@@ -6397,14 +6355,14 @@
               <a:t>N</a:t>
             </a:r>
             <a:r>
-              <a:rPr lang="en-US" sz="5000" baseline="-25000" dirty="0">
+              <a:rPr lang="en-US" sz="3232" baseline="-25000" dirty="0">
                 <a:latin typeface="Times New Roman" panose="02020603050405020304" pitchFamily="18" charset="0"/>
                 <a:ea typeface="Arial" pitchFamily="-84" charset="0"/>
                 <a:cs typeface="Times New Roman" panose="02020603050405020304" pitchFamily="18" charset="0"/>
               </a:rPr>
               <a:t>4neigh</a:t>
             </a:r>
-            <a:endParaRPr lang="en-US" sz="5000" dirty="0">
+            <a:endParaRPr lang="en-US" sz="3232" dirty="0">
               <a:latin typeface="Times New Roman" panose="02020603050405020304" pitchFamily="18" charset="0"/>
               <a:ea typeface="Arial" pitchFamily="-84" charset="0"/>
               <a:cs typeface="Times New Roman" panose="02020603050405020304" pitchFamily="18" charset="0"/>
@@ -6428,8 +6386,8 @@
         </p:nvCxnSpPr>
         <p:spPr>
           <a:xfrm flipH="1">
-            <a:off x="32298821" y="19085715"/>
-            <a:ext cx="3324" cy="5742777"/>
+            <a:off x="21323393" y="12670751"/>
+            <a:ext cx="2149" cy="3712502"/>
           </a:xfrm>
           <a:prstGeom prst="line">
             <a:avLst/>
@@ -6472,8 +6430,8 @@
         </p:blipFill>
         <p:spPr>
           <a:xfrm>
-            <a:off x="40390402" y="18527671"/>
-            <a:ext cx="1664552" cy="1604387"/>
+            <a:off x="26554314" y="12309995"/>
+            <a:ext cx="1076074" cy="1037179"/>
           </a:xfrm>
           <a:prstGeom prst="rect">
             <a:avLst/>
@@ -6496,8 +6454,8 @@
         </p:nvCxnSpPr>
         <p:spPr>
           <a:xfrm rot="5400000" flipH="1" flipV="1">
-            <a:off x="41100106" y="20434458"/>
-            <a:ext cx="495270" cy="156"/>
+            <a:off x="27013113" y="13542665"/>
+            <a:ext cx="320175" cy="102"/>
           </a:xfrm>
           <a:prstGeom prst="curvedConnector3">
             <a:avLst>
@@ -6549,8 +6507,8 @@
         </p:blipFill>
         <p:spPr>
           <a:xfrm>
-            <a:off x="40904336" y="23053033"/>
-            <a:ext cx="1152993" cy="1095343"/>
+            <a:off x="26886555" y="15235481"/>
+            <a:ext cx="745369" cy="708101"/>
           </a:xfrm>
           <a:prstGeom prst="rect">
             <a:avLst/>
@@ -6579,8 +6537,8 @@
         </p:blipFill>
         <p:spPr>
           <a:xfrm>
-            <a:off x="40913059" y="21948769"/>
-            <a:ext cx="1141895" cy="1095343"/>
+            <a:off x="26892196" y="14521613"/>
+            <a:ext cx="738194" cy="708101"/>
           </a:xfrm>
           <a:prstGeom prst="rect">
             <a:avLst/>
@@ -6603,8 +6561,8 @@
         </p:nvCxnSpPr>
         <p:spPr>
           <a:xfrm rot="16200000" flipH="1">
-            <a:off x="40990190" y="21073585"/>
-            <a:ext cx="589963" cy="124984"/>
+            <a:off x="26942055" y="13955838"/>
+            <a:ext cx="381391" cy="80798"/>
           </a:xfrm>
           <a:prstGeom prst="curvedConnector3">
             <a:avLst>
@@ -6650,8 +6608,8 @@
         </p:nvSpPr>
         <p:spPr bwMode="auto">
           <a:xfrm>
-            <a:off x="40675076" y="21225286"/>
-            <a:ext cx="1533628" cy="830997"/>
+            <a:off x="26738346" y="14053908"/>
+            <a:ext cx="991437" cy="808876"/>
           </a:xfrm>
           <a:prstGeom prst="rect">
             <a:avLst/>
@@ -6675,7 +6633,7 @@
           <a:p>
             <a:pPr algn="ctr"/>
             <a:r>
-              <a:rPr lang="en-US" sz="2400" dirty="0">
+              <a:rPr lang="en-US" sz="1552" dirty="0">
                 <a:latin typeface="Times New Roman" panose="02020603050405020304" pitchFamily="18" charset="0"/>
                 <a:ea typeface="Arial" pitchFamily="-84" charset="0"/>
                 <a:cs typeface="Times New Roman" panose="02020603050405020304" pitchFamily="18" charset="0"/>
@@ -6687,7 +6645,7 @@
           <a:p>
             <a:pPr algn="ctr"/>
             <a:r>
-              <a:rPr lang="en-US" sz="2400" dirty="0">
+              <a:rPr lang="en-US" sz="1552" dirty="0">
                 <a:latin typeface="Times New Roman" panose="02020603050405020304" pitchFamily="18" charset="0"/>
                 <a:ea typeface="Arial" pitchFamily="-84" charset="0"/>
                 <a:cs typeface="Times New Roman" panose="02020603050405020304" pitchFamily="18" charset="0"/>
@@ -6713,8 +6671,8 @@
         </p:nvSpPr>
         <p:spPr bwMode="auto">
           <a:xfrm>
-            <a:off x="37925609" y="20906008"/>
-            <a:ext cx="2104107" cy="1569660"/>
+            <a:off x="24960912" y="13847505"/>
+            <a:ext cx="1360231" cy="1044575"/>
           </a:xfrm>
           <a:prstGeom prst="rect">
             <a:avLst/>
@@ -6738,7 +6696,7 @@
           <a:p>
             <a:pPr algn="ctr"/>
             <a:r>
-              <a:rPr lang="en-US" sz="2400" dirty="0">
+              <a:rPr lang="en-US" sz="1552" dirty="0">
                 <a:solidFill>
                   <a:schemeClr val="tx1">
                     <a:lumMod val="65000"/>
@@ -6752,7 +6710,7 @@
               </a:rPr>
               <a:t>just a 1% contribution of R/F breaks 31 dominance  </a:t>
             </a:r>
-            <a:endParaRPr lang="en-US" sz="2400" dirty="0">
+            <a:endParaRPr lang="en-US" sz="1552" dirty="0">
               <a:solidFill>
                 <a:schemeClr val="tx1">
                   <a:lumMod val="65000"/>
@@ -6789,13 +6747,13 @@
         </p:blipFill>
         <p:spPr>
           <a:xfrm>
-            <a:off x="32598673" y="23075916"/>
-            <a:ext cx="4127500" cy="1555353"/>
+            <a:off x="21517237" y="15250275"/>
+            <a:ext cx="2668283" cy="1005481"/>
           </a:xfrm>
           <a:prstGeom prst="rect">
             <a:avLst/>
           </a:prstGeom>
-          <a:ln w="44450">
+          <a:ln w="25400">
             <a:solidFill>
               <a:srgbClr val="FF6600"/>
             </a:solidFill>
@@ -6818,8 +6776,8 @@
         </p:nvSpPr>
         <p:spPr bwMode="auto">
           <a:xfrm>
-            <a:off x="33601217" y="23697199"/>
-            <a:ext cx="2745579" cy="523220"/>
+            <a:off x="22165346" y="15651912"/>
+            <a:ext cx="1774920" cy="368151"/>
           </a:xfrm>
           <a:prstGeom prst="rect">
             <a:avLst/>
@@ -6843,7 +6801,7 @@
           <a:p>
             <a:pPr algn="ctr"/>
             <a:r>
-              <a:rPr lang="en-US" sz="2800" b="1" dirty="0">
+              <a:rPr lang="en-US" sz="1810" b="1" dirty="0">
                 <a:solidFill>
                   <a:srgbClr val="FF0000"/>
                 </a:solidFill>
@@ -6854,7 +6812,7 @@
               </a:rPr>
               <a:t>R=0, 31 rules</a:t>
             </a:r>
-            <a:endParaRPr lang="en-US" sz="2800" b="1" dirty="0">
+            <a:endParaRPr lang="en-US" sz="1810" b="1" dirty="0">
               <a:solidFill>
                 <a:srgbClr val="FF0000"/>
               </a:solidFill>
@@ -6881,8 +6839,8 @@
         </p:nvSpPr>
         <p:spPr bwMode="auto">
           <a:xfrm rot="454417">
-            <a:off x="33644159" y="11536953"/>
-            <a:ext cx="2743199" cy="523220"/>
+            <a:off x="22193109" y="7775788"/>
+            <a:ext cx="1773381" cy="368151"/>
           </a:xfrm>
           <a:prstGeom prst="rect">
             <a:avLst/>
@@ -6906,13 +6864,13 @@
           <a:p>
             <a:pPr algn="ctr"/>
             <a:r>
-              <a:rPr lang="en-US" sz="2800" dirty="0">
+              <a:rPr lang="en-US" sz="1810" dirty="0">
                 <a:ea typeface="Arial" pitchFamily="-84" charset="0"/>
                 <a:cs typeface="Arial" pitchFamily="-84" charset="0"/>
               </a:rPr>
               <a:t>pure, sole</a:t>
             </a:r>
-            <a:endParaRPr lang="en-US" sz="4400" dirty="0">
+            <a:endParaRPr lang="en-US" sz="2844" dirty="0">
               <a:ea typeface="Arial" pitchFamily="-84" charset="0"/>
               <a:cs typeface="Arial" pitchFamily="-84" charset="0"/>
             </a:endParaRPr>
@@ -6935,8 +6893,8 @@
         </p:nvSpPr>
         <p:spPr bwMode="auto">
           <a:xfrm>
-            <a:off x="40284681" y="17783149"/>
-            <a:ext cx="1914128" cy="830997"/>
+            <a:off x="26485969" y="11828689"/>
+            <a:ext cx="1237416" cy="567055"/>
           </a:xfrm>
           <a:prstGeom prst="rect">
             <a:avLst/>
@@ -6960,7 +6918,7 @@
           <a:p>
             <a:pPr algn="ctr"/>
             <a:r>
-              <a:rPr lang="en-US" sz="2400" dirty="0">
+              <a:rPr lang="en-US" sz="1552" dirty="0">
                 <a:latin typeface="Times New Roman" panose="02020603050405020304" pitchFamily="18" charset="0"/>
                 <a:ea typeface="Arial" pitchFamily="-84" charset="0"/>
                 <a:cs typeface="Times New Roman" panose="02020603050405020304" pitchFamily="18" charset="0"/>
@@ -6972,7 +6930,7 @@
           <a:p>
             <a:pPr algn="ctr"/>
             <a:r>
-              <a:rPr lang="en-US" sz="2400" dirty="0">
+              <a:rPr lang="en-US" sz="1552" dirty="0">
                 <a:latin typeface="Times New Roman" panose="02020603050405020304" pitchFamily="18" charset="0"/>
                 <a:ea typeface="Arial" pitchFamily="-84" charset="0"/>
                 <a:cs typeface="Times New Roman" panose="02020603050405020304" pitchFamily="18" charset="0"/>
@@ -6981,7 +6939,7 @@
               <a:t>most wind</a:t>
             </a:r>
             <a:r>
-              <a:rPr lang="en-US" sz="2400" dirty="0">
+              <a:rPr lang="en-US" sz="1552" dirty="0">
                 <a:latin typeface="Times New Roman" panose="02020603050405020304" pitchFamily="18" charset="0"/>
                 <a:ea typeface="Arial" pitchFamily="-84" charset="0"/>
                 <a:cs typeface="Times New Roman" panose="02020603050405020304" pitchFamily="18" charset="0"/>
@@ -7013,8 +6971,8 @@
         </p:blipFill>
         <p:spPr>
           <a:xfrm>
-            <a:off x="12231767" y="2516441"/>
-            <a:ext cx="2547418" cy="2978231"/>
+            <a:off x="9249266" y="2572705"/>
+            <a:ext cx="1223267" cy="1430143"/>
           </a:xfrm>
           <a:prstGeom prst="rect">
             <a:avLst/>
@@ -7050,8 +7008,8 @@
         </p:blipFill>
         <p:spPr bwMode="auto">
           <a:xfrm>
-            <a:off x="32205175" y="2599056"/>
-            <a:ext cx="9841234" cy="2975914"/>
+            <a:off x="21262854" y="2012708"/>
+            <a:ext cx="6362010" cy="1923824"/>
           </a:xfrm>
           <a:prstGeom prst="rect">
             <a:avLst/>
@@ -7097,8 +7055,8 @@
         </p:blipFill>
         <p:spPr bwMode="auto">
           <a:xfrm>
-            <a:off x="1562514" y="2695907"/>
-            <a:ext cx="9841234" cy="2975914"/>
+            <a:off x="1453457" y="2075320"/>
+            <a:ext cx="6362010" cy="1923824"/>
           </a:xfrm>
           <a:prstGeom prst="rect">
             <a:avLst/>
@@ -7129,8 +7087,8 @@
         </p:nvSpPr>
         <p:spPr>
           <a:xfrm>
-            <a:off x="1439109" y="19608304"/>
-            <a:ext cx="12297383" cy="1446550"/>
+            <a:off x="1373679" y="13008585"/>
+            <a:ext cx="7949824" cy="964864"/>
           </a:xfrm>
           <a:prstGeom prst="rect">
             <a:avLst/>
@@ -7145,7 +7103,7 @@
           <a:p>
             <a:pPr algn="ctr"/>
             <a:r>
-              <a:rPr lang="en-US" sz="4400">
+              <a:rPr lang="en-US" sz="2844">
                 <a:solidFill>
                   <a:srgbClr val="7030A0"/>
                 </a:solidFill>
@@ -7153,7 +7111,7 @@
               <a:t> </a:t>
             </a:r>
             <a:r>
-              <a:rPr lang="en-US" sz="4400">
+              <a:rPr lang="en-US" sz="2844">
                 <a:solidFill>
                   <a:srgbClr val="7030A0"/>
                 </a:solidFill>
@@ -7163,7 +7121,7 @@
               <a:t># per random 1000 of </a:t>
             </a:r>
             <a:r>
-              <a:rPr lang="en-US" sz="4400" b="1" u="sng">
+              <a:rPr lang="en-US" sz="2844" b="1" u="sng">
                 <a:solidFill>
                   <a:srgbClr val="0070C0"/>
                 </a:solidFill>
@@ -7173,7 +7131,7 @@
               <a:t>31 distinct</a:t>
             </a:r>
             <a:r>
-              <a:rPr lang="en-US" sz="4400">
+              <a:rPr lang="en-US" sz="2844">
                 <a:solidFill>
                   <a:srgbClr val="7030A0"/>
                 </a:solidFill>
@@ -7182,6 +7140,131 @@
               </a:rPr>
               <a:t> 4x4 4-cell configs 2x2 tiled for clarity; sorted by [ |V| ]</a:t>
             </a:r>
+          </a:p>
+        </p:txBody>
+      </p:sp>
+      <p:cxnSp>
+        <p:nvCxnSpPr>
+          <p:cNvPr id="4" name="Curved Connector 3">
+            <a:extLst>
+              <a:ext uri="{FF2B5EF4-FFF2-40B4-BE49-F238E27FC236}">
+                <a16:creationId xmlns:a16="http://schemas.microsoft.com/office/drawing/2014/main" id="{4C70E9C4-2FFD-F517-E61E-A9455EC36C6A}"/>
+              </a:ext>
+            </a:extLst>
+          </p:cNvPr>
+          <p:cNvCxnSpPr>
+            <a:cxnSpLocks/>
+            <a:endCxn id="13" idx="1"/>
+          </p:cNvCxnSpPr>
+          <p:nvPr/>
+        </p:nvCxnSpPr>
+        <p:spPr>
+          <a:xfrm flipV="1">
+            <a:off x="8209434" y="16281591"/>
+            <a:ext cx="13270556" cy="4223028"/>
+          </a:xfrm>
+          <a:prstGeom prst="curvedConnector3">
+            <a:avLst>
+              <a:gd name="adj1" fmla="val 50000"/>
+            </a:avLst>
+          </a:prstGeom>
+          <a:ln w="44450">
+            <a:solidFill>
+              <a:srgbClr val="FF6600"/>
+            </a:solidFill>
+            <a:tailEnd type="arrow"/>
+          </a:ln>
+          <a:effectLst/>
+        </p:spPr>
+        <p:style>
+          <a:lnRef idx="2">
+            <a:schemeClr val="accent1"/>
+          </a:lnRef>
+          <a:fillRef idx="0">
+            <a:schemeClr val="accent1"/>
+          </a:fillRef>
+          <a:effectRef idx="1">
+            <a:schemeClr val="accent1"/>
+          </a:effectRef>
+          <a:fontRef idx="minor">
+            <a:schemeClr val="tx1"/>
+          </a:fontRef>
+        </p:style>
+      </p:cxnSp>
+      <p:sp>
+        <p:nvSpPr>
+          <p:cNvPr id="13" name="TextBox 51">
+            <a:extLst>
+              <a:ext uri="{FF2B5EF4-FFF2-40B4-BE49-F238E27FC236}">
+                <a16:creationId xmlns:a16="http://schemas.microsoft.com/office/drawing/2014/main" id="{02BCECD2-DBE9-B79A-DE07-56932CCF3D17}"/>
+              </a:ext>
+            </a:extLst>
+          </p:cNvPr>
+          <p:cNvSpPr txBox="1">
+            <a:spLocks noChangeArrowheads="1"/>
+          </p:cNvSpPr>
+          <p:nvPr/>
+        </p:nvSpPr>
+        <p:spPr bwMode="auto">
+          <a:xfrm>
+            <a:off x="21479990" y="16077681"/>
+            <a:ext cx="3940481" cy="407820"/>
+          </a:xfrm>
+          <a:prstGeom prst="rect">
+            <a:avLst/>
+          </a:prstGeom>
+          <a:noFill/>
+          <a:ln w="9525">
+            <a:noFill/>
+            <a:miter lim="800000"/>
+            <a:headEnd/>
+            <a:tailEnd/>
+          </a:ln>
+        </p:spPr>
+        <p:txBody>
+          <a:bodyPr wrap="square">
+            <a:prstTxWarp prst="textNoShape">
+              <a:avLst/>
+            </a:prstTxWarp>
+            <a:spAutoFit/>
+          </a:bodyPr>
+          <a:lstStyle/>
+          <a:p>
+            <a:r>
+              <a:rPr lang="en-US" sz="2068" b="1" dirty="0">
+                <a:solidFill>
+                  <a:schemeClr val="accent6">
+                    <a:lumMod val="75000"/>
+                  </a:schemeClr>
+                </a:solidFill>
+                <a:ea typeface="Arial" pitchFamily="-84" charset="0"/>
+                <a:cs typeface="Arial" pitchFamily="-84" charset="0"/>
+                <a:sym typeface="Wingdings" pitchFamily="2" charset="2"/>
+              </a:rPr>
+              <a:t>Discovered quickly, but </a:t>
+            </a:r>
+            <a:r>
+              <a:rPr lang="en-US" sz="2068" b="1" i="1" dirty="0">
+                <a:solidFill>
+                  <a:schemeClr val="accent6">
+                    <a:lumMod val="75000"/>
+                  </a:schemeClr>
+                </a:solidFill>
+                <a:ea typeface="Arial" pitchFamily="-84" charset="0"/>
+                <a:cs typeface="Arial" pitchFamily="-84" charset="0"/>
+                <a:sym typeface="Wingdings" pitchFamily="2" charset="2"/>
+              </a:rPr>
+              <a:t>frail</a:t>
+            </a:r>
+            <a:endParaRPr lang="en-US" sz="2068" b="1" i="1" dirty="0">
+              <a:solidFill>
+                <a:schemeClr val="accent6">
+                  <a:lumMod val="75000"/>
+                </a:schemeClr>
+              </a:solidFill>
+              <a:ea typeface="Arial" pitchFamily="-84" charset="0"/>
+              <a:cs typeface="Arial" pitchFamily="-84" charset="0"/>
+            </a:endParaRPr>
           </a:p>
         </p:txBody>
       </p:sp>

</xml_diff>